<commit_message>
Final presentation edits and implementation ppt added
</commit_message>
<xml_diff>
--- a/Docs/Final Presentation.pptx
+++ b/Docs/Final Presentation.pptx
@@ -10,11 +10,12 @@
     <p:sldId id="259" r:id="rId4"/>
     <p:sldId id="258" r:id="rId5"/>
     <p:sldId id="260" r:id="rId6"/>
-    <p:sldId id="265" r:id="rId7"/>
-    <p:sldId id="261" r:id="rId8"/>
-    <p:sldId id="263" r:id="rId9"/>
-    <p:sldId id="264" r:id="rId10"/>
-    <p:sldId id="262" r:id="rId11"/>
+    <p:sldId id="266" r:id="rId7"/>
+    <p:sldId id="267" r:id="rId8"/>
+    <p:sldId id="261" r:id="rId9"/>
+    <p:sldId id="263" r:id="rId10"/>
+    <p:sldId id="264" r:id="rId11"/>
+    <p:sldId id="262" r:id="rId12"/>
   </p:sldIdLst>
   <p:sldSz cx="12192000" cy="6858000"/>
   <p:notesSz cx="6858000" cy="9144000"/>
@@ -133,20 +134,6 @@
 </p:cmAuthorLst>
 </file>
 
-<file path=ppt/comments/comment1.xml><?xml version="1.0" encoding="utf-8"?>
-<p:cmLst xmlns:a="http://schemas.openxmlformats.org/drawingml/2006/main" xmlns:r="http://schemas.openxmlformats.org/officeDocument/2006/relationships" xmlns:p="http://schemas.openxmlformats.org/presentationml/2006/main">
-  <p:cm authorId="1" dt="2019-12-01T10:38:54.480" idx="1">
-    <p:pos x="861" y="1396"/>
-    <p:text/>
-    <p:extLst>
-      <p:ext uri="{C676402C-5697-4E1C-873F-D02D1690AC5C}">
-        <p15:threadingInfo xmlns:p15="http://schemas.microsoft.com/office/powerpoint/2012/main" timeZoneBias="360"/>
-      </p:ext>
-    </p:extLst>
-  </p:cm>
-</p:cmLst>
-</file>
-
 <file path=ppt/diagrams/colors1.xml><?xml version="1.0" encoding="utf-8"?>
 <dgm:colorsDef xmlns:dgm="http://schemas.openxmlformats.org/drawingml/2006/diagram" xmlns:a="http://schemas.openxmlformats.org/drawingml/2006/main" uniqueId="urn:microsoft.com/office/officeart/2018/5/colors/Iconchunking_neutralbg_colorful1">
   <dgm:title val=""/>
@@ -1990,927 +1977,6 @@
 </file>
 
 <file path=ppt/diagrams/colors3.xml><?xml version="1.0" encoding="utf-8"?>
-<dgm:colorsDef xmlns:dgm="http://schemas.openxmlformats.org/drawingml/2006/diagram" xmlns:a="http://schemas.openxmlformats.org/drawingml/2006/main" uniqueId="urn:microsoft.com/office/officeart/2018/5/colors/Iconchunking_neutralbg_colorful1">
-  <dgm:title val=""/>
-  <dgm:desc val=""/>
-  <dgm:catLst>
-    <dgm:cat type="colorful" pri="10100"/>
-  </dgm:catLst>
-  <dgm:styleLbl name="node0">
-    <dgm:fillClrLst meth="repeat">
-      <a:schemeClr val="accent1"/>
-    </dgm:fillClrLst>
-    <dgm:linClrLst meth="repeat">
-      <a:schemeClr val="lt1"/>
-    </dgm:linClrLst>
-    <dgm:effectClrLst/>
-    <dgm:txLinClrLst/>
-    <dgm:txFillClrLst/>
-    <dgm:txEffectClrLst/>
-  </dgm:styleLbl>
-  <dgm:styleLbl name="node1">
-    <dgm:fillClrLst meth="repeat">
-      <a:schemeClr val="accent2"/>
-      <a:schemeClr val="accent3"/>
-      <a:schemeClr val="accent4"/>
-      <a:schemeClr val="accent5"/>
-      <a:schemeClr val="accent6"/>
-    </dgm:fillClrLst>
-    <dgm:linClrLst meth="repeat">
-      <a:schemeClr val="lt1">
-        <a:alpha val="0"/>
-      </a:schemeClr>
-    </dgm:linClrLst>
-    <dgm:effectClrLst/>
-    <dgm:txLinClrLst/>
-    <dgm:txFillClrLst/>
-    <dgm:txEffectClrLst/>
-  </dgm:styleLbl>
-  <dgm:styleLbl name="alignNode1">
-    <dgm:fillClrLst meth="repeat">
-      <a:schemeClr val="accent2"/>
-      <a:schemeClr val="accent3"/>
-      <a:schemeClr val="accent4"/>
-      <a:schemeClr val="accent5"/>
-      <a:schemeClr val="accent6"/>
-    </dgm:fillClrLst>
-    <dgm:linClrLst meth="repeat">
-      <a:schemeClr val="accent2"/>
-      <a:schemeClr val="accent3"/>
-      <a:schemeClr val="accent4"/>
-      <a:schemeClr val="accent5"/>
-      <a:schemeClr val="accent6"/>
-    </dgm:linClrLst>
-    <dgm:effectClrLst/>
-    <dgm:txLinClrLst/>
-    <dgm:txFillClrLst/>
-    <dgm:txEffectClrLst/>
-  </dgm:styleLbl>
-  <dgm:styleLbl name="lnNode1">
-    <dgm:fillClrLst meth="repeat">
-      <a:schemeClr val="accent2"/>
-      <a:schemeClr val="accent3"/>
-      <a:schemeClr val="accent4"/>
-      <a:schemeClr val="accent5"/>
-      <a:schemeClr val="accent6"/>
-    </dgm:fillClrLst>
-    <dgm:linClrLst meth="repeat">
-      <a:schemeClr val="lt1"/>
-    </dgm:linClrLst>
-    <dgm:effectClrLst/>
-    <dgm:txLinClrLst/>
-    <dgm:txFillClrLst/>
-    <dgm:txEffectClrLst/>
-  </dgm:styleLbl>
-  <dgm:styleLbl name="vennNode1">
-    <dgm:fillClrLst meth="repeat">
-      <a:schemeClr val="accent2">
-        <a:alpha val="50000"/>
-      </a:schemeClr>
-      <a:schemeClr val="accent3">
-        <a:alpha val="50000"/>
-      </a:schemeClr>
-      <a:schemeClr val="accent4">
-        <a:alpha val="50000"/>
-      </a:schemeClr>
-      <a:schemeClr val="accent5">
-        <a:alpha val="50000"/>
-      </a:schemeClr>
-      <a:schemeClr val="accent6">
-        <a:alpha val="50000"/>
-      </a:schemeClr>
-    </dgm:fillClrLst>
-    <dgm:linClrLst meth="repeat">
-      <a:schemeClr val="lt1"/>
-    </dgm:linClrLst>
-    <dgm:effectClrLst/>
-    <dgm:txLinClrLst/>
-    <dgm:txFillClrLst/>
-    <dgm:txEffectClrLst/>
-  </dgm:styleLbl>
-  <dgm:styleLbl name="node2">
-    <dgm:fillClrLst>
-      <a:schemeClr val="accent2"/>
-    </dgm:fillClrLst>
-    <dgm:linClrLst meth="repeat">
-      <a:schemeClr val="lt1"/>
-    </dgm:linClrLst>
-    <dgm:effectClrLst/>
-    <dgm:txLinClrLst/>
-    <dgm:txFillClrLst/>
-    <dgm:txEffectClrLst/>
-  </dgm:styleLbl>
-  <dgm:styleLbl name="node3">
-    <dgm:fillClrLst>
-      <a:schemeClr val="accent3"/>
-    </dgm:fillClrLst>
-    <dgm:linClrLst meth="repeat">
-      <a:schemeClr val="lt1"/>
-    </dgm:linClrLst>
-    <dgm:effectClrLst/>
-    <dgm:txLinClrLst/>
-    <dgm:txFillClrLst/>
-    <dgm:txEffectClrLst/>
-  </dgm:styleLbl>
-  <dgm:styleLbl name="node4">
-    <dgm:fillClrLst>
-      <a:schemeClr val="accent4"/>
-    </dgm:fillClrLst>
-    <dgm:linClrLst meth="repeat">
-      <a:schemeClr val="lt1"/>
-    </dgm:linClrLst>
-    <dgm:effectClrLst/>
-    <dgm:txLinClrLst/>
-    <dgm:txFillClrLst/>
-    <dgm:txEffectClrLst/>
-  </dgm:styleLbl>
-  <dgm:styleLbl name="fgImgPlace1">
-    <dgm:fillClrLst meth="repeat">
-      <a:schemeClr val="accent2">
-        <a:tint val="50000"/>
-      </a:schemeClr>
-      <a:schemeClr val="accent3">
-        <a:tint val="50000"/>
-      </a:schemeClr>
-      <a:schemeClr val="accent4">
-        <a:tint val="50000"/>
-      </a:schemeClr>
-      <a:schemeClr val="accent5">
-        <a:tint val="50000"/>
-      </a:schemeClr>
-      <a:schemeClr val="accent6">
-        <a:tint val="50000"/>
-      </a:schemeClr>
-    </dgm:fillClrLst>
-    <dgm:linClrLst meth="repeat">
-      <a:schemeClr val="lt1"/>
-    </dgm:linClrLst>
-    <dgm:effectClrLst/>
-    <dgm:txLinClrLst/>
-    <dgm:txFillClrLst meth="repeat">
-      <a:schemeClr val="lt1"/>
-    </dgm:txFillClrLst>
-    <dgm:txEffectClrLst/>
-  </dgm:styleLbl>
-  <dgm:styleLbl name="alignImgPlace1">
-    <dgm:fillClrLst>
-      <a:schemeClr val="accent1">
-        <a:tint val="50000"/>
-      </a:schemeClr>
-      <a:schemeClr val="accent2">
-        <a:tint val="20000"/>
-      </a:schemeClr>
-    </dgm:fillClrLst>
-    <dgm:linClrLst meth="repeat">
-      <a:schemeClr val="lt1"/>
-    </dgm:linClrLst>
-    <dgm:effectClrLst/>
-    <dgm:txLinClrLst/>
-    <dgm:txFillClrLst meth="repeat">
-      <a:schemeClr val="lt1"/>
-    </dgm:txFillClrLst>
-    <dgm:txEffectClrLst/>
-  </dgm:styleLbl>
-  <dgm:styleLbl name="bgImgPlace1">
-    <dgm:fillClrLst>
-      <a:schemeClr val="accent1">
-        <a:tint val="50000"/>
-      </a:schemeClr>
-      <a:schemeClr val="accent2">
-        <a:tint val="20000"/>
-      </a:schemeClr>
-    </dgm:fillClrLst>
-    <dgm:linClrLst meth="repeat">
-      <a:schemeClr val="lt1"/>
-    </dgm:linClrLst>
-    <dgm:effectClrLst/>
-    <dgm:txLinClrLst/>
-    <dgm:txFillClrLst meth="repeat">
-      <a:schemeClr val="lt1"/>
-    </dgm:txFillClrLst>
-    <dgm:txEffectClrLst/>
-  </dgm:styleLbl>
-  <dgm:styleLbl name="sibTrans2D1">
-    <dgm:fillClrLst meth="repeat">
-      <a:schemeClr val="accent2"/>
-      <a:schemeClr val="accent3"/>
-      <a:schemeClr val="accent4"/>
-      <a:schemeClr val="accent5"/>
-      <a:schemeClr val="accent6"/>
-    </dgm:fillClrLst>
-    <dgm:linClrLst meth="cycle">
-      <a:schemeClr val="lt1"/>
-    </dgm:linClrLst>
-    <dgm:effectClrLst/>
-    <dgm:txLinClrLst/>
-    <dgm:txFillClrLst/>
-    <dgm:txEffectClrLst/>
-  </dgm:styleLbl>
-  <dgm:styleLbl name="fgSibTrans2D1">
-    <dgm:fillClrLst meth="repeat">
-      <a:schemeClr val="accent2"/>
-      <a:schemeClr val="accent3"/>
-      <a:schemeClr val="accent4"/>
-      <a:schemeClr val="accent5"/>
-      <a:schemeClr val="accent6"/>
-    </dgm:fillClrLst>
-    <dgm:linClrLst meth="cycle">
-      <a:schemeClr val="lt1"/>
-    </dgm:linClrLst>
-    <dgm:effectClrLst/>
-    <dgm:txLinClrLst/>
-    <dgm:txFillClrLst meth="repeat">
-      <a:schemeClr val="lt1"/>
-    </dgm:txFillClrLst>
-    <dgm:txEffectClrLst/>
-  </dgm:styleLbl>
-  <dgm:styleLbl name="bgSibTrans2D1">
-    <dgm:fillClrLst meth="repeat">
-      <a:schemeClr val="accent2"/>
-      <a:schemeClr val="accent3"/>
-      <a:schemeClr val="accent4"/>
-      <a:schemeClr val="accent5"/>
-      <a:schemeClr val="accent6"/>
-    </dgm:fillClrLst>
-    <dgm:linClrLst meth="cycle">
-      <a:schemeClr val="lt1"/>
-    </dgm:linClrLst>
-    <dgm:effectClrLst/>
-    <dgm:txLinClrLst/>
-    <dgm:txFillClrLst meth="repeat">
-      <a:schemeClr val="lt1"/>
-    </dgm:txFillClrLst>
-    <dgm:txEffectClrLst/>
-  </dgm:styleLbl>
-  <dgm:styleLbl name="sibTrans1D1">
-    <dgm:fillClrLst meth="repeat">
-      <a:schemeClr val="accent2"/>
-      <a:schemeClr val="accent3"/>
-      <a:schemeClr val="accent4"/>
-      <a:schemeClr val="accent5"/>
-      <a:schemeClr val="accent6"/>
-    </dgm:fillClrLst>
-    <dgm:linClrLst meth="repeat">
-      <a:schemeClr val="accent2"/>
-      <a:schemeClr val="accent3"/>
-      <a:schemeClr val="accent4"/>
-      <a:schemeClr val="accent5"/>
-      <a:schemeClr val="accent6"/>
-    </dgm:linClrLst>
-    <dgm:effectClrLst/>
-    <dgm:txLinClrLst/>
-    <dgm:txFillClrLst meth="repeat">
-      <a:schemeClr val="tx1"/>
-    </dgm:txFillClrLst>
-    <dgm:txEffectClrLst/>
-  </dgm:styleLbl>
-  <dgm:styleLbl name="callout">
-    <dgm:fillClrLst meth="repeat">
-      <a:schemeClr val="accent2"/>
-    </dgm:fillClrLst>
-    <dgm:linClrLst meth="repeat">
-      <a:schemeClr val="accent2">
-        <a:tint val="50000"/>
-      </a:schemeClr>
-    </dgm:linClrLst>
-    <dgm:effectClrLst/>
-    <dgm:txLinClrLst/>
-    <dgm:txFillClrLst meth="repeat">
-      <a:schemeClr val="tx1"/>
-    </dgm:txFillClrLst>
-    <dgm:txEffectClrLst/>
-  </dgm:styleLbl>
-  <dgm:styleLbl name="asst0">
-    <dgm:fillClrLst meth="repeat">
-      <a:schemeClr val="accent1"/>
-    </dgm:fillClrLst>
-    <dgm:linClrLst meth="repeat">
-      <a:schemeClr val="lt1"/>
-    </dgm:linClrLst>
-    <dgm:effectClrLst/>
-    <dgm:txLinClrLst/>
-    <dgm:txFillClrLst/>
-    <dgm:txEffectClrLst/>
-  </dgm:styleLbl>
-  <dgm:styleLbl name="asst1">
-    <dgm:fillClrLst meth="repeat">
-      <a:schemeClr val="accent2"/>
-    </dgm:fillClrLst>
-    <dgm:linClrLst meth="repeat">
-      <a:schemeClr val="lt1"/>
-    </dgm:linClrLst>
-    <dgm:effectClrLst/>
-    <dgm:txLinClrLst/>
-    <dgm:txFillClrLst/>
-    <dgm:txEffectClrLst/>
-  </dgm:styleLbl>
-  <dgm:styleLbl name="asst2">
-    <dgm:fillClrLst>
-      <a:schemeClr val="accent3"/>
-    </dgm:fillClrLst>
-    <dgm:linClrLst meth="repeat">
-      <a:schemeClr val="lt1"/>
-    </dgm:linClrLst>
-    <dgm:effectClrLst/>
-    <dgm:txLinClrLst/>
-    <dgm:txFillClrLst/>
-    <dgm:txEffectClrLst/>
-  </dgm:styleLbl>
-  <dgm:styleLbl name="asst3">
-    <dgm:fillClrLst>
-      <a:schemeClr val="accent4"/>
-    </dgm:fillClrLst>
-    <dgm:linClrLst meth="repeat">
-      <a:schemeClr val="lt1"/>
-    </dgm:linClrLst>
-    <dgm:effectClrLst/>
-    <dgm:txLinClrLst/>
-    <dgm:txFillClrLst/>
-    <dgm:txEffectClrLst/>
-  </dgm:styleLbl>
-  <dgm:styleLbl name="asst4">
-    <dgm:fillClrLst>
-      <a:schemeClr val="accent5"/>
-    </dgm:fillClrLst>
-    <dgm:linClrLst meth="repeat">
-      <a:schemeClr val="lt1"/>
-    </dgm:linClrLst>
-    <dgm:effectClrLst/>
-    <dgm:txLinClrLst/>
-    <dgm:txFillClrLst/>
-    <dgm:txEffectClrLst/>
-  </dgm:styleLbl>
-  <dgm:styleLbl name="parChTrans2D1">
-    <dgm:fillClrLst meth="repeat">
-      <a:schemeClr val="accent2"/>
-    </dgm:fillClrLst>
-    <dgm:linClrLst meth="repeat">
-      <a:schemeClr val="lt1"/>
-    </dgm:linClrLst>
-    <dgm:effectClrLst/>
-    <dgm:txLinClrLst/>
-    <dgm:txFillClrLst meth="repeat">
-      <a:schemeClr val="lt1"/>
-    </dgm:txFillClrLst>
-    <dgm:txEffectClrLst/>
-  </dgm:styleLbl>
-  <dgm:styleLbl name="parChTrans2D2">
-    <dgm:fillClrLst meth="repeat">
-      <a:schemeClr val="accent3"/>
-    </dgm:fillClrLst>
-    <dgm:linClrLst meth="repeat">
-      <a:schemeClr val="lt1"/>
-    </dgm:linClrLst>
-    <dgm:effectClrLst/>
-    <dgm:txLinClrLst/>
-    <dgm:txFillClrLst/>
-    <dgm:txEffectClrLst/>
-  </dgm:styleLbl>
-  <dgm:styleLbl name="parChTrans2D3">
-    <dgm:fillClrLst meth="repeat">
-      <a:schemeClr val="accent4"/>
-    </dgm:fillClrLst>
-    <dgm:linClrLst meth="repeat">
-      <a:schemeClr val="lt1"/>
-    </dgm:linClrLst>
-    <dgm:effectClrLst/>
-    <dgm:txLinClrLst/>
-    <dgm:txFillClrLst/>
-    <dgm:txEffectClrLst/>
-  </dgm:styleLbl>
-  <dgm:styleLbl name="parChTrans2D4">
-    <dgm:fillClrLst meth="repeat">
-      <a:schemeClr val="accent5"/>
-    </dgm:fillClrLst>
-    <dgm:linClrLst meth="repeat">
-      <a:schemeClr val="lt1"/>
-    </dgm:linClrLst>
-    <dgm:effectClrLst/>
-    <dgm:txLinClrLst/>
-    <dgm:txFillClrLst meth="repeat">
-      <a:schemeClr val="lt1"/>
-    </dgm:txFillClrLst>
-    <dgm:txEffectClrLst/>
-  </dgm:styleLbl>
-  <dgm:styleLbl name="parChTrans1D1">
-    <dgm:fillClrLst meth="repeat">
-      <a:schemeClr val="accent2"/>
-    </dgm:fillClrLst>
-    <dgm:linClrLst meth="repeat">
-      <a:schemeClr val="accent1"/>
-    </dgm:linClrLst>
-    <dgm:effectClrLst/>
-    <dgm:txLinClrLst/>
-    <dgm:txFillClrLst meth="repeat">
-      <a:schemeClr val="tx1"/>
-    </dgm:txFillClrLst>
-    <dgm:txEffectClrLst/>
-  </dgm:styleLbl>
-  <dgm:styleLbl name="parChTrans1D2">
-    <dgm:fillClrLst meth="repeat">
-      <a:schemeClr val="accent3">
-        <a:tint val="90000"/>
-      </a:schemeClr>
-    </dgm:fillClrLst>
-    <dgm:linClrLst meth="repeat">
-      <a:schemeClr val="accent2"/>
-    </dgm:linClrLst>
-    <dgm:effectClrLst/>
-    <dgm:txLinClrLst/>
-    <dgm:txFillClrLst meth="repeat">
-      <a:schemeClr val="tx1"/>
-    </dgm:txFillClrLst>
-    <dgm:txEffectClrLst/>
-  </dgm:styleLbl>
-  <dgm:styleLbl name="parChTrans1D3">
-    <dgm:fillClrLst meth="repeat">
-      <a:schemeClr val="accent4">
-        <a:tint val="70000"/>
-      </a:schemeClr>
-    </dgm:fillClrLst>
-    <dgm:linClrLst meth="repeat">
-      <a:schemeClr val="accent3"/>
-    </dgm:linClrLst>
-    <dgm:effectClrLst/>
-    <dgm:txLinClrLst/>
-    <dgm:txFillClrLst meth="repeat">
-      <a:schemeClr val="tx1"/>
-    </dgm:txFillClrLst>
-    <dgm:txEffectClrLst/>
-  </dgm:styleLbl>
-  <dgm:styleLbl name="parChTrans1D4">
-    <dgm:fillClrLst meth="repeat">
-      <a:schemeClr val="accent5">
-        <a:tint val="50000"/>
-      </a:schemeClr>
-    </dgm:fillClrLst>
-    <dgm:linClrLst meth="repeat">
-      <a:schemeClr val="accent4"/>
-    </dgm:linClrLst>
-    <dgm:effectClrLst/>
-    <dgm:txLinClrLst/>
-    <dgm:txFillClrLst meth="repeat">
-      <a:schemeClr val="tx1"/>
-    </dgm:txFillClrLst>
-    <dgm:txEffectClrLst/>
-  </dgm:styleLbl>
-  <dgm:styleLbl name="fgAcc1">
-    <dgm:fillClrLst meth="repeat">
-      <a:schemeClr val="lt1">
-        <a:alpha val="90000"/>
-      </a:schemeClr>
-    </dgm:fillClrLst>
-    <dgm:linClrLst meth="repeat">
-      <a:schemeClr val="accent2"/>
-      <a:schemeClr val="accent3"/>
-      <a:schemeClr val="accent4"/>
-      <a:schemeClr val="accent5"/>
-      <a:schemeClr val="accent6"/>
-    </dgm:linClrLst>
-    <dgm:effectClrLst/>
-    <dgm:txLinClrLst/>
-    <dgm:txFillClrLst meth="repeat">
-      <a:schemeClr val="dk1"/>
-    </dgm:txFillClrLst>
-    <dgm:txEffectClrLst/>
-  </dgm:styleLbl>
-  <dgm:styleLbl name="conFgAcc1">
-    <dgm:fillClrLst meth="repeat">
-      <a:schemeClr val="lt1">
-        <a:alpha val="90000"/>
-      </a:schemeClr>
-    </dgm:fillClrLst>
-    <dgm:linClrLst meth="repeat">
-      <a:schemeClr val="accent2"/>
-      <a:schemeClr val="accent3"/>
-      <a:schemeClr val="accent4"/>
-      <a:schemeClr val="accent5"/>
-      <a:schemeClr val="accent6"/>
-    </dgm:linClrLst>
-    <dgm:effectClrLst/>
-    <dgm:txLinClrLst/>
-    <dgm:txFillClrLst meth="repeat">
-      <a:schemeClr val="dk1"/>
-    </dgm:txFillClrLst>
-    <dgm:txEffectClrLst/>
-  </dgm:styleLbl>
-  <dgm:styleLbl name="alignAcc1">
-    <dgm:fillClrLst meth="repeat">
-      <a:schemeClr val="lt1">
-        <a:alpha val="90000"/>
-      </a:schemeClr>
-    </dgm:fillClrLst>
-    <dgm:linClrLst meth="repeat">
-      <a:schemeClr val="accent2"/>
-      <a:schemeClr val="accent3"/>
-      <a:schemeClr val="accent4"/>
-      <a:schemeClr val="accent5"/>
-      <a:schemeClr val="accent6"/>
-    </dgm:linClrLst>
-    <dgm:effectClrLst/>
-    <dgm:txLinClrLst/>
-    <dgm:txFillClrLst meth="repeat">
-      <a:schemeClr val="dk1"/>
-    </dgm:txFillClrLst>
-    <dgm:txEffectClrLst/>
-  </dgm:styleLbl>
-  <dgm:styleLbl name="trAlignAcc1">
-    <dgm:fillClrLst meth="repeat">
-      <a:schemeClr val="lt1">
-        <a:alpha val="40000"/>
-      </a:schemeClr>
-    </dgm:fillClrLst>
-    <dgm:linClrLst meth="repeat">
-      <a:schemeClr val="accent1"/>
-    </dgm:linClrLst>
-    <dgm:effectClrLst/>
-    <dgm:txLinClrLst/>
-    <dgm:txFillClrLst meth="repeat">
-      <a:schemeClr val="dk1"/>
-    </dgm:txFillClrLst>
-    <dgm:txEffectClrLst/>
-  </dgm:styleLbl>
-  <dgm:styleLbl name="bgAcc1">
-    <dgm:fillClrLst meth="repeat">
-      <a:schemeClr val="lt1">
-        <a:alpha val="90000"/>
-      </a:schemeClr>
-    </dgm:fillClrLst>
-    <dgm:linClrLst meth="repeat">
-      <a:schemeClr val="accent2"/>
-      <a:schemeClr val="accent3"/>
-      <a:schemeClr val="accent4"/>
-      <a:schemeClr val="accent5"/>
-      <a:schemeClr val="accent6"/>
-    </dgm:linClrLst>
-    <dgm:effectClrLst/>
-    <dgm:txLinClrLst/>
-    <dgm:txFillClrLst meth="repeat">
-      <a:schemeClr val="dk1"/>
-    </dgm:txFillClrLst>
-    <dgm:txEffectClrLst/>
-  </dgm:styleLbl>
-  <dgm:styleLbl name="solidFgAcc1">
-    <dgm:fillClrLst meth="repeat">
-      <a:schemeClr val="lt1"/>
-    </dgm:fillClrLst>
-    <dgm:linClrLst meth="repeat">
-      <a:schemeClr val="accent2"/>
-      <a:schemeClr val="accent3"/>
-      <a:schemeClr val="accent4"/>
-      <a:schemeClr val="accent5"/>
-      <a:schemeClr val="accent6"/>
-    </dgm:linClrLst>
-    <dgm:effectClrLst/>
-    <dgm:txLinClrLst/>
-    <dgm:txFillClrLst meth="repeat">
-      <a:schemeClr val="dk1"/>
-    </dgm:txFillClrLst>
-    <dgm:txEffectClrLst/>
-  </dgm:styleLbl>
-  <dgm:styleLbl name="solidAlignAcc1">
-    <dgm:fillClrLst meth="repeat">
-      <a:schemeClr val="lt1"/>
-    </dgm:fillClrLst>
-    <dgm:linClrLst meth="repeat">
-      <a:schemeClr val="accent2"/>
-      <a:schemeClr val="accent3"/>
-      <a:schemeClr val="accent4"/>
-      <a:schemeClr val="accent5"/>
-      <a:schemeClr val="accent6"/>
-    </dgm:linClrLst>
-    <dgm:effectClrLst/>
-    <dgm:txLinClrLst/>
-    <dgm:txFillClrLst meth="repeat">
-      <a:schemeClr val="dk1"/>
-    </dgm:txFillClrLst>
-    <dgm:txEffectClrLst/>
-  </dgm:styleLbl>
-  <dgm:styleLbl name="solidBgAcc1">
-    <dgm:fillClrLst meth="repeat">
-      <a:schemeClr val="lt1"/>
-    </dgm:fillClrLst>
-    <dgm:linClrLst meth="repeat">
-      <a:schemeClr val="accent2"/>
-      <a:schemeClr val="accent3"/>
-      <a:schemeClr val="accent4"/>
-      <a:schemeClr val="accent5"/>
-      <a:schemeClr val="accent6"/>
-    </dgm:linClrLst>
-    <dgm:effectClrLst/>
-    <dgm:txLinClrLst/>
-    <dgm:txFillClrLst meth="repeat">
-      <a:schemeClr val="dk1"/>
-    </dgm:txFillClrLst>
-    <dgm:txEffectClrLst/>
-  </dgm:styleLbl>
-  <dgm:styleLbl name="fgAccFollowNode1">
-    <dgm:fillClrLst meth="repeat">
-      <a:schemeClr val="accent2">
-        <a:tint val="40000"/>
-        <a:alpha val="90000"/>
-      </a:schemeClr>
-      <a:schemeClr val="accent3">
-        <a:tint val="40000"/>
-        <a:alpha val="90000"/>
-      </a:schemeClr>
-      <a:schemeClr val="accent4">
-        <a:tint val="40000"/>
-        <a:alpha val="90000"/>
-      </a:schemeClr>
-      <a:schemeClr val="accent5">
-        <a:tint val="40000"/>
-        <a:alpha val="90000"/>
-      </a:schemeClr>
-      <a:schemeClr val="accent6">
-        <a:tint val="40000"/>
-        <a:alpha val="90000"/>
-      </a:schemeClr>
-    </dgm:fillClrLst>
-    <dgm:linClrLst meth="repeat">
-      <a:schemeClr val="accent2">
-        <a:tint val="40000"/>
-        <a:alpha val="90000"/>
-      </a:schemeClr>
-      <a:schemeClr val="accent3">
-        <a:tint val="40000"/>
-        <a:alpha val="90000"/>
-      </a:schemeClr>
-      <a:schemeClr val="accent4">
-        <a:tint val="40000"/>
-        <a:alpha val="90000"/>
-      </a:schemeClr>
-      <a:schemeClr val="accent5">
-        <a:tint val="40000"/>
-        <a:alpha val="90000"/>
-      </a:schemeClr>
-      <a:schemeClr val="accent6">
-        <a:tint val="40000"/>
-        <a:alpha val="90000"/>
-      </a:schemeClr>
-    </dgm:linClrLst>
-    <dgm:effectClrLst/>
-    <dgm:txLinClrLst/>
-    <dgm:txFillClrLst meth="repeat">
-      <a:schemeClr val="dk1"/>
-    </dgm:txFillClrLst>
-    <dgm:txEffectClrLst/>
-  </dgm:styleLbl>
-  <dgm:styleLbl name="alignAccFollowNode1">
-    <dgm:fillClrLst meth="repeat">
-      <a:schemeClr val="accent2">
-        <a:tint val="40000"/>
-        <a:alpha val="90000"/>
-      </a:schemeClr>
-      <a:schemeClr val="accent3">
-        <a:tint val="40000"/>
-        <a:alpha val="90000"/>
-      </a:schemeClr>
-      <a:schemeClr val="accent4">
-        <a:tint val="40000"/>
-        <a:alpha val="90000"/>
-      </a:schemeClr>
-      <a:schemeClr val="accent5">
-        <a:tint val="40000"/>
-        <a:alpha val="90000"/>
-      </a:schemeClr>
-      <a:schemeClr val="accent6">
-        <a:tint val="40000"/>
-        <a:alpha val="90000"/>
-      </a:schemeClr>
-    </dgm:fillClrLst>
-    <dgm:linClrLst meth="repeat">
-      <a:schemeClr val="accent2">
-        <a:tint val="40000"/>
-        <a:alpha val="90000"/>
-      </a:schemeClr>
-      <a:schemeClr val="accent3">
-        <a:tint val="40000"/>
-        <a:alpha val="90000"/>
-      </a:schemeClr>
-      <a:schemeClr val="accent4">
-        <a:tint val="40000"/>
-        <a:alpha val="90000"/>
-      </a:schemeClr>
-      <a:schemeClr val="accent5">
-        <a:tint val="40000"/>
-        <a:alpha val="90000"/>
-      </a:schemeClr>
-      <a:schemeClr val="accent6">
-        <a:tint val="40000"/>
-        <a:alpha val="90000"/>
-      </a:schemeClr>
-    </dgm:linClrLst>
-    <dgm:effectClrLst/>
-    <dgm:txLinClrLst/>
-    <dgm:txFillClrLst meth="repeat">
-      <a:schemeClr val="dk1"/>
-    </dgm:txFillClrLst>
-    <dgm:txEffectClrLst/>
-  </dgm:styleLbl>
-  <dgm:styleLbl name="bgAccFollowNode1">
-    <dgm:fillClrLst meth="repeat">
-      <a:schemeClr val="accent2">
-        <a:tint val="40000"/>
-        <a:alpha val="90000"/>
-      </a:schemeClr>
-      <a:schemeClr val="accent3">
-        <a:tint val="40000"/>
-        <a:alpha val="90000"/>
-      </a:schemeClr>
-      <a:schemeClr val="accent4">
-        <a:tint val="40000"/>
-        <a:alpha val="90000"/>
-      </a:schemeClr>
-      <a:schemeClr val="accent5">
-        <a:tint val="40000"/>
-        <a:alpha val="90000"/>
-      </a:schemeClr>
-      <a:schemeClr val="accent6">
-        <a:tint val="40000"/>
-        <a:alpha val="90000"/>
-      </a:schemeClr>
-    </dgm:fillClrLst>
-    <dgm:linClrLst meth="repeat">
-      <a:schemeClr val="accent2">
-        <a:tint val="40000"/>
-        <a:alpha val="90000"/>
-      </a:schemeClr>
-      <a:schemeClr val="accent3">
-        <a:tint val="40000"/>
-        <a:alpha val="90000"/>
-      </a:schemeClr>
-      <a:schemeClr val="accent4">
-        <a:tint val="40000"/>
-        <a:alpha val="90000"/>
-      </a:schemeClr>
-      <a:schemeClr val="accent5">
-        <a:tint val="40000"/>
-        <a:alpha val="90000"/>
-      </a:schemeClr>
-      <a:schemeClr val="accent6">
-        <a:tint val="40000"/>
-        <a:alpha val="90000"/>
-      </a:schemeClr>
-    </dgm:linClrLst>
-    <dgm:effectClrLst/>
-    <dgm:txLinClrLst/>
-    <dgm:txFillClrLst meth="repeat">
-      <a:schemeClr val="dk1"/>
-    </dgm:txFillClrLst>
-    <dgm:txEffectClrLst/>
-  </dgm:styleLbl>
-  <dgm:styleLbl name="fgAcc0">
-    <dgm:fillClrLst meth="repeat">
-      <a:schemeClr val="lt1">
-        <a:alpha val="90000"/>
-      </a:schemeClr>
-    </dgm:fillClrLst>
-    <dgm:linClrLst>
-      <a:schemeClr val="accent1"/>
-    </dgm:linClrLst>
-    <dgm:effectClrLst/>
-    <dgm:txLinClrLst/>
-    <dgm:txFillClrLst meth="repeat">
-      <a:schemeClr val="dk1"/>
-    </dgm:txFillClrLst>
-    <dgm:txEffectClrLst/>
-  </dgm:styleLbl>
-  <dgm:styleLbl name="fgAcc2">
-    <dgm:fillClrLst meth="repeat">
-      <a:schemeClr val="lt1">
-        <a:alpha val="90000"/>
-      </a:schemeClr>
-    </dgm:fillClrLst>
-    <dgm:linClrLst>
-      <a:schemeClr val="accent2"/>
-    </dgm:linClrLst>
-    <dgm:effectClrLst/>
-    <dgm:txLinClrLst/>
-    <dgm:txFillClrLst meth="repeat">
-      <a:schemeClr val="dk1"/>
-    </dgm:txFillClrLst>
-    <dgm:txEffectClrLst/>
-  </dgm:styleLbl>
-  <dgm:styleLbl name="fgAcc3">
-    <dgm:fillClrLst meth="repeat">
-      <a:schemeClr val="lt1">
-        <a:alpha val="90000"/>
-      </a:schemeClr>
-    </dgm:fillClrLst>
-    <dgm:linClrLst>
-      <a:schemeClr val="accent3"/>
-    </dgm:linClrLst>
-    <dgm:effectClrLst/>
-    <dgm:txLinClrLst/>
-    <dgm:txFillClrLst meth="repeat">
-      <a:schemeClr val="dk1"/>
-    </dgm:txFillClrLst>
-    <dgm:txEffectClrLst/>
-  </dgm:styleLbl>
-  <dgm:styleLbl name="fgAcc4">
-    <dgm:fillClrLst meth="repeat">
-      <a:schemeClr val="lt1">
-        <a:alpha val="90000"/>
-      </a:schemeClr>
-    </dgm:fillClrLst>
-    <dgm:linClrLst>
-      <a:schemeClr val="accent4"/>
-    </dgm:linClrLst>
-    <dgm:effectClrLst/>
-    <dgm:txLinClrLst/>
-    <dgm:txFillClrLst meth="repeat">
-      <a:schemeClr val="dk1"/>
-    </dgm:txFillClrLst>
-    <dgm:txEffectClrLst/>
-  </dgm:styleLbl>
-  <dgm:styleLbl name="bgShp">
-    <dgm:fillClrLst meth="repeat">
-      <a:schemeClr val="bg1">
-        <a:lumMod val="95000"/>
-      </a:schemeClr>
-    </dgm:fillClrLst>
-    <dgm:linClrLst meth="repeat">
-      <a:schemeClr val="dk1"/>
-    </dgm:linClrLst>
-    <dgm:effectClrLst/>
-    <dgm:txLinClrLst/>
-    <dgm:txFillClrLst meth="repeat">
-      <a:schemeClr val="dk1"/>
-    </dgm:txFillClrLst>
-    <dgm:txEffectClrLst/>
-  </dgm:styleLbl>
-  <dgm:styleLbl name="dkBgShp">
-    <dgm:fillClrLst meth="repeat">
-      <a:schemeClr val="accent2">
-        <a:shade val="90000"/>
-      </a:schemeClr>
-    </dgm:fillClrLst>
-    <dgm:linClrLst meth="repeat">
-      <a:schemeClr val="dk1"/>
-    </dgm:linClrLst>
-    <dgm:effectClrLst/>
-    <dgm:txLinClrLst/>
-    <dgm:txFillClrLst meth="repeat">
-      <a:schemeClr val="lt1"/>
-    </dgm:txFillClrLst>
-    <dgm:txEffectClrLst/>
-  </dgm:styleLbl>
-  <dgm:styleLbl name="trBgShp">
-    <dgm:fillClrLst meth="repeat">
-      <a:schemeClr val="accent1">
-        <a:tint val="50000"/>
-        <a:alpha val="40000"/>
-      </a:schemeClr>
-    </dgm:fillClrLst>
-    <dgm:linClrLst meth="repeat">
-      <a:schemeClr val="accent2"/>
-    </dgm:linClrLst>
-    <dgm:effectClrLst/>
-    <dgm:txLinClrLst/>
-    <dgm:txFillClrLst meth="repeat">
-      <a:schemeClr val="lt1"/>
-    </dgm:txFillClrLst>
-    <dgm:txEffectClrLst/>
-  </dgm:styleLbl>
-  <dgm:styleLbl name="fgShp">
-    <dgm:fillClrLst meth="repeat">
-      <a:schemeClr val="accent2">
-        <a:tint val="40000"/>
-      </a:schemeClr>
-    </dgm:fillClrLst>
-    <dgm:linClrLst meth="repeat">
-      <a:schemeClr val="lt1"/>
-    </dgm:linClrLst>
-    <dgm:effectClrLst/>
-    <dgm:txLinClrLst/>
-    <dgm:txFillClrLst meth="repeat">
-      <a:schemeClr val="dk1"/>
-    </dgm:txFillClrLst>
-    <dgm:txEffectClrLst/>
-  </dgm:styleLbl>
-  <dgm:styleLbl name="revTx">
-    <dgm:fillClrLst meth="repeat">
-      <a:schemeClr val="lt1">
-        <a:alpha val="0"/>
-      </a:schemeClr>
-    </dgm:fillClrLst>
-    <dgm:linClrLst meth="repeat">
-      <a:schemeClr val="dk1">
-        <a:alpha val="0"/>
-      </a:schemeClr>
-    </dgm:linClrLst>
-    <dgm:effectClrLst/>
-    <dgm:txLinClrLst/>
-    <dgm:txFillClrLst meth="repeat">
-      <a:schemeClr val="tx1"/>
-    </dgm:txFillClrLst>
-    <dgm:txEffectClrLst/>
-  </dgm:styleLbl>
-</dgm:colorsDef>
-</file>
-
-<file path=ppt/diagrams/colors4.xml><?xml version="1.0" encoding="utf-8"?>
 <dgm:colorsDef xmlns:dgm="http://schemas.openxmlformats.org/drawingml/2006/diagram" xmlns:a="http://schemas.openxmlformats.org/drawingml/2006/main" uniqueId="urn:microsoft.com/office/officeart/2018/5/colors/Iconchunking_neutralicon_colorful1">
   <dgm:title val=""/>
   <dgm:desc val=""/>
@@ -4501,439 +3567,6 @@
 </file>
 
 <file path=ppt/diagrams/data3.xml><?xml version="1.0" encoding="utf-8"?>
-<dgm:dataModel xmlns:dgm="http://schemas.openxmlformats.org/drawingml/2006/diagram" xmlns:a="http://schemas.openxmlformats.org/drawingml/2006/main">
-  <dgm:ptLst>
-    <dgm:pt modelId="{202F00C0-5B37-4945-A875-502DBF486774}" type="doc">
-      <dgm:prSet loTypeId="urn:microsoft.com/office/officeart/2018/2/layout/IconLabelDescriptionList" loCatId="icon" qsTypeId="urn:microsoft.com/office/officeart/2005/8/quickstyle/simple1" qsCatId="simple" csTypeId="urn:microsoft.com/office/officeart/2018/5/colors/Iconchunking_neutralbg_colorful1" csCatId="colorful" phldr="1"/>
-      <dgm:spPr/>
-      <dgm:t>
-        <a:bodyPr/>
-        <a:lstStyle/>
-        <a:p>
-          <a:endParaRPr lang="en-US"/>
-        </a:p>
-      </dgm:t>
-    </dgm:pt>
-    <dgm:pt modelId="{4D2E3BE6-7227-4FEB-9EE9-5D54AC1460BA}">
-      <dgm:prSet/>
-      <dgm:spPr/>
-      <dgm:t>
-        <a:bodyPr/>
-        <a:lstStyle/>
-        <a:p>
-          <a:pPr>
-            <a:defRPr b="1"/>
-          </a:pPr>
-          <a:r>
-            <a:rPr lang="en-US" dirty="0"/>
-            <a:t>2 X 2 Design</a:t>
-          </a:r>
-        </a:p>
-      </dgm:t>
-    </dgm:pt>
-    <dgm:pt modelId="{A2ED9D88-A521-47B2-A3AB-97B9EDF9E748}" type="parTrans" cxnId="{176A4BD9-2BEE-451D-9687-AFD1DD16C558}">
-      <dgm:prSet/>
-      <dgm:spPr/>
-      <dgm:t>
-        <a:bodyPr/>
-        <a:lstStyle/>
-        <a:p>
-          <a:endParaRPr lang="en-US"/>
-        </a:p>
-      </dgm:t>
-    </dgm:pt>
-    <dgm:pt modelId="{3199F234-27BE-479F-9ED3-678FB35B83A0}" type="sibTrans" cxnId="{176A4BD9-2BEE-451D-9687-AFD1DD16C558}">
-      <dgm:prSet/>
-      <dgm:spPr/>
-      <dgm:t>
-        <a:bodyPr/>
-        <a:lstStyle/>
-        <a:p>
-          <a:endParaRPr lang="en-US"/>
-        </a:p>
-      </dgm:t>
-    </dgm:pt>
-    <dgm:pt modelId="{D30D765A-D94F-47EF-9401-A2BC51E418B2}">
-      <dgm:prSet custT="1"/>
-      <dgm:spPr/>
-      <dgm:t>
-        <a:bodyPr/>
-        <a:lstStyle/>
-        <a:p>
-          <a:r>
-            <a:rPr lang="en-US" sz="1600" dirty="0"/>
-            <a:t>IVs/Manipulated Variables: Deviation Distance, Presence of Laser</a:t>
-          </a:r>
-          <a:br>
-            <a:rPr lang="en-US" sz="1600" dirty="0"/>
-          </a:br>
-          <a:endParaRPr lang="en-US" sz="1600" dirty="0"/>
-        </a:p>
-      </dgm:t>
-    </dgm:pt>
-    <dgm:pt modelId="{F4A958BD-8B15-4212-867C-2DD69FC48C04}" type="parTrans" cxnId="{4AAD4646-CA50-4C99-934A-FDACFB9A855B}">
-      <dgm:prSet/>
-      <dgm:spPr/>
-      <dgm:t>
-        <a:bodyPr/>
-        <a:lstStyle/>
-        <a:p>
-          <a:endParaRPr lang="en-US"/>
-        </a:p>
-      </dgm:t>
-    </dgm:pt>
-    <dgm:pt modelId="{ACC137CB-85ED-4A7E-9BC1-48DF3113055A}" type="sibTrans" cxnId="{4AAD4646-CA50-4C99-934A-FDACFB9A855B}">
-      <dgm:prSet/>
-      <dgm:spPr/>
-      <dgm:t>
-        <a:bodyPr/>
-        <a:lstStyle/>
-        <a:p>
-          <a:endParaRPr lang="en-US"/>
-        </a:p>
-      </dgm:t>
-    </dgm:pt>
-    <dgm:pt modelId="{4C2D5D9A-17C6-4362-87F8-E86F001E696F}">
-      <dgm:prSet custT="1"/>
-      <dgm:spPr/>
-      <dgm:t>
-        <a:bodyPr/>
-        <a:lstStyle/>
-        <a:p>
-          <a:r>
-            <a:rPr lang="en-US" sz="1600" dirty="0"/>
-            <a:t>DVs/Measured Variables: Participant Perception and Confidence</a:t>
-          </a:r>
-        </a:p>
-      </dgm:t>
-    </dgm:pt>
-    <dgm:pt modelId="{20219C89-93A8-4EEE-AAAD-06C4CEEE1EAE}" type="parTrans" cxnId="{4086C4D0-4295-4B89-A7B3-46E435060B3D}">
-      <dgm:prSet/>
-      <dgm:spPr/>
-      <dgm:t>
-        <a:bodyPr/>
-        <a:lstStyle/>
-        <a:p>
-          <a:endParaRPr lang="en-US"/>
-        </a:p>
-      </dgm:t>
-    </dgm:pt>
-    <dgm:pt modelId="{C5372F89-5B04-4950-9A93-08A850FCE789}" type="sibTrans" cxnId="{4086C4D0-4295-4B89-A7B3-46E435060B3D}">
-      <dgm:prSet/>
-      <dgm:spPr/>
-      <dgm:t>
-        <a:bodyPr/>
-        <a:lstStyle/>
-        <a:p>
-          <a:endParaRPr lang="en-US"/>
-        </a:p>
-      </dgm:t>
-    </dgm:pt>
-    <dgm:pt modelId="{03CE08F5-696F-4210-ACF4-1A6AB3D60D3D}">
-      <dgm:prSet/>
-      <dgm:spPr/>
-      <dgm:t>
-        <a:bodyPr/>
-        <a:lstStyle/>
-        <a:p>
-          <a:pPr>
-            <a:defRPr b="1"/>
-          </a:pPr>
-          <a:r>
-            <a:rPr lang="en-US" dirty="0"/>
-            <a:t>3 Targets</a:t>
-          </a:r>
-        </a:p>
-      </dgm:t>
-    </dgm:pt>
-    <dgm:pt modelId="{DB83E6C4-1EF8-44C3-A0D4-62CA0790D4B9}" type="parTrans" cxnId="{BBC08B26-4508-49DF-BDFD-5EA9B1BEAD87}">
-      <dgm:prSet/>
-      <dgm:spPr/>
-      <dgm:t>
-        <a:bodyPr/>
-        <a:lstStyle/>
-        <a:p>
-          <a:endParaRPr lang="en-US"/>
-        </a:p>
-      </dgm:t>
-    </dgm:pt>
-    <dgm:pt modelId="{03F21D60-4309-4677-8621-03E37FBCACFC}" type="sibTrans" cxnId="{BBC08B26-4508-49DF-BDFD-5EA9B1BEAD87}">
-      <dgm:prSet/>
-      <dgm:spPr/>
-      <dgm:t>
-        <a:bodyPr/>
-        <a:lstStyle/>
-        <a:p>
-          <a:endParaRPr lang="en-US"/>
-        </a:p>
-      </dgm:t>
-    </dgm:pt>
-    <dgm:pt modelId="{1E9C1387-E092-4335-B2BE-5A36C94B5E6B}">
-      <dgm:prSet/>
-      <dgm:spPr/>
-      <dgm:t>
-        <a:bodyPr/>
-        <a:lstStyle/>
-        <a:p>
-          <a:pPr>
-            <a:defRPr b="1"/>
-          </a:pPr>
-          <a:r>
-            <a:rPr lang="en-US"/>
-            <a:t>5 Points around each target</a:t>
-          </a:r>
-        </a:p>
-      </dgm:t>
-    </dgm:pt>
-    <dgm:pt modelId="{D71F8BA1-4D51-4D27-ADE6-9010299C2B49}" type="parTrans" cxnId="{6301FB2A-6E7F-448C-A557-8989057B3A8D}">
-      <dgm:prSet/>
-      <dgm:spPr/>
-      <dgm:t>
-        <a:bodyPr/>
-        <a:lstStyle/>
-        <a:p>
-          <a:endParaRPr lang="en-US"/>
-        </a:p>
-      </dgm:t>
-    </dgm:pt>
-    <dgm:pt modelId="{BF922FB7-CB29-46DF-855B-F3097813B80D}" type="sibTrans" cxnId="{6301FB2A-6E7F-448C-A557-8989057B3A8D}">
-      <dgm:prSet/>
-      <dgm:spPr/>
-      <dgm:t>
-        <a:bodyPr/>
-        <a:lstStyle/>
-        <a:p>
-          <a:endParaRPr lang="en-US"/>
-        </a:p>
-      </dgm:t>
-    </dgm:pt>
-    <dgm:pt modelId="{2E7EF993-6CD6-40F9-AD66-C3970EFC2EA4}" type="pres">
-      <dgm:prSet presAssocID="{202F00C0-5B37-4945-A875-502DBF486774}" presName="root" presStyleCnt="0">
-        <dgm:presLayoutVars>
-          <dgm:dir/>
-          <dgm:resizeHandles val="exact"/>
-        </dgm:presLayoutVars>
-      </dgm:prSet>
-      <dgm:spPr/>
-    </dgm:pt>
-    <dgm:pt modelId="{8D358BC6-C213-49AD-9FFC-39B80152B3B1}" type="pres">
-      <dgm:prSet presAssocID="{4D2E3BE6-7227-4FEB-9EE9-5D54AC1460BA}" presName="compNode" presStyleCnt="0"/>
-      <dgm:spPr/>
-    </dgm:pt>
-    <dgm:pt modelId="{F8E67707-7EA1-4C92-A9DE-1B9843765E4F}" type="pres">
-      <dgm:prSet presAssocID="{4D2E3BE6-7227-4FEB-9EE9-5D54AC1460BA}" presName="iconRect" presStyleLbl="node1" presStyleIdx="0" presStyleCnt="3"/>
-      <dgm:spPr>
-        <a:blipFill>
-          <a:blip xmlns:r="http://schemas.openxmlformats.org/officeDocument/2006/relationships" r:embed="rId1">
-            <a:extLst>
-              <a:ext uri="{28A0092B-C50C-407E-A947-70E740481C1C}">
-                <a14:useLocalDpi xmlns:a14="http://schemas.microsoft.com/office/drawing/2010/main" val="0"/>
-              </a:ext>
-              <a:ext uri="{96DAC541-7B7A-43D3-8B79-37D633B846F1}">
-                <asvg:svgBlip xmlns:asvg="http://schemas.microsoft.com/office/drawing/2016/SVG/main" r:embed="rId2"/>
-              </a:ext>
-            </a:extLst>
-          </a:blip>
-          <a:stretch>
-            <a:fillRect/>
-          </a:stretch>
-        </a:blipFill>
-        <a:ln>
-          <a:noFill/>
-        </a:ln>
-      </dgm:spPr>
-      <dgm:extLst>
-        <a:ext uri="{E40237B7-FDA0-4F09-8148-C483321AD2D9}">
-          <dgm14:cNvPr xmlns:dgm14="http://schemas.microsoft.com/office/drawing/2010/diagram" id="0" name="" descr="Presentation with Checklist"/>
-        </a:ext>
-      </dgm:extLst>
-    </dgm:pt>
-    <dgm:pt modelId="{2B5AAD58-1961-4C66-AEED-57C0E691201D}" type="pres">
-      <dgm:prSet presAssocID="{4D2E3BE6-7227-4FEB-9EE9-5D54AC1460BA}" presName="iconSpace" presStyleCnt="0"/>
-      <dgm:spPr/>
-    </dgm:pt>
-    <dgm:pt modelId="{43640242-6A7D-4781-ACEC-F67573E980DF}" type="pres">
-      <dgm:prSet presAssocID="{4D2E3BE6-7227-4FEB-9EE9-5D54AC1460BA}" presName="parTx" presStyleLbl="revTx" presStyleIdx="0" presStyleCnt="6">
-        <dgm:presLayoutVars>
-          <dgm:chMax val="0"/>
-          <dgm:chPref val="0"/>
-        </dgm:presLayoutVars>
-      </dgm:prSet>
-      <dgm:spPr/>
-    </dgm:pt>
-    <dgm:pt modelId="{7E6D2ED6-AE48-45E9-BE2C-0D0D44CDC0C8}" type="pres">
-      <dgm:prSet presAssocID="{4D2E3BE6-7227-4FEB-9EE9-5D54AC1460BA}" presName="txSpace" presStyleCnt="0"/>
-      <dgm:spPr/>
-    </dgm:pt>
-    <dgm:pt modelId="{0997095E-9EEC-419B-A148-59168F074FC8}" type="pres">
-      <dgm:prSet presAssocID="{4D2E3BE6-7227-4FEB-9EE9-5D54AC1460BA}" presName="desTx" presStyleLbl="revTx" presStyleIdx="1" presStyleCnt="6">
-        <dgm:presLayoutVars/>
-      </dgm:prSet>
-      <dgm:spPr/>
-    </dgm:pt>
-    <dgm:pt modelId="{09A53A5C-E854-44A9-A123-956BFF5E09A6}" type="pres">
-      <dgm:prSet presAssocID="{3199F234-27BE-479F-9ED3-678FB35B83A0}" presName="sibTrans" presStyleCnt="0"/>
-      <dgm:spPr/>
-    </dgm:pt>
-    <dgm:pt modelId="{01BA5C95-9F5B-4EE5-BE5D-0BFE7A33AC65}" type="pres">
-      <dgm:prSet presAssocID="{03CE08F5-696F-4210-ACF4-1A6AB3D60D3D}" presName="compNode" presStyleCnt="0"/>
-      <dgm:spPr/>
-    </dgm:pt>
-    <dgm:pt modelId="{4A0DCEBF-54DA-41C8-8EBB-9FDD7687E419}" type="pres">
-      <dgm:prSet presAssocID="{03CE08F5-696F-4210-ACF4-1A6AB3D60D3D}" presName="iconRect" presStyleLbl="node1" presStyleIdx="1" presStyleCnt="3"/>
-      <dgm:spPr>
-        <a:blipFill>
-          <a:blip xmlns:r="http://schemas.openxmlformats.org/officeDocument/2006/relationships" r:embed="rId3">
-            <a:extLst>
-              <a:ext uri="{28A0092B-C50C-407E-A947-70E740481C1C}">
-                <a14:useLocalDpi xmlns:a14="http://schemas.microsoft.com/office/drawing/2010/main" val="0"/>
-              </a:ext>
-              <a:ext uri="{96DAC541-7B7A-43D3-8B79-37D633B846F1}">
-                <asvg:svgBlip xmlns:asvg="http://schemas.microsoft.com/office/drawing/2016/SVG/main" r:embed="rId4"/>
-              </a:ext>
-            </a:extLst>
-          </a:blip>
-          <a:stretch>
-            <a:fillRect/>
-          </a:stretch>
-        </a:blipFill>
-        <a:ln>
-          <a:noFill/>
-        </a:ln>
-      </dgm:spPr>
-      <dgm:extLst>
-        <a:ext uri="{E40237B7-FDA0-4F09-8148-C483321AD2D9}">
-          <dgm14:cNvPr xmlns:dgm14="http://schemas.microsoft.com/office/drawing/2010/diagram" id="0" name="" descr="Bullseye"/>
-        </a:ext>
-      </dgm:extLst>
-    </dgm:pt>
-    <dgm:pt modelId="{65682BA8-AC49-4BBF-9BF7-6B62D845E038}" type="pres">
-      <dgm:prSet presAssocID="{03CE08F5-696F-4210-ACF4-1A6AB3D60D3D}" presName="iconSpace" presStyleCnt="0"/>
-      <dgm:spPr/>
-    </dgm:pt>
-    <dgm:pt modelId="{E9F45FFB-80FD-4F1C-B4F5-5166683AB2EC}" type="pres">
-      <dgm:prSet presAssocID="{03CE08F5-696F-4210-ACF4-1A6AB3D60D3D}" presName="parTx" presStyleLbl="revTx" presStyleIdx="2" presStyleCnt="6">
-        <dgm:presLayoutVars>
-          <dgm:chMax val="0"/>
-          <dgm:chPref val="0"/>
-        </dgm:presLayoutVars>
-      </dgm:prSet>
-      <dgm:spPr/>
-    </dgm:pt>
-    <dgm:pt modelId="{CCF66A45-15ED-4B47-8050-A464EEE86543}" type="pres">
-      <dgm:prSet presAssocID="{03CE08F5-696F-4210-ACF4-1A6AB3D60D3D}" presName="txSpace" presStyleCnt="0"/>
-      <dgm:spPr/>
-    </dgm:pt>
-    <dgm:pt modelId="{87D14BC4-85D9-44E3-873A-32089E317A17}" type="pres">
-      <dgm:prSet presAssocID="{03CE08F5-696F-4210-ACF4-1A6AB3D60D3D}" presName="desTx" presStyleLbl="revTx" presStyleIdx="3" presStyleCnt="6">
-        <dgm:presLayoutVars/>
-      </dgm:prSet>
-      <dgm:spPr/>
-    </dgm:pt>
-    <dgm:pt modelId="{64C21427-59D6-4A6E-9668-F31162E2111B}" type="pres">
-      <dgm:prSet presAssocID="{03F21D60-4309-4677-8621-03E37FBCACFC}" presName="sibTrans" presStyleCnt="0"/>
-      <dgm:spPr/>
-    </dgm:pt>
-    <dgm:pt modelId="{E4293105-0CA1-4CC1-8647-45528C9689CA}" type="pres">
-      <dgm:prSet presAssocID="{1E9C1387-E092-4335-B2BE-5A36C94B5E6B}" presName="compNode" presStyleCnt="0"/>
-      <dgm:spPr/>
-    </dgm:pt>
-    <dgm:pt modelId="{4C9312AE-0EC4-4D6B-8CD7-C113B063F145}" type="pres">
-      <dgm:prSet presAssocID="{1E9C1387-E092-4335-B2BE-5A36C94B5E6B}" presName="iconRect" presStyleLbl="node1" presStyleIdx="2" presStyleCnt="3"/>
-      <dgm:spPr>
-        <a:blipFill>
-          <a:blip xmlns:r="http://schemas.openxmlformats.org/officeDocument/2006/relationships" r:embed="rId5">
-            <a:extLst>
-              <a:ext uri="{28A0092B-C50C-407E-A947-70E740481C1C}">
-                <a14:useLocalDpi xmlns:a14="http://schemas.microsoft.com/office/drawing/2010/main" val="0"/>
-              </a:ext>
-              <a:ext uri="{96DAC541-7B7A-43D3-8B79-37D633B846F1}">
-                <asvg:svgBlip xmlns:asvg="http://schemas.microsoft.com/office/drawing/2016/SVG/main" r:embed="rId6"/>
-              </a:ext>
-            </a:extLst>
-          </a:blip>
-          <a:stretch>
-            <a:fillRect/>
-          </a:stretch>
-        </a:blipFill>
-        <a:ln>
-          <a:noFill/>
-        </a:ln>
-      </dgm:spPr>
-      <dgm:extLst>
-        <a:ext uri="{E40237B7-FDA0-4F09-8148-C483321AD2D9}">
-          <dgm14:cNvPr xmlns:dgm14="http://schemas.microsoft.com/office/drawing/2010/diagram" id="0" name="" descr="Target"/>
-        </a:ext>
-      </dgm:extLst>
-    </dgm:pt>
-    <dgm:pt modelId="{6E066EC2-C6D9-45A1-918F-ABFBECF0B8FD}" type="pres">
-      <dgm:prSet presAssocID="{1E9C1387-E092-4335-B2BE-5A36C94B5E6B}" presName="iconSpace" presStyleCnt="0"/>
-      <dgm:spPr/>
-    </dgm:pt>
-    <dgm:pt modelId="{26409B8A-B44F-4705-915D-2F41F78D92EF}" type="pres">
-      <dgm:prSet presAssocID="{1E9C1387-E092-4335-B2BE-5A36C94B5E6B}" presName="parTx" presStyleLbl="revTx" presStyleIdx="4" presStyleCnt="6">
-        <dgm:presLayoutVars>
-          <dgm:chMax val="0"/>
-          <dgm:chPref val="0"/>
-        </dgm:presLayoutVars>
-      </dgm:prSet>
-      <dgm:spPr/>
-    </dgm:pt>
-    <dgm:pt modelId="{4EFD7442-0320-4685-9F4D-B16976563923}" type="pres">
-      <dgm:prSet presAssocID="{1E9C1387-E092-4335-B2BE-5A36C94B5E6B}" presName="txSpace" presStyleCnt="0"/>
-      <dgm:spPr/>
-    </dgm:pt>
-    <dgm:pt modelId="{C9335ACC-C53C-46C5-870C-B4E1A90A778B}" type="pres">
-      <dgm:prSet presAssocID="{1E9C1387-E092-4335-B2BE-5A36C94B5E6B}" presName="desTx" presStyleLbl="revTx" presStyleIdx="5" presStyleCnt="6">
-        <dgm:presLayoutVars/>
-      </dgm:prSet>
-      <dgm:spPr/>
-    </dgm:pt>
-  </dgm:ptLst>
-  <dgm:cxnLst>
-    <dgm:cxn modelId="{7FB8B523-7DBF-402B-AA28-A4968C265CFB}" type="presOf" srcId="{03CE08F5-696F-4210-ACF4-1A6AB3D60D3D}" destId="{E9F45FFB-80FD-4F1C-B4F5-5166683AB2EC}" srcOrd="0" destOrd="0" presId="urn:microsoft.com/office/officeart/2018/2/layout/IconLabelDescriptionList"/>
-    <dgm:cxn modelId="{BBC08B26-4508-49DF-BDFD-5EA9B1BEAD87}" srcId="{202F00C0-5B37-4945-A875-502DBF486774}" destId="{03CE08F5-696F-4210-ACF4-1A6AB3D60D3D}" srcOrd="1" destOrd="0" parTransId="{DB83E6C4-1EF8-44C3-A0D4-62CA0790D4B9}" sibTransId="{03F21D60-4309-4677-8621-03E37FBCACFC}"/>
-    <dgm:cxn modelId="{6301FB2A-6E7F-448C-A557-8989057B3A8D}" srcId="{202F00C0-5B37-4945-A875-502DBF486774}" destId="{1E9C1387-E092-4335-B2BE-5A36C94B5E6B}" srcOrd="2" destOrd="0" parTransId="{D71F8BA1-4D51-4D27-ADE6-9010299C2B49}" sibTransId="{BF922FB7-CB29-46DF-855B-F3097813B80D}"/>
-    <dgm:cxn modelId="{653D3436-299C-4A9D-AFBF-F5869E348AA6}" type="presOf" srcId="{4D2E3BE6-7227-4FEB-9EE9-5D54AC1460BA}" destId="{43640242-6A7D-4781-ACEC-F67573E980DF}" srcOrd="0" destOrd="0" presId="urn:microsoft.com/office/officeart/2018/2/layout/IconLabelDescriptionList"/>
-    <dgm:cxn modelId="{4AAD4646-CA50-4C99-934A-FDACFB9A855B}" srcId="{4D2E3BE6-7227-4FEB-9EE9-5D54AC1460BA}" destId="{D30D765A-D94F-47EF-9401-A2BC51E418B2}" srcOrd="0" destOrd="0" parTransId="{F4A958BD-8B15-4212-867C-2DD69FC48C04}" sibTransId="{ACC137CB-85ED-4A7E-9BC1-48DF3113055A}"/>
-    <dgm:cxn modelId="{CAB7396F-0BEC-42BD-9346-30438A9C3C1C}" type="presOf" srcId="{D30D765A-D94F-47EF-9401-A2BC51E418B2}" destId="{0997095E-9EEC-419B-A148-59168F074FC8}" srcOrd="0" destOrd="0" presId="urn:microsoft.com/office/officeart/2018/2/layout/IconLabelDescriptionList"/>
-    <dgm:cxn modelId="{9BB3B94F-4EB4-47F7-A802-308B4B74AA30}" type="presOf" srcId="{4C2D5D9A-17C6-4362-87F8-E86F001E696F}" destId="{0997095E-9EEC-419B-A148-59168F074FC8}" srcOrd="0" destOrd="1" presId="urn:microsoft.com/office/officeart/2018/2/layout/IconLabelDescriptionList"/>
-    <dgm:cxn modelId="{4086C4D0-4295-4B89-A7B3-46E435060B3D}" srcId="{4D2E3BE6-7227-4FEB-9EE9-5D54AC1460BA}" destId="{4C2D5D9A-17C6-4362-87F8-E86F001E696F}" srcOrd="1" destOrd="0" parTransId="{20219C89-93A8-4EEE-AAAD-06C4CEEE1EAE}" sibTransId="{C5372F89-5B04-4950-9A93-08A850FCE789}"/>
-    <dgm:cxn modelId="{176A4BD9-2BEE-451D-9687-AFD1DD16C558}" srcId="{202F00C0-5B37-4945-A875-502DBF486774}" destId="{4D2E3BE6-7227-4FEB-9EE9-5D54AC1460BA}" srcOrd="0" destOrd="0" parTransId="{A2ED9D88-A521-47B2-A3AB-97B9EDF9E748}" sibTransId="{3199F234-27BE-479F-9ED3-678FB35B83A0}"/>
-    <dgm:cxn modelId="{38C320EC-543B-4B70-8B2D-1461C51D9BCA}" type="presOf" srcId="{202F00C0-5B37-4945-A875-502DBF486774}" destId="{2E7EF993-6CD6-40F9-AD66-C3970EFC2EA4}" srcOrd="0" destOrd="0" presId="urn:microsoft.com/office/officeart/2018/2/layout/IconLabelDescriptionList"/>
-    <dgm:cxn modelId="{E5F94FF6-8B60-403D-879F-85E6DFE596D0}" type="presOf" srcId="{1E9C1387-E092-4335-B2BE-5A36C94B5E6B}" destId="{26409B8A-B44F-4705-915D-2F41F78D92EF}" srcOrd="0" destOrd="0" presId="urn:microsoft.com/office/officeart/2018/2/layout/IconLabelDescriptionList"/>
-    <dgm:cxn modelId="{93AEB5D3-A081-4173-9D75-1CD264679A57}" type="presParOf" srcId="{2E7EF993-6CD6-40F9-AD66-C3970EFC2EA4}" destId="{8D358BC6-C213-49AD-9FFC-39B80152B3B1}" srcOrd="0" destOrd="0" presId="urn:microsoft.com/office/officeart/2018/2/layout/IconLabelDescriptionList"/>
-    <dgm:cxn modelId="{9DA044D6-9D03-415B-9089-AE8FC0B67CBA}" type="presParOf" srcId="{8D358BC6-C213-49AD-9FFC-39B80152B3B1}" destId="{F8E67707-7EA1-4C92-A9DE-1B9843765E4F}" srcOrd="0" destOrd="0" presId="urn:microsoft.com/office/officeart/2018/2/layout/IconLabelDescriptionList"/>
-    <dgm:cxn modelId="{BAEC7E0D-D4AC-4356-BB7E-715F179A2965}" type="presParOf" srcId="{8D358BC6-C213-49AD-9FFC-39B80152B3B1}" destId="{2B5AAD58-1961-4C66-AEED-57C0E691201D}" srcOrd="1" destOrd="0" presId="urn:microsoft.com/office/officeart/2018/2/layout/IconLabelDescriptionList"/>
-    <dgm:cxn modelId="{7DFBFE7C-61EA-47DD-885A-5FEF986739FC}" type="presParOf" srcId="{8D358BC6-C213-49AD-9FFC-39B80152B3B1}" destId="{43640242-6A7D-4781-ACEC-F67573E980DF}" srcOrd="2" destOrd="0" presId="urn:microsoft.com/office/officeart/2018/2/layout/IconLabelDescriptionList"/>
-    <dgm:cxn modelId="{34ED9360-D20A-40F3-B6A7-E3B14DA1B0C5}" type="presParOf" srcId="{8D358BC6-C213-49AD-9FFC-39B80152B3B1}" destId="{7E6D2ED6-AE48-45E9-BE2C-0D0D44CDC0C8}" srcOrd="3" destOrd="0" presId="urn:microsoft.com/office/officeart/2018/2/layout/IconLabelDescriptionList"/>
-    <dgm:cxn modelId="{F84CFF4A-54D9-4D35-8678-55C69BBB5580}" type="presParOf" srcId="{8D358BC6-C213-49AD-9FFC-39B80152B3B1}" destId="{0997095E-9EEC-419B-A148-59168F074FC8}" srcOrd="4" destOrd="0" presId="urn:microsoft.com/office/officeart/2018/2/layout/IconLabelDescriptionList"/>
-    <dgm:cxn modelId="{5343A898-A6D8-4882-90EC-540B85F995B9}" type="presParOf" srcId="{2E7EF993-6CD6-40F9-AD66-C3970EFC2EA4}" destId="{09A53A5C-E854-44A9-A123-956BFF5E09A6}" srcOrd="1" destOrd="0" presId="urn:microsoft.com/office/officeart/2018/2/layout/IconLabelDescriptionList"/>
-    <dgm:cxn modelId="{64C5E56D-97A8-4888-8357-543DC801704F}" type="presParOf" srcId="{2E7EF993-6CD6-40F9-AD66-C3970EFC2EA4}" destId="{01BA5C95-9F5B-4EE5-BE5D-0BFE7A33AC65}" srcOrd="2" destOrd="0" presId="urn:microsoft.com/office/officeart/2018/2/layout/IconLabelDescriptionList"/>
-    <dgm:cxn modelId="{0C319220-E534-4860-98D0-616C376BEA4A}" type="presParOf" srcId="{01BA5C95-9F5B-4EE5-BE5D-0BFE7A33AC65}" destId="{4A0DCEBF-54DA-41C8-8EBB-9FDD7687E419}" srcOrd="0" destOrd="0" presId="urn:microsoft.com/office/officeart/2018/2/layout/IconLabelDescriptionList"/>
-    <dgm:cxn modelId="{DCBAC92F-4231-47B5-8251-9A69C4A978A4}" type="presParOf" srcId="{01BA5C95-9F5B-4EE5-BE5D-0BFE7A33AC65}" destId="{65682BA8-AC49-4BBF-9BF7-6B62D845E038}" srcOrd="1" destOrd="0" presId="urn:microsoft.com/office/officeart/2018/2/layout/IconLabelDescriptionList"/>
-    <dgm:cxn modelId="{715718A4-3A19-4D47-AE95-F54B8E282616}" type="presParOf" srcId="{01BA5C95-9F5B-4EE5-BE5D-0BFE7A33AC65}" destId="{E9F45FFB-80FD-4F1C-B4F5-5166683AB2EC}" srcOrd="2" destOrd="0" presId="urn:microsoft.com/office/officeart/2018/2/layout/IconLabelDescriptionList"/>
-    <dgm:cxn modelId="{B21607C6-FE3B-44D7-A63E-4C572C4228B8}" type="presParOf" srcId="{01BA5C95-9F5B-4EE5-BE5D-0BFE7A33AC65}" destId="{CCF66A45-15ED-4B47-8050-A464EEE86543}" srcOrd="3" destOrd="0" presId="urn:microsoft.com/office/officeart/2018/2/layout/IconLabelDescriptionList"/>
-    <dgm:cxn modelId="{AB83724B-476F-45B1-AF2C-F522CD8A763D}" type="presParOf" srcId="{01BA5C95-9F5B-4EE5-BE5D-0BFE7A33AC65}" destId="{87D14BC4-85D9-44E3-873A-32089E317A17}" srcOrd="4" destOrd="0" presId="urn:microsoft.com/office/officeart/2018/2/layout/IconLabelDescriptionList"/>
-    <dgm:cxn modelId="{78E3C502-E3D5-4B33-A9EC-97D9DED2BA39}" type="presParOf" srcId="{2E7EF993-6CD6-40F9-AD66-C3970EFC2EA4}" destId="{64C21427-59D6-4A6E-9668-F31162E2111B}" srcOrd="3" destOrd="0" presId="urn:microsoft.com/office/officeart/2018/2/layout/IconLabelDescriptionList"/>
-    <dgm:cxn modelId="{B4A792CB-3D26-45A2-85B9-893614A384FE}" type="presParOf" srcId="{2E7EF993-6CD6-40F9-AD66-C3970EFC2EA4}" destId="{E4293105-0CA1-4CC1-8647-45528C9689CA}" srcOrd="4" destOrd="0" presId="urn:microsoft.com/office/officeart/2018/2/layout/IconLabelDescriptionList"/>
-    <dgm:cxn modelId="{09FE5902-AF4E-406C-B87D-40F8310E6EFD}" type="presParOf" srcId="{E4293105-0CA1-4CC1-8647-45528C9689CA}" destId="{4C9312AE-0EC4-4D6B-8CD7-C113B063F145}" srcOrd="0" destOrd="0" presId="urn:microsoft.com/office/officeart/2018/2/layout/IconLabelDescriptionList"/>
-    <dgm:cxn modelId="{27C626B5-F4BE-4A22-BB36-135CE0C19A70}" type="presParOf" srcId="{E4293105-0CA1-4CC1-8647-45528C9689CA}" destId="{6E066EC2-C6D9-45A1-918F-ABFBECF0B8FD}" srcOrd="1" destOrd="0" presId="urn:microsoft.com/office/officeart/2018/2/layout/IconLabelDescriptionList"/>
-    <dgm:cxn modelId="{70715BBA-C3DB-4EF9-9C7B-379799E289EB}" type="presParOf" srcId="{E4293105-0CA1-4CC1-8647-45528C9689CA}" destId="{26409B8A-B44F-4705-915D-2F41F78D92EF}" srcOrd="2" destOrd="0" presId="urn:microsoft.com/office/officeart/2018/2/layout/IconLabelDescriptionList"/>
-    <dgm:cxn modelId="{2514954C-C4B4-481E-8286-14819581E56E}" type="presParOf" srcId="{E4293105-0CA1-4CC1-8647-45528C9689CA}" destId="{4EFD7442-0320-4685-9F4D-B16976563923}" srcOrd="3" destOrd="0" presId="urn:microsoft.com/office/officeart/2018/2/layout/IconLabelDescriptionList"/>
-    <dgm:cxn modelId="{DC6C0BC0-AE17-4835-97CE-167B9226D782}" type="presParOf" srcId="{E4293105-0CA1-4CC1-8647-45528C9689CA}" destId="{C9335ACC-C53C-46C5-870C-B4E1A90A778B}" srcOrd="4" destOrd="0" presId="urn:microsoft.com/office/officeart/2018/2/layout/IconLabelDescriptionList"/>
-  </dgm:cxnLst>
-  <dgm:bg/>
-  <dgm:whole/>
-  <dgm:extLst>
-    <a:ext uri="http://schemas.microsoft.com/office/drawing/2008/diagram">
-      <dsp:dataModelExt xmlns:dsp="http://schemas.microsoft.com/office/drawing/2008/diagram" relId="rId6" minVer="http://schemas.openxmlformats.org/drawingml/2006/diagram"/>
-    </a:ext>
-  </dgm:extLst>
-</dgm:dataModel>
-</file>
-
-<file path=ppt/diagrams/data4.xml><?xml version="1.0" encoding="utf-8"?>
 <dgm:dataModel xmlns:dgm="http://schemas.openxmlformats.org/drawingml/2006/diagram" xmlns:a="http://schemas.openxmlformats.org/drawingml/2006/main">
   <dgm:ptLst>
     <dgm:pt modelId="{D6AEDCC3-F0AB-45F8-8FD8-030FFD8BAD5B}" type="doc">
@@ -6226,494 +4859,6 @@
       <dsp:cNvGrpSpPr/>
     </dsp:nvGrpSpPr>
     <dsp:grpSpPr/>
-    <dsp:sp modelId="{F8E67707-7EA1-4C92-A9DE-1B9843765E4F}">
-      <dsp:nvSpPr>
-        <dsp:cNvPr id="0" name=""/>
-        <dsp:cNvSpPr/>
-      </dsp:nvSpPr>
-      <dsp:spPr>
-        <a:xfrm>
-          <a:off x="4985" y="533986"/>
-          <a:ext cx="1049835" cy="1049835"/>
-        </a:xfrm>
-        <a:prstGeom prst="rect">
-          <a:avLst/>
-        </a:prstGeom>
-        <a:blipFill>
-          <a:blip xmlns:r="http://schemas.openxmlformats.org/officeDocument/2006/relationships" r:embed="rId1">
-            <a:extLst>
-              <a:ext uri="{28A0092B-C50C-407E-A947-70E740481C1C}">
-                <a14:useLocalDpi xmlns:a14="http://schemas.microsoft.com/office/drawing/2010/main" val="0"/>
-              </a:ext>
-              <a:ext uri="{96DAC541-7B7A-43D3-8B79-37D633B846F1}">
-                <asvg:svgBlip xmlns:asvg="http://schemas.microsoft.com/office/drawing/2016/SVG/main" r:embed="rId2"/>
-              </a:ext>
-            </a:extLst>
-          </a:blip>
-          <a:stretch>
-            <a:fillRect/>
-          </a:stretch>
-        </a:blipFill>
-        <a:ln w="12700" cap="flat" cmpd="sng" algn="ctr">
-          <a:noFill/>
-          <a:prstDash val="solid"/>
-        </a:ln>
-        <a:effectLst/>
-      </dsp:spPr>
-      <dsp:style>
-        <a:lnRef idx="2">
-          <a:scrgbClr r="0" g="0" b="0"/>
-        </a:lnRef>
-        <a:fillRef idx="1">
-          <a:scrgbClr r="0" g="0" b="0"/>
-        </a:fillRef>
-        <a:effectRef idx="0">
-          <a:scrgbClr r="0" g="0" b="0"/>
-        </a:effectRef>
-        <a:fontRef idx="minor">
-          <a:schemeClr val="lt1"/>
-        </a:fontRef>
-      </dsp:style>
-    </dsp:sp>
-    <dsp:sp modelId="{43640242-6A7D-4781-ACEC-F67573E980DF}">
-      <dsp:nvSpPr>
-        <dsp:cNvPr id="0" name=""/>
-        <dsp:cNvSpPr/>
-      </dsp:nvSpPr>
-      <dsp:spPr>
-        <a:xfrm>
-          <a:off x="4985" y="1728053"/>
-          <a:ext cx="2999531" cy="449929"/>
-        </a:xfrm>
-        <a:prstGeom prst="rect">
-          <a:avLst/>
-        </a:prstGeom>
-        <a:noFill/>
-        <a:ln>
-          <a:noFill/>
-        </a:ln>
-        <a:effectLst/>
-      </dsp:spPr>
-      <dsp:style>
-        <a:lnRef idx="0">
-          <a:scrgbClr r="0" g="0" b="0"/>
-        </a:lnRef>
-        <a:fillRef idx="0">
-          <a:scrgbClr r="0" g="0" b="0"/>
-        </a:fillRef>
-        <a:effectRef idx="0">
-          <a:scrgbClr r="0" g="0" b="0"/>
-        </a:effectRef>
-        <a:fontRef idx="minor"/>
-      </dsp:style>
-      <dsp:txBody>
-        <a:bodyPr spcFirstLastPara="0" vert="horz" wrap="square" lIns="0" tIns="0" rIns="0" bIns="0" numCol="1" spcCol="1270" anchor="t" anchorCtr="0">
-          <a:noAutofit/>
-        </a:bodyPr>
-        <a:lstStyle/>
-        <a:p>
-          <a:pPr marL="0" lvl="0" indent="0" algn="l" defTabSz="755650">
-            <a:lnSpc>
-              <a:spcPct val="90000"/>
-            </a:lnSpc>
-            <a:spcBef>
-              <a:spcPct val="0"/>
-            </a:spcBef>
-            <a:spcAft>
-              <a:spcPct val="35000"/>
-            </a:spcAft>
-            <a:buNone/>
-            <a:defRPr b="1"/>
-          </a:pPr>
-          <a:r>
-            <a:rPr lang="en-US" sz="1700" kern="1200" dirty="0"/>
-            <a:t>2 X 2 Design</a:t>
-          </a:r>
-        </a:p>
-      </dsp:txBody>
-      <dsp:txXfrm>
-        <a:off x="4985" y="1728053"/>
-        <a:ext cx="2999531" cy="449929"/>
-      </dsp:txXfrm>
-    </dsp:sp>
-    <dsp:sp modelId="{0997095E-9EEC-419B-A148-59168F074FC8}">
-      <dsp:nvSpPr>
-        <dsp:cNvPr id="0" name=""/>
-        <dsp:cNvSpPr/>
-      </dsp:nvSpPr>
-      <dsp:spPr>
-        <a:xfrm>
-          <a:off x="4985" y="2245067"/>
-          <a:ext cx="2999531" cy="1643124"/>
-        </a:xfrm>
-        <a:prstGeom prst="rect">
-          <a:avLst/>
-        </a:prstGeom>
-        <a:noFill/>
-        <a:ln>
-          <a:noFill/>
-        </a:ln>
-        <a:effectLst/>
-      </dsp:spPr>
-      <dsp:style>
-        <a:lnRef idx="0">
-          <a:scrgbClr r="0" g="0" b="0"/>
-        </a:lnRef>
-        <a:fillRef idx="0">
-          <a:scrgbClr r="0" g="0" b="0"/>
-        </a:fillRef>
-        <a:effectRef idx="0">
-          <a:scrgbClr r="0" g="0" b="0"/>
-        </a:effectRef>
-        <a:fontRef idx="minor"/>
-      </dsp:style>
-      <dsp:txBody>
-        <a:bodyPr spcFirstLastPara="0" vert="horz" wrap="square" lIns="0" tIns="0" rIns="0" bIns="0" numCol="1" spcCol="1270" anchor="t" anchorCtr="0">
-          <a:noAutofit/>
-        </a:bodyPr>
-        <a:lstStyle/>
-        <a:p>
-          <a:pPr marL="0" lvl="0" indent="0" algn="l" defTabSz="711200">
-            <a:lnSpc>
-              <a:spcPct val="90000"/>
-            </a:lnSpc>
-            <a:spcBef>
-              <a:spcPct val="0"/>
-            </a:spcBef>
-            <a:spcAft>
-              <a:spcPct val="35000"/>
-            </a:spcAft>
-            <a:buNone/>
-          </a:pPr>
-          <a:r>
-            <a:rPr lang="en-US" sz="1600" kern="1200" dirty="0"/>
-            <a:t>IVs/Manipulated Variables: Deviation Distance, Presence of Laser</a:t>
-          </a:r>
-          <a:br>
-            <a:rPr lang="en-US" sz="1600" kern="1200" dirty="0"/>
-          </a:br>
-          <a:endParaRPr lang="en-US" sz="1600" kern="1200" dirty="0"/>
-        </a:p>
-        <a:p>
-          <a:pPr marL="0" lvl="0" indent="0" algn="l" defTabSz="711200">
-            <a:lnSpc>
-              <a:spcPct val="90000"/>
-            </a:lnSpc>
-            <a:spcBef>
-              <a:spcPct val="0"/>
-            </a:spcBef>
-            <a:spcAft>
-              <a:spcPct val="35000"/>
-            </a:spcAft>
-            <a:buNone/>
-          </a:pPr>
-          <a:r>
-            <a:rPr lang="en-US" sz="1600" kern="1200" dirty="0"/>
-            <a:t>DVs/Measured Variables: Participant Perception and Confidence</a:t>
-          </a:r>
-        </a:p>
-      </dsp:txBody>
-      <dsp:txXfrm>
-        <a:off x="4985" y="2245067"/>
-        <a:ext cx="2999531" cy="1643124"/>
-      </dsp:txXfrm>
-    </dsp:sp>
-    <dsp:sp modelId="{4A0DCEBF-54DA-41C8-8EBB-9FDD7687E419}">
-      <dsp:nvSpPr>
-        <dsp:cNvPr id="0" name=""/>
-        <dsp:cNvSpPr/>
-      </dsp:nvSpPr>
-      <dsp:spPr>
-        <a:xfrm>
-          <a:off x="3529434" y="533986"/>
-          <a:ext cx="1049835" cy="1049835"/>
-        </a:xfrm>
-        <a:prstGeom prst="rect">
-          <a:avLst/>
-        </a:prstGeom>
-        <a:blipFill>
-          <a:blip xmlns:r="http://schemas.openxmlformats.org/officeDocument/2006/relationships" r:embed="rId3">
-            <a:extLst>
-              <a:ext uri="{28A0092B-C50C-407E-A947-70E740481C1C}">
-                <a14:useLocalDpi xmlns:a14="http://schemas.microsoft.com/office/drawing/2010/main" val="0"/>
-              </a:ext>
-              <a:ext uri="{96DAC541-7B7A-43D3-8B79-37D633B846F1}">
-                <asvg:svgBlip xmlns:asvg="http://schemas.microsoft.com/office/drawing/2016/SVG/main" r:embed="rId4"/>
-              </a:ext>
-            </a:extLst>
-          </a:blip>
-          <a:stretch>
-            <a:fillRect/>
-          </a:stretch>
-        </a:blipFill>
-        <a:ln w="12700" cap="flat" cmpd="sng" algn="ctr">
-          <a:noFill/>
-          <a:prstDash val="solid"/>
-        </a:ln>
-        <a:effectLst/>
-      </dsp:spPr>
-      <dsp:style>
-        <a:lnRef idx="2">
-          <a:scrgbClr r="0" g="0" b="0"/>
-        </a:lnRef>
-        <a:fillRef idx="1">
-          <a:scrgbClr r="0" g="0" b="0"/>
-        </a:fillRef>
-        <a:effectRef idx="0">
-          <a:scrgbClr r="0" g="0" b="0"/>
-        </a:effectRef>
-        <a:fontRef idx="minor">
-          <a:schemeClr val="lt1"/>
-        </a:fontRef>
-      </dsp:style>
-    </dsp:sp>
-    <dsp:sp modelId="{E9F45FFB-80FD-4F1C-B4F5-5166683AB2EC}">
-      <dsp:nvSpPr>
-        <dsp:cNvPr id="0" name=""/>
-        <dsp:cNvSpPr/>
-      </dsp:nvSpPr>
-      <dsp:spPr>
-        <a:xfrm>
-          <a:off x="3529434" y="1728053"/>
-          <a:ext cx="2999531" cy="449929"/>
-        </a:xfrm>
-        <a:prstGeom prst="rect">
-          <a:avLst/>
-        </a:prstGeom>
-        <a:noFill/>
-        <a:ln>
-          <a:noFill/>
-        </a:ln>
-        <a:effectLst/>
-      </dsp:spPr>
-      <dsp:style>
-        <a:lnRef idx="0">
-          <a:scrgbClr r="0" g="0" b="0"/>
-        </a:lnRef>
-        <a:fillRef idx="0">
-          <a:scrgbClr r="0" g="0" b="0"/>
-        </a:fillRef>
-        <a:effectRef idx="0">
-          <a:scrgbClr r="0" g="0" b="0"/>
-        </a:effectRef>
-        <a:fontRef idx="minor"/>
-      </dsp:style>
-      <dsp:txBody>
-        <a:bodyPr spcFirstLastPara="0" vert="horz" wrap="square" lIns="0" tIns="0" rIns="0" bIns="0" numCol="1" spcCol="1270" anchor="t" anchorCtr="0">
-          <a:noAutofit/>
-        </a:bodyPr>
-        <a:lstStyle/>
-        <a:p>
-          <a:pPr marL="0" lvl="0" indent="0" algn="l" defTabSz="755650">
-            <a:lnSpc>
-              <a:spcPct val="90000"/>
-            </a:lnSpc>
-            <a:spcBef>
-              <a:spcPct val="0"/>
-            </a:spcBef>
-            <a:spcAft>
-              <a:spcPct val="35000"/>
-            </a:spcAft>
-            <a:buNone/>
-            <a:defRPr b="1"/>
-          </a:pPr>
-          <a:r>
-            <a:rPr lang="en-US" sz="1700" kern="1200" dirty="0"/>
-            <a:t>3 Targets</a:t>
-          </a:r>
-        </a:p>
-      </dsp:txBody>
-      <dsp:txXfrm>
-        <a:off x="3529434" y="1728053"/>
-        <a:ext cx="2999531" cy="449929"/>
-      </dsp:txXfrm>
-    </dsp:sp>
-    <dsp:sp modelId="{87D14BC4-85D9-44E3-873A-32089E317A17}">
-      <dsp:nvSpPr>
-        <dsp:cNvPr id="0" name=""/>
-        <dsp:cNvSpPr/>
-      </dsp:nvSpPr>
-      <dsp:spPr>
-        <a:xfrm>
-          <a:off x="3529434" y="2245067"/>
-          <a:ext cx="2999531" cy="1643124"/>
-        </a:xfrm>
-        <a:prstGeom prst="rect">
-          <a:avLst/>
-        </a:prstGeom>
-        <a:noFill/>
-        <a:ln>
-          <a:noFill/>
-        </a:ln>
-        <a:effectLst/>
-      </dsp:spPr>
-      <dsp:style>
-        <a:lnRef idx="0">
-          <a:scrgbClr r="0" g="0" b="0"/>
-        </a:lnRef>
-        <a:fillRef idx="0">
-          <a:scrgbClr r="0" g="0" b="0"/>
-        </a:fillRef>
-        <a:effectRef idx="0">
-          <a:scrgbClr r="0" g="0" b="0"/>
-        </a:effectRef>
-        <a:fontRef idx="minor"/>
-      </dsp:style>
-    </dsp:sp>
-    <dsp:sp modelId="{4C9312AE-0EC4-4D6B-8CD7-C113B063F145}">
-      <dsp:nvSpPr>
-        <dsp:cNvPr id="0" name=""/>
-        <dsp:cNvSpPr/>
-      </dsp:nvSpPr>
-      <dsp:spPr>
-        <a:xfrm>
-          <a:off x="7053883" y="533986"/>
-          <a:ext cx="1049835" cy="1049835"/>
-        </a:xfrm>
-        <a:prstGeom prst="rect">
-          <a:avLst/>
-        </a:prstGeom>
-        <a:blipFill>
-          <a:blip xmlns:r="http://schemas.openxmlformats.org/officeDocument/2006/relationships" r:embed="rId5">
-            <a:extLst>
-              <a:ext uri="{28A0092B-C50C-407E-A947-70E740481C1C}">
-                <a14:useLocalDpi xmlns:a14="http://schemas.microsoft.com/office/drawing/2010/main" val="0"/>
-              </a:ext>
-              <a:ext uri="{96DAC541-7B7A-43D3-8B79-37D633B846F1}">
-                <asvg:svgBlip xmlns:asvg="http://schemas.microsoft.com/office/drawing/2016/SVG/main" r:embed="rId6"/>
-              </a:ext>
-            </a:extLst>
-          </a:blip>
-          <a:stretch>
-            <a:fillRect/>
-          </a:stretch>
-        </a:blipFill>
-        <a:ln w="12700" cap="flat" cmpd="sng" algn="ctr">
-          <a:noFill/>
-          <a:prstDash val="solid"/>
-        </a:ln>
-        <a:effectLst/>
-      </dsp:spPr>
-      <dsp:style>
-        <a:lnRef idx="2">
-          <a:scrgbClr r="0" g="0" b="0"/>
-        </a:lnRef>
-        <a:fillRef idx="1">
-          <a:scrgbClr r="0" g="0" b="0"/>
-        </a:fillRef>
-        <a:effectRef idx="0">
-          <a:scrgbClr r="0" g="0" b="0"/>
-        </a:effectRef>
-        <a:fontRef idx="minor">
-          <a:schemeClr val="lt1"/>
-        </a:fontRef>
-      </dsp:style>
-    </dsp:sp>
-    <dsp:sp modelId="{26409B8A-B44F-4705-915D-2F41F78D92EF}">
-      <dsp:nvSpPr>
-        <dsp:cNvPr id="0" name=""/>
-        <dsp:cNvSpPr/>
-      </dsp:nvSpPr>
-      <dsp:spPr>
-        <a:xfrm>
-          <a:off x="7053883" y="1728053"/>
-          <a:ext cx="2999531" cy="449929"/>
-        </a:xfrm>
-        <a:prstGeom prst="rect">
-          <a:avLst/>
-        </a:prstGeom>
-        <a:noFill/>
-        <a:ln>
-          <a:noFill/>
-        </a:ln>
-        <a:effectLst/>
-      </dsp:spPr>
-      <dsp:style>
-        <a:lnRef idx="0">
-          <a:scrgbClr r="0" g="0" b="0"/>
-        </a:lnRef>
-        <a:fillRef idx="0">
-          <a:scrgbClr r="0" g="0" b="0"/>
-        </a:fillRef>
-        <a:effectRef idx="0">
-          <a:scrgbClr r="0" g="0" b="0"/>
-        </a:effectRef>
-        <a:fontRef idx="minor"/>
-      </dsp:style>
-      <dsp:txBody>
-        <a:bodyPr spcFirstLastPara="0" vert="horz" wrap="square" lIns="0" tIns="0" rIns="0" bIns="0" numCol="1" spcCol="1270" anchor="t" anchorCtr="0">
-          <a:noAutofit/>
-        </a:bodyPr>
-        <a:lstStyle/>
-        <a:p>
-          <a:pPr marL="0" lvl="0" indent="0" algn="l" defTabSz="755650">
-            <a:lnSpc>
-              <a:spcPct val="90000"/>
-            </a:lnSpc>
-            <a:spcBef>
-              <a:spcPct val="0"/>
-            </a:spcBef>
-            <a:spcAft>
-              <a:spcPct val="35000"/>
-            </a:spcAft>
-            <a:buNone/>
-            <a:defRPr b="1"/>
-          </a:pPr>
-          <a:r>
-            <a:rPr lang="en-US" sz="1700" kern="1200"/>
-            <a:t>5 Points around each target</a:t>
-          </a:r>
-        </a:p>
-      </dsp:txBody>
-      <dsp:txXfrm>
-        <a:off x="7053883" y="1728053"/>
-        <a:ext cx="2999531" cy="449929"/>
-      </dsp:txXfrm>
-    </dsp:sp>
-    <dsp:sp modelId="{C9335ACC-C53C-46C5-870C-B4E1A90A778B}">
-      <dsp:nvSpPr>
-        <dsp:cNvPr id="0" name=""/>
-        <dsp:cNvSpPr/>
-      </dsp:nvSpPr>
-      <dsp:spPr>
-        <a:xfrm>
-          <a:off x="7053883" y="2245067"/>
-          <a:ext cx="2999531" cy="1643124"/>
-        </a:xfrm>
-        <a:prstGeom prst="rect">
-          <a:avLst/>
-        </a:prstGeom>
-        <a:noFill/>
-        <a:ln>
-          <a:noFill/>
-        </a:ln>
-        <a:effectLst/>
-      </dsp:spPr>
-      <dsp:style>
-        <a:lnRef idx="0">
-          <a:scrgbClr r="0" g="0" b="0"/>
-        </a:lnRef>
-        <a:fillRef idx="0">
-          <a:scrgbClr r="0" g="0" b="0"/>
-        </a:fillRef>
-        <a:effectRef idx="0">
-          <a:scrgbClr r="0" g="0" b="0"/>
-        </a:effectRef>
-        <a:fontRef idx="minor"/>
-      </dsp:style>
-    </dsp:sp>
-  </dsp:spTree>
-</dsp:drawing>
-</file>
-
-<file path=ppt/diagrams/drawing4.xml><?xml version="1.0" encoding="utf-8"?>
-<dsp:drawing xmlns:dgm="http://schemas.openxmlformats.org/drawingml/2006/diagram" xmlns:dsp="http://schemas.microsoft.com/office/drawing/2008/diagram" xmlns:a="http://schemas.openxmlformats.org/drawingml/2006/main">
-  <dsp:spTree>
-    <dsp:nvGrpSpPr>
-      <dsp:cNvPr id="0" name=""/>
-      <dsp:cNvGrpSpPr/>
-    </dsp:nvGrpSpPr>
-    <dsp:grpSpPr/>
     <dsp:sp modelId="{70F37139-F768-4C2D-B4F5-3C30D43FAE82}">
       <dsp:nvSpPr>
         <dsp:cNvPr id="0" name=""/>
@@ -7754,215 +5899,6 @@
 </file>
 
 <file path=ppt/diagrams/layout3.xml><?xml version="1.0" encoding="utf-8"?>
-<dgm:layoutDef xmlns:dgm="http://schemas.openxmlformats.org/drawingml/2006/diagram" xmlns:a="http://schemas.openxmlformats.org/drawingml/2006/main" uniqueId="urn:microsoft.com/office/officeart/2018/2/layout/IconLabelDescriptionList">
-  <dgm:title val="Icon Label Description List"/>
-  <dgm:desc val="Use to show non-sequential or grouped chunks of information. The placeholder holds an icon or small picture, and corresponding text boxes show Level 1 and Level 2 text respectively. Works well for minimal Level 1 text accompanied by lengthier Level two text."/>
-  <dgm:catLst>
-    <dgm:cat type="icon" pri="500"/>
-  </dgm:catLst>
-  <dgm:sampData useDef="1">
-    <dgm:dataModel>
-      <dgm:ptLst/>
-      <dgm:bg/>
-      <dgm:whole/>
-    </dgm:dataModel>
-  </dgm:sampData>
-  <dgm:styleData useDef="1">
-    <dgm:dataModel>
-      <dgm:ptLst/>
-      <dgm:bg/>
-      <dgm:whole/>
-    </dgm:dataModel>
-  </dgm:styleData>
-  <dgm:clrData useDef="1">
-    <dgm:dataModel>
-      <dgm:ptLst/>
-      <dgm:bg/>
-      <dgm:whole/>
-    </dgm:dataModel>
-  </dgm:clrData>
-  <dgm:layoutNode name="root">
-    <dgm:varLst>
-      <dgm:dir/>
-      <dgm:resizeHandles val="exact"/>
-    </dgm:varLst>
-    <dgm:choose name="Name0">
-      <dgm:if name="Name1" axis="self" func="var" arg="dir" op="equ" val="norm">
-        <dgm:alg type="lin"/>
-      </dgm:if>
-      <dgm:else name="Name2">
-        <dgm:alg type="lin">
-          <dgm:param type="linDir" val="fromR"/>
-        </dgm:alg>
-      </dgm:else>
-    </dgm:choose>
-    <dgm:shape xmlns:r="http://schemas.openxmlformats.org/officeDocument/2006/relationships" r:blip="">
-      <dgm:adjLst/>
-    </dgm:shape>
-    <dgm:presOf/>
-    <dgm:constrLst>
-      <dgm:constr type="h" for="ch" forName="compNode" refType="h" fact="0.45"/>
-      <dgm:constr type="w" for="ch" forName="compNode" val="120"/>
-      <dgm:constr type="w" for="ch" forName="sibTrans" refType="w" refFor="ch" refForName="compNode" fact="0.175"/>
-      <dgm:constr type="primFontSz" for="des" forName="parTx" val="36"/>
-      <dgm:constr type="primFontSz" for="des" forName="desTx" refType="primFontSz" refFor="des" refForName="parTx" op="lte" fact="0.75"/>
-      <dgm:constr type="h" for="des" forName="compNode" op="equ"/>
-      <dgm:constr type="h" for="des" forName="iconRect" op="equ"/>
-      <dgm:constr type="w" for="des" forName="iconRect" op="equ"/>
-      <dgm:constr type="h" for="des" forName="iconSpace" op="equ"/>
-      <dgm:constr type="h" for="des" forName="parTx" op="equ"/>
-      <dgm:constr type="h" for="des" forName="txSpace" op="equ"/>
-      <dgm:constr type="h" for="des" forName="desTx" op="equ"/>
-    </dgm:constrLst>
-    <dgm:ruleLst>
-      <dgm:rule type="w" for="ch" forName="compNode" val="0" fact="NaN" max="NaN"/>
-    </dgm:ruleLst>
-    <dgm:forEach name="Name3" axis="ch" ptType="node">
-      <dgm:layoutNode name="compNode">
-        <dgm:alg type="composite"/>
-        <dgm:shape xmlns:r="http://schemas.openxmlformats.org/officeDocument/2006/relationships" r:blip="">
-          <dgm:adjLst/>
-        </dgm:shape>
-        <dgm:presOf axis="self"/>
-        <dgm:constrLst>
-          <dgm:constr type="w" for="ch" forName="iconRect" refType="w" fact="0.35"/>
-          <dgm:constr type="h" for="ch" forName="iconRect" refType="w" refFor="ch" refForName="iconRect"/>
-          <dgm:constr type="l" for="ch" forName="iconRect"/>
-          <dgm:constr type="t" for="ch" forName="iconRect"/>
-          <dgm:constr type="w" for="ch" forName="iconSpace" refType="w"/>
-          <dgm:constr type="h" for="ch" forName="iconSpace" refType="h" fact="0.043"/>
-          <dgm:constr type="l" for="ch" forName="iconSpace"/>
-          <dgm:constr type="t" for="ch" forName="iconSpace" refType="b" refFor="ch" refForName="iconRect"/>
-          <dgm:constr type="w" for="ch" forName="parTx" refType="w"/>
-          <dgm:constr type="h" for="ch" forName="parTx" refType="w" fact="0.15"/>
-          <dgm:constr type="l" for="ch" forName="parTx"/>
-          <dgm:constr type="t" for="ch" forName="parTx" refType="b" refFor="ch" refForName="iconSpace"/>
-          <dgm:constr type="h" for="ch" forName="txSpace" refType="h" fact="0.02"/>
-          <dgm:constr type="w" for="ch" forName="txSpace" refType="w"/>
-          <dgm:constr type="l" for="ch" forName="txSpace"/>
-          <dgm:constr type="t" for="ch" forName="txSpace" refType="b" refFor="ch" refForName="parTx"/>
-          <dgm:constr type="w" for="ch" forName="desTx" refType="w"/>
-          <dgm:constr type="l" for="ch" forName="desTx"/>
-          <dgm:constr type="t" for="ch" forName="desTx" refType="b" refFor="ch" refForName="txSpace"/>
-        </dgm:constrLst>
-        <dgm:ruleLst>
-          <dgm:rule type="h" val="INF" fact="NaN" max="NaN"/>
-        </dgm:ruleLst>
-        <dgm:layoutNode name="iconRect" styleLbl="node1">
-          <dgm:alg type="sp"/>
-          <dgm:shape xmlns:r="http://schemas.openxmlformats.org/officeDocument/2006/relationships" type="rect" r:blip="" blipPhldr="1">
-            <dgm:adjLst/>
-          </dgm:shape>
-          <dgm:presOf/>
-          <dgm:constrLst/>
-          <dgm:ruleLst/>
-        </dgm:layoutNode>
-        <dgm:layoutNode name="iconSpace">
-          <dgm:alg type="sp"/>
-          <dgm:shape xmlns:r="http://schemas.openxmlformats.org/officeDocument/2006/relationships" r:blip="">
-            <dgm:adjLst/>
-          </dgm:shape>
-          <dgm:presOf/>
-          <dgm:constrLst/>
-          <dgm:ruleLst/>
-        </dgm:layoutNode>
-        <dgm:layoutNode name="parTx" styleLbl="revTx">
-          <dgm:varLst>
-            <dgm:chMax val="0"/>
-            <dgm:chPref val="0"/>
-          </dgm:varLst>
-          <dgm:alg type="tx">
-            <dgm:param type="txAnchorVert" val="t"/>
-            <dgm:param type="parTxLTRAlign" val="l"/>
-            <dgm:param type="shpTxLTRAlignCh" val="l"/>
-            <dgm:param type="parTxRTLAlign" val="r"/>
-            <dgm:param type="shpTxRTLAlignCh" val="r"/>
-          </dgm:alg>
-          <dgm:shape xmlns:r="http://schemas.openxmlformats.org/officeDocument/2006/relationships" type="rect" r:blip="">
-            <dgm:adjLst/>
-          </dgm:shape>
-          <dgm:presOf axis="self" ptType="node"/>
-          <dgm:constrLst>
-            <dgm:constr type="lMarg"/>
-            <dgm:constr type="rMarg"/>
-            <dgm:constr type="tMarg"/>
-            <dgm:constr type="bMarg"/>
-          </dgm:constrLst>
-          <dgm:ruleLst>
-            <dgm:rule type="primFontSz" val="14" fact="NaN" max="NaN"/>
-            <dgm:rule type="h" val="INF" fact="NaN" max="NaN"/>
-          </dgm:ruleLst>
-        </dgm:layoutNode>
-        <dgm:layoutNode name="txSpace">
-          <dgm:alg type="sp"/>
-          <dgm:shape xmlns:r="http://schemas.openxmlformats.org/officeDocument/2006/relationships" r:blip="">
-            <dgm:adjLst/>
-          </dgm:shape>
-          <dgm:presOf/>
-          <dgm:constrLst/>
-          <dgm:ruleLst/>
-        </dgm:layoutNode>
-        <dgm:layoutNode name="desTx" styleLbl="revTx">
-          <dgm:varLst/>
-          <dgm:alg type="tx">
-            <dgm:param type="stBulletLvl" val="0"/>
-            <dgm:param type="txAnchorVert" val="t"/>
-            <dgm:param type="parTxLTRAlign" val="l"/>
-            <dgm:param type="shpTxLTRAlignCh" val="l"/>
-            <dgm:param type="parTxRTLAlign" val="r"/>
-            <dgm:param type="shpTxRTLAlignCh" val="r"/>
-          </dgm:alg>
-          <dgm:shape xmlns:r="http://schemas.openxmlformats.org/officeDocument/2006/relationships" type="rect" r:blip="">
-            <dgm:adjLst/>
-          </dgm:shape>
-          <dgm:presOf axis="des" ptType="node"/>
-          <dgm:constrLst>
-            <dgm:constr type="secFontSz" refType="primFontSz"/>
-            <dgm:constr type="lMarg"/>
-            <dgm:constr type="rMarg"/>
-            <dgm:constr type="tMarg"/>
-            <dgm:constr type="bMarg"/>
-          </dgm:constrLst>
-          <dgm:ruleLst>
-            <dgm:rule type="primFontSz" val="NaN" fact="NaN" max="17"/>
-            <dgm:rule type="h" val="INF" fact="NaN" max="NaN"/>
-          </dgm:ruleLst>
-        </dgm:layoutNode>
-      </dgm:layoutNode>
-      <dgm:forEach name="Name4" axis="followSib" ptType="sibTrans" cnt="1">
-        <dgm:layoutNode name="sibTrans">
-          <dgm:alg type="sp"/>
-          <dgm:shape xmlns:r="http://schemas.openxmlformats.org/officeDocument/2006/relationships" r:blip="">
-            <dgm:adjLst/>
-          </dgm:shape>
-          <dgm:presOf axis="self"/>
-          <dgm:constrLst/>
-          <dgm:ruleLst/>
-        </dgm:layoutNode>
-      </dgm:forEach>
-    </dgm:forEach>
-  </dgm:layoutNode>
-  <dgm:extLst>
-    <a:ext uri="{68A01E43-0DF5-4B5B-8FA6-DAF915123BFB}">
-      <dgm1612:lstStyle xmlns:dgm1612="http://schemas.microsoft.com/office/drawing/2016/12/diagram">
-        <a:lvl1pPr>
-          <a:lnSpc>
-            <a:spcPct val="100000"/>
-          </a:lnSpc>
-          <a:defRPr b="1"/>
-        </a:lvl1pPr>
-        <a:lvl2pPr>
-          <a:lnSpc>
-            <a:spcPct val="100000"/>
-          </a:lnSpc>
-        </a:lvl2pPr>
-      </dgm1612:lstStyle>
-    </a:ext>
-  </dgm:extLst>
-</dgm:layoutDef>
-</file>
-
-<file path=ppt/diagrams/layout4.xml><?xml version="1.0" encoding="utf-8"?>
 <dgm:layoutDef xmlns:dgm="http://schemas.openxmlformats.org/drawingml/2006/diagram" xmlns:a="http://schemas.openxmlformats.org/drawingml/2006/main" uniqueId="urn:microsoft.com/office/officeart/2018/5/layout/IconCircleLabelList">
   <dgm:title val="Icon Circle Label List"/>
   <dgm:desc val="Use to show non-sequential or grouped chunks of information accompanied by a related visuals. Works best with icons or small pictures with short text captions."/>
@@ -10246,1040 +8182,6 @@
 </file>
 
 <file path=ppt/diagrams/quickStyle3.xml><?xml version="1.0" encoding="utf-8"?>
-<dgm:styleDef xmlns:dgm="http://schemas.openxmlformats.org/drawingml/2006/diagram" xmlns:a="http://schemas.openxmlformats.org/drawingml/2006/main" uniqueId="urn:microsoft.com/office/officeart/2005/8/quickstyle/simple1">
-  <dgm:title val=""/>
-  <dgm:desc val=""/>
-  <dgm:catLst>
-    <dgm:cat type="simple" pri="10100"/>
-  </dgm:catLst>
-  <dgm:scene3d>
-    <a:camera prst="orthographicFront"/>
-    <a:lightRig rig="threePt" dir="t"/>
-  </dgm:scene3d>
-  <dgm:styleLbl name="node0">
-    <dgm:scene3d>
-      <a:camera prst="orthographicFront"/>
-      <a:lightRig rig="threePt" dir="t"/>
-    </dgm:scene3d>
-    <dgm:sp3d/>
-    <dgm:txPr/>
-    <dgm:style>
-      <a:lnRef idx="2">
-        <a:scrgbClr r="0" g="0" b="0"/>
-      </a:lnRef>
-      <a:fillRef idx="1">
-        <a:scrgbClr r="0" g="0" b="0"/>
-      </a:fillRef>
-      <a:effectRef idx="0">
-        <a:scrgbClr r="0" g="0" b="0"/>
-      </a:effectRef>
-      <a:fontRef idx="minor">
-        <a:schemeClr val="lt1"/>
-      </a:fontRef>
-    </dgm:style>
-  </dgm:styleLbl>
-  <dgm:styleLbl name="lnNode1">
-    <dgm:scene3d>
-      <a:camera prst="orthographicFront"/>
-      <a:lightRig rig="threePt" dir="t"/>
-    </dgm:scene3d>
-    <dgm:sp3d/>
-    <dgm:txPr/>
-    <dgm:style>
-      <a:lnRef idx="2">
-        <a:scrgbClr r="0" g="0" b="0"/>
-      </a:lnRef>
-      <a:fillRef idx="1">
-        <a:scrgbClr r="0" g="0" b="0"/>
-      </a:fillRef>
-      <a:effectRef idx="0">
-        <a:scrgbClr r="0" g="0" b="0"/>
-      </a:effectRef>
-      <a:fontRef idx="minor">
-        <a:schemeClr val="lt1"/>
-      </a:fontRef>
-    </dgm:style>
-  </dgm:styleLbl>
-  <dgm:styleLbl name="vennNode1">
-    <dgm:scene3d>
-      <a:camera prst="orthographicFront"/>
-      <a:lightRig rig="threePt" dir="t"/>
-    </dgm:scene3d>
-    <dgm:sp3d/>
-    <dgm:txPr/>
-    <dgm:style>
-      <a:lnRef idx="2">
-        <a:scrgbClr r="0" g="0" b="0"/>
-      </a:lnRef>
-      <a:fillRef idx="1">
-        <a:scrgbClr r="0" g="0" b="0"/>
-      </a:fillRef>
-      <a:effectRef idx="0">
-        <a:scrgbClr r="0" g="0" b="0"/>
-      </a:effectRef>
-      <a:fontRef idx="minor">
-        <a:schemeClr val="tx1"/>
-      </a:fontRef>
-    </dgm:style>
-  </dgm:styleLbl>
-  <dgm:styleLbl name="alignNode1">
-    <dgm:scene3d>
-      <a:camera prst="orthographicFront"/>
-      <a:lightRig rig="threePt" dir="t"/>
-    </dgm:scene3d>
-    <dgm:sp3d/>
-    <dgm:txPr/>
-    <dgm:style>
-      <a:lnRef idx="2">
-        <a:scrgbClr r="0" g="0" b="0"/>
-      </a:lnRef>
-      <a:fillRef idx="1">
-        <a:scrgbClr r="0" g="0" b="0"/>
-      </a:fillRef>
-      <a:effectRef idx="0">
-        <a:scrgbClr r="0" g="0" b="0"/>
-      </a:effectRef>
-      <a:fontRef idx="minor">
-        <a:schemeClr val="lt1"/>
-      </a:fontRef>
-    </dgm:style>
-  </dgm:styleLbl>
-  <dgm:styleLbl name="node1">
-    <dgm:scene3d>
-      <a:camera prst="orthographicFront"/>
-      <a:lightRig rig="threePt" dir="t"/>
-    </dgm:scene3d>
-    <dgm:sp3d/>
-    <dgm:txPr/>
-    <dgm:style>
-      <a:lnRef idx="2">
-        <a:scrgbClr r="0" g="0" b="0"/>
-      </a:lnRef>
-      <a:fillRef idx="1">
-        <a:scrgbClr r="0" g="0" b="0"/>
-      </a:fillRef>
-      <a:effectRef idx="0">
-        <a:scrgbClr r="0" g="0" b="0"/>
-      </a:effectRef>
-      <a:fontRef idx="minor">
-        <a:schemeClr val="lt1"/>
-      </a:fontRef>
-    </dgm:style>
-  </dgm:styleLbl>
-  <dgm:styleLbl name="node2">
-    <dgm:scene3d>
-      <a:camera prst="orthographicFront"/>
-      <a:lightRig rig="threePt" dir="t"/>
-    </dgm:scene3d>
-    <dgm:sp3d/>
-    <dgm:txPr/>
-    <dgm:style>
-      <a:lnRef idx="2">
-        <a:scrgbClr r="0" g="0" b="0"/>
-      </a:lnRef>
-      <a:fillRef idx="1">
-        <a:scrgbClr r="0" g="0" b="0"/>
-      </a:fillRef>
-      <a:effectRef idx="0">
-        <a:scrgbClr r="0" g="0" b="0"/>
-      </a:effectRef>
-      <a:fontRef idx="minor">
-        <a:schemeClr val="lt1"/>
-      </a:fontRef>
-    </dgm:style>
-  </dgm:styleLbl>
-  <dgm:styleLbl name="node3">
-    <dgm:scene3d>
-      <a:camera prst="orthographicFront"/>
-      <a:lightRig rig="threePt" dir="t"/>
-    </dgm:scene3d>
-    <dgm:sp3d/>
-    <dgm:txPr/>
-    <dgm:style>
-      <a:lnRef idx="2">
-        <a:scrgbClr r="0" g="0" b="0"/>
-      </a:lnRef>
-      <a:fillRef idx="1">
-        <a:scrgbClr r="0" g="0" b="0"/>
-      </a:fillRef>
-      <a:effectRef idx="0">
-        <a:scrgbClr r="0" g="0" b="0"/>
-      </a:effectRef>
-      <a:fontRef idx="minor">
-        <a:schemeClr val="lt1"/>
-      </a:fontRef>
-    </dgm:style>
-  </dgm:styleLbl>
-  <dgm:styleLbl name="node4">
-    <dgm:scene3d>
-      <a:camera prst="orthographicFront"/>
-      <a:lightRig rig="threePt" dir="t"/>
-    </dgm:scene3d>
-    <dgm:sp3d/>
-    <dgm:txPr/>
-    <dgm:style>
-      <a:lnRef idx="2">
-        <a:scrgbClr r="0" g="0" b="0"/>
-      </a:lnRef>
-      <a:fillRef idx="1">
-        <a:scrgbClr r="0" g="0" b="0"/>
-      </a:fillRef>
-      <a:effectRef idx="0">
-        <a:scrgbClr r="0" g="0" b="0"/>
-      </a:effectRef>
-      <a:fontRef idx="minor">
-        <a:schemeClr val="lt1"/>
-      </a:fontRef>
-    </dgm:style>
-  </dgm:styleLbl>
-  <dgm:styleLbl name="fgImgPlace1">
-    <dgm:scene3d>
-      <a:camera prst="orthographicFront"/>
-      <a:lightRig rig="threePt" dir="t"/>
-    </dgm:scene3d>
-    <dgm:sp3d/>
-    <dgm:txPr/>
-    <dgm:style>
-      <a:lnRef idx="2">
-        <a:scrgbClr r="0" g="0" b="0"/>
-      </a:lnRef>
-      <a:fillRef idx="1">
-        <a:scrgbClr r="0" g="0" b="0"/>
-      </a:fillRef>
-      <a:effectRef idx="0">
-        <a:scrgbClr r="0" g="0" b="0"/>
-      </a:effectRef>
-      <a:fontRef idx="minor"/>
-    </dgm:style>
-  </dgm:styleLbl>
-  <dgm:styleLbl name="alignImgPlace1">
-    <dgm:scene3d>
-      <a:camera prst="orthographicFront"/>
-      <a:lightRig rig="threePt" dir="t"/>
-    </dgm:scene3d>
-    <dgm:sp3d/>
-    <dgm:txPr/>
-    <dgm:style>
-      <a:lnRef idx="2">
-        <a:scrgbClr r="0" g="0" b="0"/>
-      </a:lnRef>
-      <a:fillRef idx="1">
-        <a:scrgbClr r="0" g="0" b="0"/>
-      </a:fillRef>
-      <a:effectRef idx="0">
-        <a:scrgbClr r="0" g="0" b="0"/>
-      </a:effectRef>
-      <a:fontRef idx="minor"/>
-    </dgm:style>
-  </dgm:styleLbl>
-  <dgm:styleLbl name="bgImgPlace1">
-    <dgm:scene3d>
-      <a:camera prst="orthographicFront"/>
-      <a:lightRig rig="threePt" dir="t"/>
-    </dgm:scene3d>
-    <dgm:sp3d/>
-    <dgm:txPr/>
-    <dgm:style>
-      <a:lnRef idx="2">
-        <a:scrgbClr r="0" g="0" b="0"/>
-      </a:lnRef>
-      <a:fillRef idx="1">
-        <a:scrgbClr r="0" g="0" b="0"/>
-      </a:fillRef>
-      <a:effectRef idx="0">
-        <a:scrgbClr r="0" g="0" b="0"/>
-      </a:effectRef>
-      <a:fontRef idx="minor"/>
-    </dgm:style>
-  </dgm:styleLbl>
-  <dgm:styleLbl name="sibTrans2D1">
-    <dgm:scene3d>
-      <a:camera prst="orthographicFront"/>
-      <a:lightRig rig="threePt" dir="t"/>
-    </dgm:scene3d>
-    <dgm:sp3d/>
-    <dgm:txPr/>
-    <dgm:style>
-      <a:lnRef idx="0">
-        <a:scrgbClr r="0" g="0" b="0"/>
-      </a:lnRef>
-      <a:fillRef idx="1">
-        <a:scrgbClr r="0" g="0" b="0"/>
-      </a:fillRef>
-      <a:effectRef idx="0">
-        <a:scrgbClr r="0" g="0" b="0"/>
-      </a:effectRef>
-      <a:fontRef idx="minor">
-        <a:schemeClr val="lt1"/>
-      </a:fontRef>
-    </dgm:style>
-  </dgm:styleLbl>
-  <dgm:styleLbl name="fgSibTrans2D1">
-    <dgm:scene3d>
-      <a:camera prst="orthographicFront"/>
-      <a:lightRig rig="threePt" dir="t"/>
-    </dgm:scene3d>
-    <dgm:sp3d/>
-    <dgm:txPr/>
-    <dgm:style>
-      <a:lnRef idx="0">
-        <a:scrgbClr r="0" g="0" b="0"/>
-      </a:lnRef>
-      <a:fillRef idx="1">
-        <a:scrgbClr r="0" g="0" b="0"/>
-      </a:fillRef>
-      <a:effectRef idx="0">
-        <a:scrgbClr r="0" g="0" b="0"/>
-      </a:effectRef>
-      <a:fontRef idx="minor">
-        <a:schemeClr val="lt1"/>
-      </a:fontRef>
-    </dgm:style>
-  </dgm:styleLbl>
-  <dgm:styleLbl name="bgSibTrans2D1">
-    <dgm:scene3d>
-      <a:camera prst="orthographicFront"/>
-      <a:lightRig rig="threePt" dir="t"/>
-    </dgm:scene3d>
-    <dgm:sp3d/>
-    <dgm:txPr/>
-    <dgm:style>
-      <a:lnRef idx="0">
-        <a:scrgbClr r="0" g="0" b="0"/>
-      </a:lnRef>
-      <a:fillRef idx="1">
-        <a:scrgbClr r="0" g="0" b="0"/>
-      </a:fillRef>
-      <a:effectRef idx="0">
-        <a:scrgbClr r="0" g="0" b="0"/>
-      </a:effectRef>
-      <a:fontRef idx="minor">
-        <a:schemeClr val="lt1"/>
-      </a:fontRef>
-    </dgm:style>
-  </dgm:styleLbl>
-  <dgm:styleLbl name="sibTrans1D1">
-    <dgm:scene3d>
-      <a:camera prst="orthographicFront"/>
-      <a:lightRig rig="threePt" dir="t"/>
-    </dgm:scene3d>
-    <dgm:sp3d/>
-    <dgm:txPr/>
-    <dgm:style>
-      <a:lnRef idx="1">
-        <a:scrgbClr r="0" g="0" b="0"/>
-      </a:lnRef>
-      <a:fillRef idx="0">
-        <a:scrgbClr r="0" g="0" b="0"/>
-      </a:fillRef>
-      <a:effectRef idx="0">
-        <a:scrgbClr r="0" g="0" b="0"/>
-      </a:effectRef>
-      <a:fontRef idx="minor"/>
-    </dgm:style>
-  </dgm:styleLbl>
-  <dgm:styleLbl name="callout">
-    <dgm:scene3d>
-      <a:camera prst="orthographicFront"/>
-      <a:lightRig rig="threePt" dir="t"/>
-    </dgm:scene3d>
-    <dgm:sp3d/>
-    <dgm:txPr/>
-    <dgm:style>
-      <a:lnRef idx="2">
-        <a:scrgbClr r="0" g="0" b="0"/>
-      </a:lnRef>
-      <a:fillRef idx="1">
-        <a:scrgbClr r="0" g="0" b="0"/>
-      </a:fillRef>
-      <a:effectRef idx="0">
-        <a:scrgbClr r="0" g="0" b="0"/>
-      </a:effectRef>
-      <a:fontRef idx="minor"/>
-    </dgm:style>
-  </dgm:styleLbl>
-  <dgm:styleLbl name="asst0">
-    <dgm:scene3d>
-      <a:camera prst="orthographicFront"/>
-      <a:lightRig rig="threePt" dir="t"/>
-    </dgm:scene3d>
-    <dgm:sp3d/>
-    <dgm:txPr/>
-    <dgm:style>
-      <a:lnRef idx="2">
-        <a:scrgbClr r="0" g="0" b="0"/>
-      </a:lnRef>
-      <a:fillRef idx="1">
-        <a:scrgbClr r="0" g="0" b="0"/>
-      </a:fillRef>
-      <a:effectRef idx="0">
-        <a:scrgbClr r="0" g="0" b="0"/>
-      </a:effectRef>
-      <a:fontRef idx="minor">
-        <a:schemeClr val="lt1"/>
-      </a:fontRef>
-    </dgm:style>
-  </dgm:styleLbl>
-  <dgm:styleLbl name="asst1">
-    <dgm:scene3d>
-      <a:camera prst="orthographicFront"/>
-      <a:lightRig rig="threePt" dir="t"/>
-    </dgm:scene3d>
-    <dgm:sp3d/>
-    <dgm:txPr/>
-    <dgm:style>
-      <a:lnRef idx="2">
-        <a:scrgbClr r="0" g="0" b="0"/>
-      </a:lnRef>
-      <a:fillRef idx="1">
-        <a:scrgbClr r="0" g="0" b="0"/>
-      </a:fillRef>
-      <a:effectRef idx="0">
-        <a:scrgbClr r="0" g="0" b="0"/>
-      </a:effectRef>
-      <a:fontRef idx="minor">
-        <a:schemeClr val="lt1"/>
-      </a:fontRef>
-    </dgm:style>
-  </dgm:styleLbl>
-  <dgm:styleLbl name="asst2">
-    <dgm:scene3d>
-      <a:camera prst="orthographicFront"/>
-      <a:lightRig rig="threePt" dir="t"/>
-    </dgm:scene3d>
-    <dgm:sp3d/>
-    <dgm:txPr/>
-    <dgm:style>
-      <a:lnRef idx="2">
-        <a:scrgbClr r="0" g="0" b="0"/>
-      </a:lnRef>
-      <a:fillRef idx="1">
-        <a:scrgbClr r="0" g="0" b="0"/>
-      </a:fillRef>
-      <a:effectRef idx="0">
-        <a:scrgbClr r="0" g="0" b="0"/>
-      </a:effectRef>
-      <a:fontRef idx="minor">
-        <a:schemeClr val="lt1"/>
-      </a:fontRef>
-    </dgm:style>
-  </dgm:styleLbl>
-  <dgm:styleLbl name="asst3">
-    <dgm:scene3d>
-      <a:camera prst="orthographicFront"/>
-      <a:lightRig rig="threePt" dir="t"/>
-    </dgm:scene3d>
-    <dgm:sp3d/>
-    <dgm:txPr/>
-    <dgm:style>
-      <a:lnRef idx="2">
-        <a:scrgbClr r="0" g="0" b="0"/>
-      </a:lnRef>
-      <a:fillRef idx="1">
-        <a:scrgbClr r="0" g="0" b="0"/>
-      </a:fillRef>
-      <a:effectRef idx="0">
-        <a:scrgbClr r="0" g="0" b="0"/>
-      </a:effectRef>
-      <a:fontRef idx="minor">
-        <a:schemeClr val="lt1"/>
-      </a:fontRef>
-    </dgm:style>
-  </dgm:styleLbl>
-  <dgm:styleLbl name="asst4">
-    <dgm:scene3d>
-      <a:camera prst="orthographicFront"/>
-      <a:lightRig rig="threePt" dir="t"/>
-    </dgm:scene3d>
-    <dgm:sp3d/>
-    <dgm:txPr/>
-    <dgm:style>
-      <a:lnRef idx="2">
-        <a:scrgbClr r="0" g="0" b="0"/>
-      </a:lnRef>
-      <a:fillRef idx="1">
-        <a:scrgbClr r="0" g="0" b="0"/>
-      </a:fillRef>
-      <a:effectRef idx="0">
-        <a:scrgbClr r="0" g="0" b="0"/>
-      </a:effectRef>
-      <a:fontRef idx="minor">
-        <a:schemeClr val="lt1"/>
-      </a:fontRef>
-    </dgm:style>
-  </dgm:styleLbl>
-  <dgm:styleLbl name="parChTrans2D1">
-    <dgm:scene3d>
-      <a:camera prst="orthographicFront"/>
-      <a:lightRig rig="threePt" dir="t"/>
-    </dgm:scene3d>
-    <dgm:sp3d/>
-    <dgm:txPr/>
-    <dgm:style>
-      <a:lnRef idx="2">
-        <a:scrgbClr r="0" g="0" b="0"/>
-      </a:lnRef>
-      <a:fillRef idx="1">
-        <a:scrgbClr r="0" g="0" b="0"/>
-      </a:fillRef>
-      <a:effectRef idx="0">
-        <a:scrgbClr r="0" g="0" b="0"/>
-      </a:effectRef>
-      <a:fontRef idx="minor">
-        <a:schemeClr val="lt1"/>
-      </a:fontRef>
-    </dgm:style>
-  </dgm:styleLbl>
-  <dgm:styleLbl name="parChTrans2D2">
-    <dgm:scene3d>
-      <a:camera prst="orthographicFront"/>
-      <a:lightRig rig="threePt" dir="t"/>
-    </dgm:scene3d>
-    <dgm:sp3d/>
-    <dgm:txPr/>
-    <dgm:style>
-      <a:lnRef idx="2">
-        <a:scrgbClr r="0" g="0" b="0"/>
-      </a:lnRef>
-      <a:fillRef idx="1">
-        <a:scrgbClr r="0" g="0" b="0"/>
-      </a:fillRef>
-      <a:effectRef idx="0">
-        <a:scrgbClr r="0" g="0" b="0"/>
-      </a:effectRef>
-      <a:fontRef idx="minor">
-        <a:schemeClr val="lt1"/>
-      </a:fontRef>
-    </dgm:style>
-  </dgm:styleLbl>
-  <dgm:styleLbl name="parChTrans2D3">
-    <dgm:scene3d>
-      <a:camera prst="orthographicFront"/>
-      <a:lightRig rig="threePt" dir="t"/>
-    </dgm:scene3d>
-    <dgm:sp3d/>
-    <dgm:txPr/>
-    <dgm:style>
-      <a:lnRef idx="2">
-        <a:scrgbClr r="0" g="0" b="0"/>
-      </a:lnRef>
-      <a:fillRef idx="1">
-        <a:scrgbClr r="0" g="0" b="0"/>
-      </a:fillRef>
-      <a:effectRef idx="0">
-        <a:scrgbClr r="0" g="0" b="0"/>
-      </a:effectRef>
-      <a:fontRef idx="minor">
-        <a:schemeClr val="lt1"/>
-      </a:fontRef>
-    </dgm:style>
-  </dgm:styleLbl>
-  <dgm:styleLbl name="parChTrans2D4">
-    <dgm:scene3d>
-      <a:camera prst="orthographicFront"/>
-      <a:lightRig rig="threePt" dir="t"/>
-    </dgm:scene3d>
-    <dgm:sp3d/>
-    <dgm:txPr/>
-    <dgm:style>
-      <a:lnRef idx="2">
-        <a:scrgbClr r="0" g="0" b="0"/>
-      </a:lnRef>
-      <a:fillRef idx="1">
-        <a:scrgbClr r="0" g="0" b="0"/>
-      </a:fillRef>
-      <a:effectRef idx="0">
-        <a:scrgbClr r="0" g="0" b="0"/>
-      </a:effectRef>
-      <a:fontRef idx="minor">
-        <a:schemeClr val="lt1"/>
-      </a:fontRef>
-    </dgm:style>
-  </dgm:styleLbl>
-  <dgm:styleLbl name="parChTrans1D1">
-    <dgm:scene3d>
-      <a:camera prst="orthographicFront"/>
-      <a:lightRig rig="threePt" dir="t"/>
-    </dgm:scene3d>
-    <dgm:sp3d/>
-    <dgm:txPr/>
-    <dgm:style>
-      <a:lnRef idx="2">
-        <a:scrgbClr r="0" g="0" b="0"/>
-      </a:lnRef>
-      <a:fillRef idx="0">
-        <a:scrgbClr r="0" g="0" b="0"/>
-      </a:fillRef>
-      <a:effectRef idx="0">
-        <a:scrgbClr r="0" g="0" b="0"/>
-      </a:effectRef>
-      <a:fontRef idx="minor"/>
-    </dgm:style>
-  </dgm:styleLbl>
-  <dgm:styleLbl name="parChTrans1D2">
-    <dgm:scene3d>
-      <a:camera prst="orthographicFront"/>
-      <a:lightRig rig="threePt" dir="t"/>
-    </dgm:scene3d>
-    <dgm:sp3d/>
-    <dgm:txPr/>
-    <dgm:style>
-      <a:lnRef idx="2">
-        <a:scrgbClr r="0" g="0" b="0"/>
-      </a:lnRef>
-      <a:fillRef idx="0">
-        <a:scrgbClr r="0" g="0" b="0"/>
-      </a:fillRef>
-      <a:effectRef idx="0">
-        <a:scrgbClr r="0" g="0" b="0"/>
-      </a:effectRef>
-      <a:fontRef idx="minor"/>
-    </dgm:style>
-  </dgm:styleLbl>
-  <dgm:styleLbl name="parChTrans1D3">
-    <dgm:scene3d>
-      <a:camera prst="orthographicFront"/>
-      <a:lightRig rig="threePt" dir="t"/>
-    </dgm:scene3d>
-    <dgm:sp3d/>
-    <dgm:txPr/>
-    <dgm:style>
-      <a:lnRef idx="2">
-        <a:scrgbClr r="0" g="0" b="0"/>
-      </a:lnRef>
-      <a:fillRef idx="0">
-        <a:scrgbClr r="0" g="0" b="0"/>
-      </a:fillRef>
-      <a:effectRef idx="0">
-        <a:scrgbClr r="0" g="0" b="0"/>
-      </a:effectRef>
-      <a:fontRef idx="minor"/>
-    </dgm:style>
-  </dgm:styleLbl>
-  <dgm:styleLbl name="parChTrans1D4">
-    <dgm:scene3d>
-      <a:camera prst="orthographicFront"/>
-      <a:lightRig rig="threePt" dir="t"/>
-    </dgm:scene3d>
-    <dgm:sp3d/>
-    <dgm:txPr/>
-    <dgm:style>
-      <a:lnRef idx="2">
-        <a:scrgbClr r="0" g="0" b="0"/>
-      </a:lnRef>
-      <a:fillRef idx="0">
-        <a:scrgbClr r="0" g="0" b="0"/>
-      </a:fillRef>
-      <a:effectRef idx="0">
-        <a:scrgbClr r="0" g="0" b="0"/>
-      </a:effectRef>
-      <a:fontRef idx="minor"/>
-    </dgm:style>
-  </dgm:styleLbl>
-  <dgm:styleLbl name="fgAcc1">
-    <dgm:scene3d>
-      <a:camera prst="orthographicFront"/>
-      <a:lightRig rig="threePt" dir="t"/>
-    </dgm:scene3d>
-    <dgm:sp3d/>
-    <dgm:txPr/>
-    <dgm:style>
-      <a:lnRef idx="2">
-        <a:scrgbClr r="0" g="0" b="0"/>
-      </a:lnRef>
-      <a:fillRef idx="1">
-        <a:scrgbClr r="0" g="0" b="0"/>
-      </a:fillRef>
-      <a:effectRef idx="0">
-        <a:scrgbClr r="0" g="0" b="0"/>
-      </a:effectRef>
-      <a:fontRef idx="minor"/>
-    </dgm:style>
-  </dgm:styleLbl>
-  <dgm:styleLbl name="conFgAcc1">
-    <dgm:scene3d>
-      <a:camera prst="orthographicFront"/>
-      <a:lightRig rig="threePt" dir="t"/>
-    </dgm:scene3d>
-    <dgm:sp3d/>
-    <dgm:txPr/>
-    <dgm:style>
-      <a:lnRef idx="2">
-        <a:scrgbClr r="0" g="0" b="0"/>
-      </a:lnRef>
-      <a:fillRef idx="1">
-        <a:scrgbClr r="0" g="0" b="0"/>
-      </a:fillRef>
-      <a:effectRef idx="0">
-        <a:scrgbClr r="0" g="0" b="0"/>
-      </a:effectRef>
-      <a:fontRef idx="minor"/>
-    </dgm:style>
-  </dgm:styleLbl>
-  <dgm:styleLbl name="alignAcc1">
-    <dgm:scene3d>
-      <a:camera prst="orthographicFront"/>
-      <a:lightRig rig="threePt" dir="t"/>
-    </dgm:scene3d>
-    <dgm:sp3d/>
-    <dgm:txPr/>
-    <dgm:style>
-      <a:lnRef idx="2">
-        <a:scrgbClr r="0" g="0" b="0"/>
-      </a:lnRef>
-      <a:fillRef idx="1">
-        <a:scrgbClr r="0" g="0" b="0"/>
-      </a:fillRef>
-      <a:effectRef idx="0">
-        <a:scrgbClr r="0" g="0" b="0"/>
-      </a:effectRef>
-      <a:fontRef idx="minor"/>
-    </dgm:style>
-  </dgm:styleLbl>
-  <dgm:styleLbl name="trAlignAcc1">
-    <dgm:scene3d>
-      <a:camera prst="orthographicFront"/>
-      <a:lightRig rig="threePt" dir="t"/>
-    </dgm:scene3d>
-    <dgm:sp3d/>
-    <dgm:txPr/>
-    <dgm:style>
-      <a:lnRef idx="1">
-        <a:scrgbClr r="0" g="0" b="0"/>
-      </a:lnRef>
-      <a:fillRef idx="1">
-        <a:scrgbClr r="0" g="0" b="0"/>
-      </a:fillRef>
-      <a:effectRef idx="0">
-        <a:scrgbClr r="0" g="0" b="0"/>
-      </a:effectRef>
-      <a:fontRef idx="minor"/>
-    </dgm:style>
-  </dgm:styleLbl>
-  <dgm:styleLbl name="bgAcc1">
-    <dgm:scene3d>
-      <a:camera prst="orthographicFront"/>
-      <a:lightRig rig="threePt" dir="t"/>
-    </dgm:scene3d>
-    <dgm:sp3d/>
-    <dgm:txPr/>
-    <dgm:style>
-      <a:lnRef idx="2">
-        <a:scrgbClr r="0" g="0" b="0"/>
-      </a:lnRef>
-      <a:fillRef idx="1">
-        <a:scrgbClr r="0" g="0" b="0"/>
-      </a:fillRef>
-      <a:effectRef idx="0">
-        <a:scrgbClr r="0" g="0" b="0"/>
-      </a:effectRef>
-      <a:fontRef idx="minor"/>
-    </dgm:style>
-  </dgm:styleLbl>
-  <dgm:styleLbl name="solidFgAcc1">
-    <dgm:scene3d>
-      <a:camera prst="orthographicFront"/>
-      <a:lightRig rig="threePt" dir="t"/>
-    </dgm:scene3d>
-    <dgm:sp3d/>
-    <dgm:txPr/>
-    <dgm:style>
-      <a:lnRef idx="2">
-        <a:scrgbClr r="0" g="0" b="0"/>
-      </a:lnRef>
-      <a:fillRef idx="1">
-        <a:scrgbClr r="0" g="0" b="0"/>
-      </a:fillRef>
-      <a:effectRef idx="0">
-        <a:scrgbClr r="0" g="0" b="0"/>
-      </a:effectRef>
-      <a:fontRef idx="minor"/>
-    </dgm:style>
-  </dgm:styleLbl>
-  <dgm:styleLbl name="solidAlignAcc1">
-    <dgm:scene3d>
-      <a:camera prst="orthographicFront"/>
-      <a:lightRig rig="threePt" dir="t"/>
-    </dgm:scene3d>
-    <dgm:sp3d/>
-    <dgm:txPr/>
-    <dgm:style>
-      <a:lnRef idx="2">
-        <a:scrgbClr r="0" g="0" b="0"/>
-      </a:lnRef>
-      <a:fillRef idx="1">
-        <a:scrgbClr r="0" g="0" b="0"/>
-      </a:fillRef>
-      <a:effectRef idx="0">
-        <a:scrgbClr r="0" g="0" b="0"/>
-      </a:effectRef>
-      <a:fontRef idx="minor"/>
-    </dgm:style>
-  </dgm:styleLbl>
-  <dgm:styleLbl name="solidBgAcc1">
-    <dgm:scene3d>
-      <a:camera prst="orthographicFront"/>
-      <a:lightRig rig="threePt" dir="t"/>
-    </dgm:scene3d>
-    <dgm:sp3d/>
-    <dgm:txPr/>
-    <dgm:style>
-      <a:lnRef idx="2">
-        <a:scrgbClr r="0" g="0" b="0"/>
-      </a:lnRef>
-      <a:fillRef idx="1">
-        <a:scrgbClr r="0" g="0" b="0"/>
-      </a:fillRef>
-      <a:effectRef idx="0">
-        <a:scrgbClr r="0" g="0" b="0"/>
-      </a:effectRef>
-      <a:fontRef idx="minor"/>
-    </dgm:style>
-  </dgm:styleLbl>
-  <dgm:styleLbl name="fgAccFollowNode1">
-    <dgm:scene3d>
-      <a:camera prst="orthographicFront"/>
-      <a:lightRig rig="threePt" dir="t"/>
-    </dgm:scene3d>
-    <dgm:sp3d/>
-    <dgm:txPr/>
-    <dgm:style>
-      <a:lnRef idx="2">
-        <a:scrgbClr r="0" g="0" b="0"/>
-      </a:lnRef>
-      <a:fillRef idx="1">
-        <a:scrgbClr r="0" g="0" b="0"/>
-      </a:fillRef>
-      <a:effectRef idx="0">
-        <a:scrgbClr r="0" g="0" b="0"/>
-      </a:effectRef>
-      <a:fontRef idx="minor"/>
-    </dgm:style>
-  </dgm:styleLbl>
-  <dgm:styleLbl name="alignAccFollowNode1">
-    <dgm:scene3d>
-      <a:camera prst="orthographicFront"/>
-      <a:lightRig rig="threePt" dir="t"/>
-    </dgm:scene3d>
-    <dgm:sp3d/>
-    <dgm:txPr/>
-    <dgm:style>
-      <a:lnRef idx="2">
-        <a:scrgbClr r="0" g="0" b="0"/>
-      </a:lnRef>
-      <a:fillRef idx="1">
-        <a:scrgbClr r="0" g="0" b="0"/>
-      </a:fillRef>
-      <a:effectRef idx="0">
-        <a:scrgbClr r="0" g="0" b="0"/>
-      </a:effectRef>
-      <a:fontRef idx="minor"/>
-    </dgm:style>
-  </dgm:styleLbl>
-  <dgm:styleLbl name="bgAccFollowNode1">
-    <dgm:scene3d>
-      <a:camera prst="orthographicFront"/>
-      <a:lightRig rig="threePt" dir="t"/>
-    </dgm:scene3d>
-    <dgm:sp3d/>
-    <dgm:txPr/>
-    <dgm:style>
-      <a:lnRef idx="2">
-        <a:scrgbClr r="0" g="0" b="0"/>
-      </a:lnRef>
-      <a:fillRef idx="1">
-        <a:scrgbClr r="0" g="0" b="0"/>
-      </a:fillRef>
-      <a:effectRef idx="0">
-        <a:scrgbClr r="0" g="0" b="0"/>
-      </a:effectRef>
-      <a:fontRef idx="minor"/>
-    </dgm:style>
-  </dgm:styleLbl>
-  <dgm:styleLbl name="fgAcc0">
-    <dgm:scene3d>
-      <a:camera prst="orthographicFront"/>
-      <a:lightRig rig="threePt" dir="t"/>
-    </dgm:scene3d>
-    <dgm:sp3d/>
-    <dgm:txPr/>
-    <dgm:style>
-      <a:lnRef idx="2">
-        <a:scrgbClr r="0" g="0" b="0"/>
-      </a:lnRef>
-      <a:fillRef idx="1">
-        <a:scrgbClr r="0" g="0" b="0"/>
-      </a:fillRef>
-      <a:effectRef idx="0">
-        <a:scrgbClr r="0" g="0" b="0"/>
-      </a:effectRef>
-      <a:fontRef idx="minor"/>
-    </dgm:style>
-  </dgm:styleLbl>
-  <dgm:styleLbl name="fgAcc2">
-    <dgm:scene3d>
-      <a:camera prst="orthographicFront"/>
-      <a:lightRig rig="threePt" dir="t"/>
-    </dgm:scene3d>
-    <dgm:sp3d/>
-    <dgm:txPr/>
-    <dgm:style>
-      <a:lnRef idx="2">
-        <a:scrgbClr r="0" g="0" b="0"/>
-      </a:lnRef>
-      <a:fillRef idx="1">
-        <a:scrgbClr r="0" g="0" b="0"/>
-      </a:fillRef>
-      <a:effectRef idx="0">
-        <a:scrgbClr r="0" g="0" b="0"/>
-      </a:effectRef>
-      <a:fontRef idx="minor"/>
-    </dgm:style>
-  </dgm:styleLbl>
-  <dgm:styleLbl name="fgAcc3">
-    <dgm:scene3d>
-      <a:camera prst="orthographicFront"/>
-      <a:lightRig rig="threePt" dir="t"/>
-    </dgm:scene3d>
-    <dgm:sp3d/>
-    <dgm:txPr/>
-    <dgm:style>
-      <a:lnRef idx="2">
-        <a:scrgbClr r="0" g="0" b="0"/>
-      </a:lnRef>
-      <a:fillRef idx="1">
-        <a:scrgbClr r="0" g="0" b="0"/>
-      </a:fillRef>
-      <a:effectRef idx="0">
-        <a:scrgbClr r="0" g="0" b="0"/>
-      </a:effectRef>
-      <a:fontRef idx="minor"/>
-    </dgm:style>
-  </dgm:styleLbl>
-  <dgm:styleLbl name="fgAcc4">
-    <dgm:scene3d>
-      <a:camera prst="orthographicFront"/>
-      <a:lightRig rig="threePt" dir="t"/>
-    </dgm:scene3d>
-    <dgm:sp3d/>
-    <dgm:txPr/>
-    <dgm:style>
-      <a:lnRef idx="2">
-        <a:scrgbClr r="0" g="0" b="0"/>
-      </a:lnRef>
-      <a:fillRef idx="1">
-        <a:scrgbClr r="0" g="0" b="0"/>
-      </a:fillRef>
-      <a:effectRef idx="0">
-        <a:scrgbClr r="0" g="0" b="0"/>
-      </a:effectRef>
-      <a:fontRef idx="minor"/>
-    </dgm:style>
-  </dgm:styleLbl>
-  <dgm:styleLbl name="bgShp">
-    <dgm:scene3d>
-      <a:camera prst="orthographicFront"/>
-      <a:lightRig rig="threePt" dir="t"/>
-    </dgm:scene3d>
-    <dgm:sp3d/>
-    <dgm:txPr/>
-    <dgm:style>
-      <a:lnRef idx="0">
-        <a:scrgbClr r="0" g="0" b="0"/>
-      </a:lnRef>
-      <a:fillRef idx="1">
-        <a:scrgbClr r="0" g="0" b="0"/>
-      </a:fillRef>
-      <a:effectRef idx="0">
-        <a:scrgbClr r="0" g="0" b="0"/>
-      </a:effectRef>
-      <a:fontRef idx="minor"/>
-    </dgm:style>
-  </dgm:styleLbl>
-  <dgm:styleLbl name="dkBgShp">
-    <dgm:scene3d>
-      <a:camera prst="orthographicFront"/>
-      <a:lightRig rig="threePt" dir="t"/>
-    </dgm:scene3d>
-    <dgm:sp3d/>
-    <dgm:txPr/>
-    <dgm:style>
-      <a:lnRef idx="0">
-        <a:scrgbClr r="0" g="0" b="0"/>
-      </a:lnRef>
-      <a:fillRef idx="1">
-        <a:scrgbClr r="0" g="0" b="0"/>
-      </a:fillRef>
-      <a:effectRef idx="0">
-        <a:scrgbClr r="0" g="0" b="0"/>
-      </a:effectRef>
-      <a:fontRef idx="minor"/>
-    </dgm:style>
-  </dgm:styleLbl>
-  <dgm:styleLbl name="trBgShp">
-    <dgm:scene3d>
-      <a:camera prst="orthographicFront"/>
-      <a:lightRig rig="threePt" dir="t"/>
-    </dgm:scene3d>
-    <dgm:sp3d/>
-    <dgm:txPr/>
-    <dgm:style>
-      <a:lnRef idx="0">
-        <a:scrgbClr r="0" g="0" b="0"/>
-      </a:lnRef>
-      <a:fillRef idx="1">
-        <a:scrgbClr r="0" g="0" b="0"/>
-      </a:fillRef>
-      <a:effectRef idx="0">
-        <a:scrgbClr r="0" g="0" b="0"/>
-      </a:effectRef>
-      <a:fontRef idx="minor"/>
-    </dgm:style>
-  </dgm:styleLbl>
-  <dgm:styleLbl name="fgShp">
-    <dgm:scene3d>
-      <a:camera prst="orthographicFront"/>
-      <a:lightRig rig="threePt" dir="t"/>
-    </dgm:scene3d>
-    <dgm:sp3d/>
-    <dgm:txPr/>
-    <dgm:style>
-      <a:lnRef idx="2">
-        <a:scrgbClr r="0" g="0" b="0"/>
-      </a:lnRef>
-      <a:fillRef idx="1">
-        <a:scrgbClr r="0" g="0" b="0"/>
-      </a:fillRef>
-      <a:effectRef idx="0">
-        <a:scrgbClr r="0" g="0" b="0"/>
-      </a:effectRef>
-      <a:fontRef idx="minor"/>
-    </dgm:style>
-  </dgm:styleLbl>
-  <dgm:styleLbl name="revTx">
-    <dgm:scene3d>
-      <a:camera prst="orthographicFront"/>
-      <a:lightRig rig="threePt" dir="t"/>
-    </dgm:scene3d>
-    <dgm:sp3d/>
-    <dgm:txPr/>
-    <dgm:style>
-      <a:lnRef idx="0">
-        <a:scrgbClr r="0" g="0" b="0"/>
-      </a:lnRef>
-      <a:fillRef idx="0">
-        <a:scrgbClr r="0" g="0" b="0"/>
-      </a:fillRef>
-      <a:effectRef idx="0">
-        <a:scrgbClr r="0" g="0" b="0"/>
-      </a:effectRef>
-      <a:fontRef idx="minor"/>
-    </dgm:style>
-  </dgm:styleLbl>
-</dgm:styleDef>
-</file>
-
-<file path=ppt/diagrams/quickStyle4.xml><?xml version="1.0" encoding="utf-8"?>
 <dgm:styleDef xmlns:dgm="http://schemas.openxmlformats.org/drawingml/2006/diagram" xmlns:a="http://schemas.openxmlformats.org/drawingml/2006/main" uniqueId="urn:microsoft.com/office/officeart/2005/8/quickstyle/simple1">
   <dgm:title val=""/>
   <dgm:desc val=""/>
@@ -12782,7 +9684,7 @@
           <a:p>
             <a:fld id="{EA0C0817-A112-4847-8014-A94B7D2A4EA3}" type="datetime1">
               <a:rPr lang="en-US" smtClean="0"/>
-              <a:t>12/2/2019</a:t>
+              <a:t>12/2/19</a:t>
             </a:fld>
             <a:endParaRPr lang="en-US" dirty="0"/>
           </a:p>
@@ -12984,7 +9886,7 @@
           <a:p>
             <a:fld id="{134F40B7-36AB-4376-BE14-EF7004D79BB9}" type="datetime1">
               <a:rPr lang="en-US" smtClean="0"/>
-              <a:t>12/2/2019</a:t>
+              <a:t>12/2/19</a:t>
             </a:fld>
             <a:endParaRPr lang="en-US"/>
           </a:p>
@@ -13164,7 +10066,7 @@
           <a:p>
             <a:fld id="{FF87CAB8-DCAE-46A5-AADA-B3FAD11A54E0}" type="datetime1">
               <a:rPr lang="en-US" smtClean="0"/>
-              <a:t>12/2/2019</a:t>
+              <a:t>12/2/19</a:t>
             </a:fld>
             <a:endParaRPr lang="en-US"/>
           </a:p>
@@ -13334,7 +10236,7 @@
           <a:p>
             <a:fld id="{7332B432-ACDA-4023-A761-2BAB76577B62}" type="datetime1">
               <a:rPr lang="en-US" smtClean="0"/>
-              <a:t>12/2/2019</a:t>
+              <a:t>12/2/19</a:t>
             </a:fld>
             <a:endParaRPr lang="en-US"/>
           </a:p>
@@ -13933,7 +10835,7 @@
           <a:p>
             <a:fld id="{D9C646AA-F36E-4540-911D-FFFC0A0EF24A}" type="datetime1">
               <a:rPr lang="en-US" smtClean="0"/>
-              <a:t>12/2/2019</a:t>
+              <a:t>12/2/19</a:t>
             </a:fld>
             <a:endParaRPr lang="en-US" dirty="0"/>
           </a:p>
@@ -14253,7 +11155,7 @@
           <a:p>
             <a:fld id="{69186D26-FA5F-4637-B602-B7C2DC34CFD4}" type="datetime1">
               <a:rPr lang="en-US" smtClean="0"/>
-              <a:t>12/2/2019</a:t>
+              <a:t>12/2/19</a:t>
             </a:fld>
             <a:endParaRPr lang="en-US"/>
           </a:p>
@@ -14688,7 +11590,7 @@
           <a:p>
             <a:fld id="{8A7F15D8-96D1-4781-BC50-CA8A088B2FE4}" type="datetime1">
               <a:rPr lang="en-US" smtClean="0"/>
-              <a:t>12/2/2019</a:t>
+              <a:t>12/2/19</a:t>
             </a:fld>
             <a:endParaRPr lang="en-US"/>
           </a:p>
@@ -14806,7 +11708,7 @@
           <a:p>
             <a:fld id="{F9A96C99-B8F8-4528-BD05-0E16E943DC09}" type="datetime1">
               <a:rPr lang="en-US" smtClean="0"/>
-              <a:t>12/2/2019</a:t>
+              <a:t>12/2/19</a:t>
             </a:fld>
             <a:endParaRPr lang="en-US"/>
           </a:p>
@@ -14901,7 +11803,7 @@
           <a:p>
             <a:fld id="{03636942-C211-4B28-8DBD-C953E00AF71B}" type="datetime1">
               <a:rPr lang="en-US" smtClean="0"/>
-              <a:t>12/2/2019</a:t>
+              <a:t>12/2/19</a:t>
             </a:fld>
             <a:endParaRPr lang="en-US"/>
           </a:p>
@@ -15318,7 +12220,7 @@
           <a:p>
             <a:fld id="{7E8D12A6-918A-48BD-8CB9-CA713993B0EA}" type="datetime1">
               <a:rPr lang="en-US" smtClean="0"/>
-              <a:t>12/2/2019</a:t>
+              <a:t>12/2/19</a:t>
             </a:fld>
             <a:endParaRPr lang="en-US"/>
           </a:p>
@@ -15580,7 +12482,7 @@
             <a:fld id="{E778CE86-875F-4587-BCF6-FA054AFC0D53}" type="datetime1">
               <a:rPr lang="en-US" smtClean="0"/>
               <a:pPr/>
-              <a:t>12/2/2019</a:t>
+              <a:t>12/2/19</a:t>
             </a:fld>
             <a:endParaRPr lang="en-US" dirty="0"/>
           </a:p>
@@ -16096,7 +12998,7 @@
           <a:p>
             <a:fld id="{F6FA2B21-3FCD-4721-B95C-427943F61125}" type="datetime1">
               <a:rPr lang="en-US" smtClean="0"/>
-              <a:t>12/2/2019</a:t>
+              <a:t>12/2/19</a:t>
             </a:fld>
             <a:endParaRPr lang="en-US"/>
           </a:p>
@@ -16865,6 +13767,145 @@
 <file path=ppt/slides/slide10.xml><?xml version="1.0" encoding="utf-8"?>
 <p:sld xmlns:a="http://schemas.openxmlformats.org/drawingml/2006/main" xmlns:r="http://schemas.openxmlformats.org/officeDocument/2006/relationships" xmlns:p="http://schemas.openxmlformats.org/presentationml/2006/main">
   <p:cSld>
+    <p:spTree>
+      <p:nvGrpSpPr>
+        <p:cNvPr id="1" name=""/>
+        <p:cNvGrpSpPr/>
+        <p:nvPr/>
+      </p:nvGrpSpPr>
+      <p:grpSpPr>
+        <a:xfrm>
+          <a:off x="0" y="0"/>
+          <a:ext cx="0" cy="0"/>
+          <a:chOff x="0" y="0"/>
+          <a:chExt cx="0" cy="0"/>
+        </a:xfrm>
+      </p:grpSpPr>
+      <p:sp>
+        <p:nvSpPr>
+          <p:cNvPr id="2" name="Title 1">
+            <a:extLst>
+              <a:ext uri="{FF2B5EF4-FFF2-40B4-BE49-F238E27FC236}">
+                <a16:creationId xmlns:a16="http://schemas.microsoft.com/office/drawing/2014/main" id="{911CAB4A-5F12-7D4F-B2E4-59E47AA2A522}"/>
+              </a:ext>
+            </a:extLst>
+          </p:cNvPr>
+          <p:cNvSpPr>
+            <a:spLocks noGrp="1"/>
+          </p:cNvSpPr>
+          <p:nvPr>
+            <p:ph type="title"/>
+          </p:nvPr>
+        </p:nvSpPr>
+        <p:spPr/>
+        <p:txBody>
+          <a:bodyPr/>
+          <a:lstStyle/>
+          <a:p>
+            <a:r>
+              <a:rPr lang="en-US" dirty="0"/>
+              <a:t>What We Learned</a:t>
+            </a:r>
+          </a:p>
+        </p:txBody>
+      </p:sp>
+      <p:sp>
+        <p:nvSpPr>
+          <p:cNvPr id="3" name="Content Placeholder 2">
+            <a:extLst>
+              <a:ext uri="{FF2B5EF4-FFF2-40B4-BE49-F238E27FC236}">
+                <a16:creationId xmlns:a16="http://schemas.microsoft.com/office/drawing/2014/main" id="{5F889957-674F-B747-B37B-1B18BA2ECA64}"/>
+              </a:ext>
+            </a:extLst>
+          </p:cNvPr>
+          <p:cNvSpPr>
+            <a:spLocks noGrp="1"/>
+          </p:cNvSpPr>
+          <p:nvPr>
+            <p:ph idx="1"/>
+          </p:nvPr>
+        </p:nvSpPr>
+        <p:spPr/>
+        <p:txBody>
+          <a:bodyPr/>
+          <a:lstStyle/>
+          <a:p>
+            <a:r>
+              <a:rPr lang="en-US" dirty="0"/>
+              <a:t>Git</a:t>
+            </a:r>
+          </a:p>
+          <a:p>
+            <a:pPr lvl="1"/>
+            <a:r>
+              <a:rPr lang="en-US" dirty="0"/>
+              <a:t>Integration into ROS</a:t>
+            </a:r>
+          </a:p>
+          <a:p>
+            <a:pPr lvl="1"/>
+            <a:r>
+              <a:rPr lang="en-US" dirty="0"/>
+              <a:t>VIM and how to publish</a:t>
+            </a:r>
+          </a:p>
+          <a:p>
+            <a:r>
+              <a:rPr lang="en-US" dirty="0"/>
+              <a:t>ROS</a:t>
+            </a:r>
+          </a:p>
+          <a:p>
+            <a:pPr lvl="1"/>
+            <a:r>
+              <a:rPr lang="en-US" dirty="0"/>
+              <a:t>How to send messages to the arm motors</a:t>
+            </a:r>
+          </a:p>
+          <a:p>
+            <a:pPr lvl="1"/>
+            <a:r>
+              <a:rPr lang="en-US" dirty="0"/>
+              <a:t>Simulation vs. actual arm testing</a:t>
+            </a:r>
+          </a:p>
+          <a:p>
+            <a:pPr lvl="1"/>
+            <a:r>
+              <a:rPr lang="en-US" dirty="0"/>
+              <a:t>Structure of messages</a:t>
+            </a:r>
+          </a:p>
+          <a:p>
+            <a:r>
+              <a:rPr lang="en-US" dirty="0"/>
+              <a:t>Hardware setup</a:t>
+            </a:r>
+          </a:p>
+          <a:p>
+            <a:r>
+              <a:rPr lang="en-US" dirty="0"/>
+              <a:t>The Beauty of Improvisation</a:t>
+            </a:r>
+          </a:p>
+        </p:txBody>
+      </p:sp>
+    </p:spTree>
+    <p:extLst>
+      <p:ext uri="{BB962C8B-B14F-4D97-AF65-F5344CB8AC3E}">
+        <p14:creationId xmlns:p14="http://schemas.microsoft.com/office/powerpoint/2010/main" val="3607730106"/>
+      </p:ext>
+    </p:extLst>
+  </p:cSld>
+  <p:clrMapOvr>
+    <a:masterClrMapping/>
+  </p:clrMapOvr>
+</p:sld>
+</file>
+
+<file path=ppt/slides/slide11.xml><?xml version="1.0" encoding="utf-8"?>
+<p:sld xmlns:a="http://schemas.openxmlformats.org/drawingml/2006/main" xmlns:r="http://schemas.openxmlformats.org/officeDocument/2006/relationships" xmlns:p="http://schemas.openxmlformats.org/presentationml/2006/main">
+  <p:cSld>
     <p:bg>
       <p:bgPr>
         <a:solidFill>
@@ -18147,36 +15188,65 @@
         </p:nvSpPr>
         <p:spPr/>
         <p:txBody>
-          <a:bodyPr/>
+          <a:bodyPr>
+            <a:normAutofit/>
+          </a:bodyPr>
           <a:lstStyle/>
           <a:p>
             <a:r>
               <a:rPr lang="en-US" sz="2400" dirty="0"/>
-              <a:t>When a robot points, how does precision affect human interpretation of where an object would be?</a:t>
+              <a:t>How precisely can humans determine where a robot is pointing? </a:t>
             </a:r>
           </a:p>
           <a:p>
-            <a:endParaRPr lang="en-US" dirty="0"/>
+            <a:endParaRPr lang="en-US" sz="2400" dirty="0"/>
           </a:p>
           <a:p>
             <a:r>
               <a:rPr lang="en-US" sz="2400" dirty="0"/>
-              <a:t>What we measure:</a:t>
+              <a:t>2 Studies</a:t>
             </a:r>
           </a:p>
           <a:p>
-            <a:pPr lvl="1"/>
+            <a:pPr marL="457200" indent="-457200">
+              <a:buFont typeface="+mj-lt"/>
+              <a:buAutoNum type="arabicPeriod"/>
+            </a:pPr>
             <a:r>
-              <a:rPr lang="en-US" sz="1800" dirty="0"/>
-              <a:t>Deviation vs. Human Confidence</a:t>
+              <a:rPr lang="en-US" sz="2400" dirty="0"/>
+              <a:t>Identifying a region being pointed at</a:t>
             </a:r>
           </a:p>
           <a:p>
-            <a:pPr lvl="1"/>
+            <a:pPr marL="457200" indent="-457200">
+              <a:buFont typeface="+mj-lt"/>
+              <a:buAutoNum type="arabicPeriod"/>
+            </a:pPr>
             <a:r>
-              <a:rPr lang="en-US" sz="1800" dirty="0"/>
-              <a:t>Pointing with a laser (precision handicap) at a target vs. pointing without a laser (natural pointing) at a target</a:t>
+              <a:rPr lang="en-US" sz="2400" dirty="0"/>
+              <a:t>Identifying a point being pointed at</a:t>
             </a:r>
+            <a:endParaRPr lang="en-US" sz="2000" dirty="0"/>
+          </a:p>
+          <a:p>
+            <a:endParaRPr lang="en-US" sz="2000" dirty="0"/>
+          </a:p>
+          <a:p>
+            <a:pPr marL="617220" lvl="1" indent="-342900">
+              <a:buFont typeface="+mj-lt"/>
+              <a:buAutoNum type="arabicPeriod"/>
+            </a:pPr>
+            <a:endParaRPr lang="en-US" sz="1800" dirty="0"/>
+          </a:p>
+          <a:p>
+            <a:pPr marL="617220" lvl="1" indent="-342900">
+              <a:buFont typeface="+mj-lt"/>
+              <a:buAutoNum type="arabicPeriod"/>
+            </a:pPr>
+            <a:endParaRPr lang="en-US" sz="1800" dirty="0"/>
+          </a:p>
+          <a:p>
+            <a:endParaRPr lang="en-US" sz="2000" dirty="0"/>
           </a:p>
           <a:p>
             <a:endParaRPr lang="en-US" dirty="0"/>
@@ -18199,14 +15269,6 @@
 <file path=ppt/slides/slide6.xml><?xml version="1.0" encoding="utf-8"?>
 <p:sld xmlns:a="http://schemas.openxmlformats.org/drawingml/2006/main" xmlns:r="http://schemas.openxmlformats.org/officeDocument/2006/relationships" xmlns:p="http://schemas.openxmlformats.org/presentationml/2006/main">
   <p:cSld>
-    <p:bg>
-      <p:bgPr>
-        <a:solidFill>
-          <a:schemeClr val="bg1"/>
-        </a:solidFill>
-        <a:effectLst/>
-      </p:bgPr>
-    </p:bg>
     <p:spTree>
       <p:nvGrpSpPr>
         <p:cNvPr id="1" name=""/>
@@ -18226,7 +15288,7 @@
           <p:cNvPr id="2" name="Title 1">
             <a:extLst>
               <a:ext uri="{FF2B5EF4-FFF2-40B4-BE49-F238E27FC236}">
-                <a16:creationId xmlns:a16="http://schemas.microsoft.com/office/drawing/2014/main" id="{2061DF96-8C7B-0B4B-BEFA-DCA1FE76D720}"/>
+                <a16:creationId xmlns:a16="http://schemas.microsoft.com/office/drawing/2014/main" id="{DBCD5C28-A1DB-D446-8DB7-77AF316CFC4E}"/>
               </a:ext>
             </a:extLst>
           </p:cNvPr>
@@ -18237,33 +15299,179 @@
             <p:ph type="title"/>
           </p:nvPr>
         </p:nvSpPr>
+        <p:spPr/>
+        <p:txBody>
+          <a:bodyPr/>
+          <a:lstStyle/>
+          <a:p>
+            <a:r>
+              <a:rPr lang="en-US" dirty="0"/>
+              <a:t>Study Procedure</a:t>
+            </a:r>
+          </a:p>
+        </p:txBody>
+      </p:sp>
+      <p:sp>
+        <p:nvSpPr>
+          <p:cNvPr id="3" name="Content Placeholder 2">
+            <a:extLst>
+              <a:ext uri="{FF2B5EF4-FFF2-40B4-BE49-F238E27FC236}">
+                <a16:creationId xmlns:a16="http://schemas.microsoft.com/office/drawing/2014/main" id="{79F26FF7-6685-C84D-99F1-6076E524FE29}"/>
+              </a:ext>
+            </a:extLst>
+          </p:cNvPr>
+          <p:cNvSpPr>
+            <a:spLocks noGrp="1"/>
+          </p:cNvSpPr>
+          <p:nvPr>
+            <p:ph idx="1"/>
+          </p:nvPr>
+        </p:nvSpPr>
         <p:spPr>
           <a:xfrm>
-            <a:off x="1066800" y="642594"/>
-            <a:ext cx="10058400" cy="1371600"/>
+            <a:off x="4071256" y="1687286"/>
+            <a:ext cx="7587344" cy="4702628"/>
           </a:xfrm>
         </p:spPr>
         <p:txBody>
           <a:bodyPr>
-            <a:normAutofit/>
+            <a:normAutofit fontScale="92500" lnSpcReduction="20000"/>
           </a:bodyPr>
           <a:lstStyle/>
           <a:p>
-            <a:pPr algn="ctr"/>
             <a:r>
-              <a:rPr lang="en-US" dirty="0"/>
-              <a:t>Study Design</a:t>
+              <a:rPr lang="en-US" sz="2400" dirty="0"/>
+              <a:t>Study 1: Region Identification</a:t>
             </a:r>
-            <a:endParaRPr lang="en-US"/>
+          </a:p>
+          <a:p>
+            <a:pPr lvl="1"/>
+            <a:r>
+              <a:rPr lang="en-US" sz="1800" dirty="0"/>
+              <a:t>Participant stands directly behind arm.</a:t>
+            </a:r>
+          </a:p>
+          <a:p>
+            <a:pPr marL="617220" lvl="1" indent="-342900">
+              <a:buFont typeface="+mj-lt"/>
+              <a:buAutoNum type="arabicPeriod"/>
+            </a:pPr>
+            <a:r>
+              <a:rPr lang="en-US" sz="1800" dirty="0"/>
+              <a:t>Robot naturally points to 1 of 9 regions on a whiteboard.</a:t>
+            </a:r>
+          </a:p>
+          <a:p>
+            <a:pPr marL="617220" lvl="1" indent="-342900">
+              <a:buFont typeface="+mj-lt"/>
+              <a:buAutoNum type="arabicPeriod"/>
+            </a:pPr>
+            <a:r>
+              <a:rPr lang="en-US" sz="1800" dirty="0"/>
+              <a:t>Participants decide what region the robot is pointing.</a:t>
+            </a:r>
+          </a:p>
+          <a:p>
+            <a:pPr marL="617220" lvl="1" indent="-342900">
+              <a:buFont typeface="+mj-lt"/>
+              <a:buAutoNum type="arabicPeriod"/>
+            </a:pPr>
+            <a:r>
+              <a:rPr lang="en-US" sz="1800" dirty="0"/>
+              <a:t>Participants are asked how confident they are in their response.</a:t>
+            </a:r>
+          </a:p>
+          <a:p>
+            <a:pPr marL="617220" lvl="1" indent="-342900">
+              <a:buFont typeface="+mj-lt"/>
+              <a:buAutoNum type="arabicPeriod"/>
+            </a:pPr>
+            <a:r>
+              <a:rPr lang="en-US" sz="1800" dirty="0"/>
+              <a:t>A laser attached to the arm reveals to the participant precisely what position the robot was pointing.</a:t>
+            </a:r>
+          </a:p>
+          <a:p>
+            <a:pPr marL="617220" lvl="1" indent="-342900">
+              <a:buFont typeface="+mj-lt"/>
+              <a:buAutoNum type="arabicPeriod"/>
+            </a:pPr>
+            <a:r>
+              <a:rPr lang="en-US" sz="1800" dirty="0"/>
+              <a:t>Participant's correctness is recorded.</a:t>
+            </a:r>
+          </a:p>
+          <a:p>
+            <a:pPr marL="617220" lvl="1" indent="-342900">
+              <a:buFont typeface="+mj-lt"/>
+              <a:buAutoNum type="arabicPeriod"/>
+            </a:pPr>
+            <a:endParaRPr lang="en-US" sz="1800" dirty="0"/>
+          </a:p>
+          <a:p>
+            <a:r>
+              <a:rPr lang="en-US" sz="2500" dirty="0"/>
+              <a:t>Study 2: Point Identification</a:t>
+            </a:r>
+          </a:p>
+          <a:p>
+            <a:pPr lvl="1"/>
+            <a:r>
+              <a:rPr lang="en-US" sz="1800" dirty="0"/>
+              <a:t>Participant stands directly behind arm.</a:t>
+            </a:r>
+          </a:p>
+          <a:p>
+            <a:pPr marL="617220" lvl="1" indent="-342900">
+              <a:buFont typeface="+mj-lt"/>
+              <a:buAutoNum type="arabicPeriod"/>
+            </a:pPr>
+            <a:r>
+              <a:rPr lang="en-US" sz="1800" dirty="0"/>
+              <a:t>Robot naturally points to 1 of 3 targets on a whiteboard.</a:t>
+            </a:r>
+          </a:p>
+          <a:p>
+            <a:pPr marL="617220" lvl="1" indent="-342900">
+              <a:buFont typeface="+mj-lt"/>
+              <a:buAutoNum type="arabicPeriod"/>
+            </a:pPr>
+            <a:r>
+              <a:rPr lang="en-US" sz="1800" dirty="0"/>
+              <a:t>A participant then makes a decision about where the robot is pointing and marks on whiteboard.</a:t>
+            </a:r>
+          </a:p>
+          <a:p>
+            <a:pPr marL="617220" lvl="1" indent="-342900">
+              <a:buFont typeface="+mj-lt"/>
+              <a:buAutoNum type="arabicPeriod"/>
+            </a:pPr>
+            <a:r>
+              <a:rPr lang="en-US" sz="1800" dirty="0"/>
+              <a:t>A laser attached to the arm reveals to the participant precisely what position the robot was pointing.</a:t>
+            </a:r>
+          </a:p>
+          <a:p>
+            <a:pPr marL="617220" lvl="1" indent="-342900">
+              <a:buFont typeface="+mj-lt"/>
+              <a:buAutoNum type="arabicPeriod"/>
+            </a:pPr>
+            <a:r>
+              <a:rPr lang="en-US" sz="1800" dirty="0"/>
+              <a:t>Deviation from participant’s point to robot’s point is calculated.</a:t>
+            </a:r>
+          </a:p>
+          <a:p>
+            <a:endParaRPr lang="en-US" dirty="0"/>
           </a:p>
         </p:txBody>
       </p:sp>
       <p:graphicFrame>
         <p:nvGraphicFramePr>
-          <p:cNvPr id="5" name="Content Placeholder 2">
+          <p:cNvPr id="7" name="Table 6">
             <a:extLst>
               <a:ext uri="{FF2B5EF4-FFF2-40B4-BE49-F238E27FC236}">
-                <a16:creationId xmlns:a16="http://schemas.microsoft.com/office/drawing/2014/main" id="{F4A22D32-67BF-430E-B9B3-B77E97391E4E}"/>
+                <a16:creationId xmlns:a16="http://schemas.microsoft.com/office/drawing/2014/main" id="{7A5DD5FB-5419-824F-960D-3C8508F7B345}"/>
               </a:ext>
             </a:extLst>
           </p:cNvPr>
@@ -18271,333 +15479,465 @@
             <a:graphicFrameLocks noGrp="1"/>
           </p:cNvGraphicFramePr>
           <p:nvPr>
-            <p:ph idx="1"/>
             <p:extLst>
               <p:ext uri="{D42A27DB-BD31-4B8C-83A1-F6EECF244321}">
-                <p14:modId xmlns:p14="http://schemas.microsoft.com/office/powerpoint/2010/main" val="69485478"/>
+                <p14:modId xmlns:p14="http://schemas.microsoft.com/office/powerpoint/2010/main" val="1584199208"/>
               </p:ext>
             </p:extLst>
           </p:nvPr>
         </p:nvGraphicFramePr>
         <p:xfrm>
-          <a:off x="1066800" y="1793228"/>
-          <a:ext cx="10058400" cy="4422178"/>
+          <a:off x="1719943" y="2014194"/>
+          <a:ext cx="1502229" cy="1371600"/>
         </p:xfrm>
         <a:graphic>
-          <a:graphicData uri="http://schemas.openxmlformats.org/drawingml/2006/diagram">
-            <dgm:relIds xmlns:dgm="http://schemas.openxmlformats.org/drawingml/2006/diagram" xmlns:r="http://schemas.openxmlformats.org/officeDocument/2006/relationships" r:dm="rId2" r:lo="rId3" r:qs="rId4" r:cs="rId5"/>
+          <a:graphicData uri="http://schemas.openxmlformats.org/drawingml/2006/table">
+            <a:tbl>
+              <a:tblPr firstRow="1" bandRow="1">
+                <a:tableStyleId>{5940675A-B579-460E-94D1-54222C63F5DA}</a:tableStyleId>
+              </a:tblPr>
+              <a:tblGrid>
+                <a:gridCol w="500743">
+                  <a:extLst>
+                    <a:ext uri="{9D8B030D-6E8A-4147-A177-3AD203B41FA5}">
+                      <a16:colId xmlns:a16="http://schemas.microsoft.com/office/drawing/2014/main" val="2405571611"/>
+                    </a:ext>
+                  </a:extLst>
+                </a:gridCol>
+                <a:gridCol w="500743">
+                  <a:extLst>
+                    <a:ext uri="{9D8B030D-6E8A-4147-A177-3AD203B41FA5}">
+                      <a16:colId xmlns:a16="http://schemas.microsoft.com/office/drawing/2014/main" val="128416024"/>
+                    </a:ext>
+                  </a:extLst>
+                </a:gridCol>
+                <a:gridCol w="500743">
+                  <a:extLst>
+                    <a:ext uri="{9D8B030D-6E8A-4147-A177-3AD203B41FA5}">
+                      <a16:colId xmlns:a16="http://schemas.microsoft.com/office/drawing/2014/main" val="3699851742"/>
+                    </a:ext>
+                  </a:extLst>
+                </a:gridCol>
+              </a:tblGrid>
+              <a:tr h="457200">
+                <a:tc>
+                  <a:txBody>
+                    <a:bodyPr/>
+                    <a:lstStyle/>
+                    <a:p>
+                      <a:endParaRPr lang="en-US" dirty="0"/>
+                    </a:p>
+                  </a:txBody>
+                  <a:tcPr/>
+                </a:tc>
+                <a:tc>
+                  <a:txBody>
+                    <a:bodyPr/>
+                    <a:lstStyle/>
+                    <a:p>
+                      <a:endParaRPr lang="en-US"/>
+                    </a:p>
+                  </a:txBody>
+                  <a:tcPr/>
+                </a:tc>
+                <a:tc>
+                  <a:txBody>
+                    <a:bodyPr/>
+                    <a:lstStyle/>
+                    <a:p>
+                      <a:endParaRPr lang="en-US"/>
+                    </a:p>
+                  </a:txBody>
+                  <a:tcPr/>
+                </a:tc>
+                <a:extLst>
+                  <a:ext uri="{0D108BD9-81ED-4DB2-BD59-A6C34878D82A}">
+                    <a16:rowId xmlns:a16="http://schemas.microsoft.com/office/drawing/2014/main" val="1173199570"/>
+                  </a:ext>
+                </a:extLst>
+              </a:tr>
+              <a:tr h="457200">
+                <a:tc>
+                  <a:txBody>
+                    <a:bodyPr/>
+                    <a:lstStyle/>
+                    <a:p>
+                      <a:endParaRPr lang="en-US" dirty="0"/>
+                    </a:p>
+                  </a:txBody>
+                  <a:tcPr>
+                    <a:solidFill>
+                      <a:srgbClr val="C00000"/>
+                    </a:solidFill>
+                  </a:tcPr>
+                </a:tc>
+                <a:tc>
+                  <a:txBody>
+                    <a:bodyPr/>
+                    <a:lstStyle/>
+                    <a:p>
+                      <a:endParaRPr lang="en-US"/>
+                    </a:p>
+                  </a:txBody>
+                  <a:tcPr/>
+                </a:tc>
+                <a:tc>
+                  <a:txBody>
+                    <a:bodyPr/>
+                    <a:lstStyle/>
+                    <a:p>
+                      <a:endParaRPr lang="en-US"/>
+                    </a:p>
+                  </a:txBody>
+                  <a:tcPr/>
+                </a:tc>
+                <a:extLst>
+                  <a:ext uri="{0D108BD9-81ED-4DB2-BD59-A6C34878D82A}">
+                    <a16:rowId xmlns:a16="http://schemas.microsoft.com/office/drawing/2014/main" val="1258597865"/>
+                  </a:ext>
+                </a:extLst>
+              </a:tr>
+              <a:tr h="457200">
+                <a:tc>
+                  <a:txBody>
+                    <a:bodyPr/>
+                    <a:lstStyle/>
+                    <a:p>
+                      <a:endParaRPr lang="en-US"/>
+                    </a:p>
+                  </a:txBody>
+                  <a:tcPr/>
+                </a:tc>
+                <a:tc>
+                  <a:txBody>
+                    <a:bodyPr/>
+                    <a:lstStyle/>
+                    <a:p>
+                      <a:endParaRPr lang="en-US"/>
+                    </a:p>
+                  </a:txBody>
+                  <a:tcPr/>
+                </a:tc>
+                <a:tc>
+                  <a:txBody>
+                    <a:bodyPr/>
+                    <a:lstStyle/>
+                    <a:p>
+                      <a:endParaRPr lang="en-US" dirty="0"/>
+                    </a:p>
+                  </a:txBody>
+                  <a:tcPr/>
+                </a:tc>
+                <a:extLst>
+                  <a:ext uri="{0D108BD9-81ED-4DB2-BD59-A6C34878D82A}">
+                    <a16:rowId xmlns:a16="http://schemas.microsoft.com/office/drawing/2014/main" val="3241722126"/>
+                  </a:ext>
+                </a:extLst>
+              </a:tr>
+            </a:tbl>
           </a:graphicData>
         </a:graphic>
       </p:graphicFrame>
-      <p:grpSp>
-        <p:nvGrpSpPr>
-          <p:cNvPr id="4" name="Group 3">
+      <p:sp>
+        <p:nvSpPr>
+          <p:cNvPr id="8" name="Oval 7">
             <a:extLst>
               <a:ext uri="{FF2B5EF4-FFF2-40B4-BE49-F238E27FC236}">
-                <a16:creationId xmlns:a16="http://schemas.microsoft.com/office/drawing/2014/main" id="{8FA972A1-2C26-4FA9-97E8-BEB6A835C97D}"/>
+                <a16:creationId xmlns:a16="http://schemas.microsoft.com/office/drawing/2014/main" id="{C39B8774-EAB3-A348-A3E6-4982B62615C5}"/>
               </a:ext>
             </a:extLst>
           </p:cNvPr>
-          <p:cNvGrpSpPr/>
+          <p:cNvSpPr/>
           <p:nvPr/>
-        </p:nvGrpSpPr>
-        <p:grpSpPr>
+        </p:nvSpPr>
+        <p:spPr>
           <a:xfrm>
-            <a:off x="4596234" y="4022245"/>
-            <a:ext cx="2999531" cy="1643124"/>
-            <a:chOff x="4985" y="2245067"/>
-            <a:chExt cx="2999531" cy="1643124"/>
+            <a:off x="1513115" y="5289785"/>
+            <a:ext cx="413657" cy="413657"/>
           </a:xfrm>
-        </p:grpSpPr>
-        <p:sp>
-          <p:nvSpPr>
-            <p:cNvPr id="6" name="Rectangle 5">
-              <a:extLst>
-                <a:ext uri="{FF2B5EF4-FFF2-40B4-BE49-F238E27FC236}">
-                  <a16:creationId xmlns:a16="http://schemas.microsoft.com/office/drawing/2014/main" id="{F6FA15DA-DC15-4562-823F-C63AEAEB513A}"/>
-                </a:ext>
-              </a:extLst>
-            </p:cNvPr>
-            <p:cNvSpPr/>
-            <p:nvPr/>
-          </p:nvSpPr>
-          <p:spPr>
-            <a:xfrm>
-              <a:off x="4985" y="2245067"/>
-              <a:ext cx="2999531" cy="1643124"/>
-            </a:xfrm>
-            <a:prstGeom prst="rect">
-              <a:avLst/>
-            </a:prstGeom>
-          </p:spPr>
-          <p:style>
-            <a:lnRef idx="0">
-              <a:schemeClr val="dk1">
-                <a:alpha val="0"/>
-                <a:hueOff val="0"/>
-                <a:satOff val="0"/>
-                <a:lumOff val="0"/>
-                <a:alphaOff val="0"/>
-              </a:schemeClr>
-            </a:lnRef>
-            <a:fillRef idx="0">
-              <a:schemeClr val="lt1">
-                <a:alpha val="0"/>
-                <a:hueOff val="0"/>
-                <a:satOff val="0"/>
-                <a:lumOff val="0"/>
-                <a:alphaOff val="0"/>
-              </a:schemeClr>
-            </a:fillRef>
-            <a:effectRef idx="0">
-              <a:schemeClr val="lt1">
-                <a:alpha val="0"/>
-                <a:hueOff val="0"/>
-                <a:satOff val="0"/>
-                <a:lumOff val="0"/>
-                <a:alphaOff val="0"/>
-              </a:schemeClr>
-            </a:effectRef>
-            <a:fontRef idx="minor">
-              <a:schemeClr val="tx1">
-                <a:hueOff val="0"/>
-                <a:satOff val="0"/>
-                <a:lumOff val="0"/>
-                <a:alphaOff val="0"/>
-              </a:schemeClr>
-            </a:fontRef>
-          </p:style>
-        </p:sp>
-        <p:sp>
-          <p:nvSpPr>
-            <p:cNvPr id="7" name="TextBox 6">
-              <a:extLst>
-                <a:ext uri="{FF2B5EF4-FFF2-40B4-BE49-F238E27FC236}">
-                  <a16:creationId xmlns:a16="http://schemas.microsoft.com/office/drawing/2014/main" id="{649D4B2E-0BA2-4471-B24D-40A279803CB7}"/>
-                </a:ext>
-              </a:extLst>
-            </p:cNvPr>
-            <p:cNvSpPr txBox="1"/>
-            <p:nvPr/>
-          </p:nvSpPr>
-          <p:spPr>
-            <a:xfrm>
-              <a:off x="4985" y="2245067"/>
-              <a:ext cx="2999531" cy="1643124"/>
-            </a:xfrm>
-            <a:prstGeom prst="rect">
-              <a:avLst/>
-            </a:prstGeom>
-          </p:spPr>
-          <p:style>
-            <a:lnRef idx="0">
-              <a:scrgbClr r="0" g="0" b="0"/>
-            </a:lnRef>
-            <a:fillRef idx="0">
-              <a:scrgbClr r="0" g="0" b="0"/>
-            </a:fillRef>
-            <a:effectRef idx="0">
-              <a:scrgbClr r="0" g="0" b="0"/>
-            </a:effectRef>
-            <a:fontRef idx="minor">
-              <a:schemeClr val="tx1">
-                <a:hueOff val="0"/>
-                <a:satOff val="0"/>
-                <a:lumOff val="0"/>
-                <a:alphaOff val="0"/>
-              </a:schemeClr>
-            </a:fontRef>
-          </p:style>
-          <p:txBody>
-            <a:bodyPr spcFirstLastPara="0" vert="horz" wrap="square" lIns="0" tIns="0" rIns="0" bIns="0" numCol="1" spcCol="1270" anchor="t" anchorCtr="0">
-              <a:noAutofit/>
-            </a:bodyPr>
-            <a:lstStyle/>
-            <a:p>
-              <a:pPr marL="0" lvl="0" indent="0" algn="l" defTabSz="711200">
-                <a:lnSpc>
-                  <a:spcPct val="90000"/>
-                </a:lnSpc>
-                <a:spcBef>
-                  <a:spcPct val="0"/>
-                </a:spcBef>
-                <a:spcAft>
-                  <a:spcPct val="35000"/>
-                </a:spcAft>
-                <a:buNone/>
-              </a:pPr>
-              <a:r>
-                <a:rPr lang="en-US" sz="1600" dirty="0"/>
-                <a:t>Setup:</a:t>
-              </a:r>
-              <a:br>
-                <a:rPr lang="en-US" sz="1600" dirty="0"/>
-              </a:br>
-              <a:r>
-                <a:rPr lang="en-US" sz="1600" dirty="0"/>
-                <a:t>Each target is attached to a whiteboard, in a diagonal pattern, for the arm to point at.</a:t>
-              </a:r>
-            </a:p>
-          </p:txBody>
-        </p:sp>
-      </p:grpSp>
-      <p:grpSp>
-        <p:nvGrpSpPr>
-          <p:cNvPr id="8" name="Group 7">
+          <a:prstGeom prst="ellipse">
+            <a:avLst/>
+          </a:prstGeom>
+        </p:spPr>
+        <p:style>
+          <a:lnRef idx="2">
+            <a:schemeClr val="dk1">
+              <a:shade val="50000"/>
+            </a:schemeClr>
+          </a:lnRef>
+          <a:fillRef idx="1">
+            <a:schemeClr val="dk1"/>
+          </a:fillRef>
+          <a:effectRef idx="0">
+            <a:schemeClr val="dk1"/>
+          </a:effectRef>
+          <a:fontRef idx="minor">
+            <a:schemeClr val="lt1"/>
+          </a:fontRef>
+        </p:style>
+        <p:txBody>
+          <a:bodyPr rtlCol="0" anchor="ctr"/>
+          <a:lstStyle/>
+          <a:p>
+            <a:pPr algn="ctr"/>
+            <a:endParaRPr lang="en-US"/>
+          </a:p>
+        </p:txBody>
+      </p:sp>
+      <p:sp>
+        <p:nvSpPr>
+          <p:cNvPr id="9" name="Oval 8">
             <a:extLst>
               <a:ext uri="{FF2B5EF4-FFF2-40B4-BE49-F238E27FC236}">
-                <a16:creationId xmlns:a16="http://schemas.microsoft.com/office/drawing/2014/main" id="{DBF8E28B-96FC-46B1-B30F-3C8051EE5079}"/>
+                <a16:creationId xmlns:a16="http://schemas.microsoft.com/office/drawing/2014/main" id="{DD867FF6-6B89-A349-B46A-9FD5E0DADA30}"/>
               </a:ext>
             </a:extLst>
           </p:cNvPr>
-          <p:cNvGrpSpPr/>
+          <p:cNvSpPr/>
           <p:nvPr/>
-        </p:nvGrpSpPr>
-        <p:grpSpPr>
+        </p:nvSpPr>
+        <p:spPr>
           <a:xfrm>
-            <a:off x="8125668" y="4022245"/>
-            <a:ext cx="2999531" cy="1643124"/>
-            <a:chOff x="4985" y="2245067"/>
-            <a:chExt cx="2999531" cy="1643124"/>
+            <a:off x="3015343" y="4636978"/>
+            <a:ext cx="413657" cy="413657"/>
           </a:xfrm>
-        </p:grpSpPr>
-        <p:sp>
-          <p:nvSpPr>
-            <p:cNvPr id="9" name="Rectangle 8">
-              <a:extLst>
-                <a:ext uri="{FF2B5EF4-FFF2-40B4-BE49-F238E27FC236}">
-                  <a16:creationId xmlns:a16="http://schemas.microsoft.com/office/drawing/2014/main" id="{C76A6BB3-CE82-4681-884B-EAF345100A1E}"/>
-                </a:ext>
-              </a:extLst>
-            </p:cNvPr>
-            <p:cNvSpPr/>
-            <p:nvPr/>
-          </p:nvSpPr>
-          <p:spPr>
-            <a:xfrm>
-              <a:off x="4985" y="2245067"/>
-              <a:ext cx="2999531" cy="1643124"/>
-            </a:xfrm>
-            <a:prstGeom prst="rect">
-              <a:avLst/>
-            </a:prstGeom>
-          </p:spPr>
-          <p:style>
-            <a:lnRef idx="0">
-              <a:schemeClr val="dk1">
-                <a:alpha val="0"/>
-                <a:hueOff val="0"/>
-                <a:satOff val="0"/>
-                <a:lumOff val="0"/>
-                <a:alphaOff val="0"/>
-              </a:schemeClr>
-            </a:lnRef>
-            <a:fillRef idx="0">
-              <a:schemeClr val="lt1">
-                <a:alpha val="0"/>
-                <a:hueOff val="0"/>
-                <a:satOff val="0"/>
-                <a:lumOff val="0"/>
-                <a:alphaOff val="0"/>
-              </a:schemeClr>
-            </a:fillRef>
-            <a:effectRef idx="0">
-              <a:schemeClr val="lt1">
-                <a:alpha val="0"/>
-                <a:hueOff val="0"/>
-                <a:satOff val="0"/>
-                <a:lumOff val="0"/>
-                <a:alphaOff val="0"/>
-              </a:schemeClr>
-            </a:effectRef>
-            <a:fontRef idx="minor">
-              <a:schemeClr val="tx1">
-                <a:hueOff val="0"/>
-                <a:satOff val="0"/>
-                <a:lumOff val="0"/>
-                <a:alphaOff val="0"/>
-              </a:schemeClr>
-            </a:fontRef>
-          </p:style>
-        </p:sp>
-        <p:sp>
-          <p:nvSpPr>
-            <p:cNvPr id="10" name="TextBox 9">
-              <a:extLst>
-                <a:ext uri="{FF2B5EF4-FFF2-40B4-BE49-F238E27FC236}">
-                  <a16:creationId xmlns:a16="http://schemas.microsoft.com/office/drawing/2014/main" id="{CC7C7824-55A0-456F-8F68-883F376C01D3}"/>
-                </a:ext>
-              </a:extLst>
-            </p:cNvPr>
-            <p:cNvSpPr txBox="1"/>
-            <p:nvPr/>
-          </p:nvSpPr>
-          <p:spPr>
-            <a:xfrm>
-              <a:off x="4985" y="2245067"/>
-              <a:ext cx="2999531" cy="1643124"/>
-            </a:xfrm>
-            <a:prstGeom prst="rect">
-              <a:avLst/>
-            </a:prstGeom>
-          </p:spPr>
-          <p:style>
-            <a:lnRef idx="0">
-              <a:scrgbClr r="0" g="0" b="0"/>
-            </a:lnRef>
-            <a:fillRef idx="0">
-              <a:scrgbClr r="0" g="0" b="0"/>
-            </a:fillRef>
-            <a:effectRef idx="0">
-              <a:scrgbClr r="0" g="0" b="0"/>
-            </a:effectRef>
-            <a:fontRef idx="minor">
-              <a:schemeClr val="tx1">
-                <a:hueOff val="0"/>
-                <a:satOff val="0"/>
-                <a:lumOff val="0"/>
-                <a:alphaOff val="0"/>
-              </a:schemeClr>
-            </a:fontRef>
-          </p:style>
-          <p:txBody>
-            <a:bodyPr spcFirstLastPara="0" vert="horz" wrap="square" lIns="0" tIns="0" rIns="0" bIns="0" numCol="1" spcCol="1270" anchor="t" anchorCtr="0">
-              <a:noAutofit/>
-            </a:bodyPr>
-            <a:lstStyle/>
-            <a:p>
-              <a:pPr marL="0" lvl="0" indent="0" algn="l" defTabSz="711200">
-                <a:lnSpc>
-                  <a:spcPct val="90000"/>
-                </a:lnSpc>
-                <a:spcBef>
-                  <a:spcPct val="0"/>
-                </a:spcBef>
-                <a:spcAft>
-                  <a:spcPct val="35000"/>
-                </a:spcAft>
-                <a:buNone/>
-              </a:pPr>
-              <a:r>
-                <a:rPr lang="en-US" sz="1600" dirty="0"/>
-                <a:t>Points:</a:t>
-              </a:r>
-              <a:br>
-                <a:rPr lang="en-US" sz="1600" dirty="0"/>
-              </a:br>
-              <a:r>
-                <a:rPr lang="en-US" sz="1600" dirty="0"/>
-                <a:t>The target would be surrounded by a 5x5 grid of points for the arm to randomly select.</a:t>
-              </a:r>
-              <a:endParaRPr lang="en-US" sz="1600" kern="1200" dirty="0"/>
-            </a:p>
-          </p:txBody>
-        </p:sp>
-      </p:grpSp>
+          <a:prstGeom prst="ellipse">
+            <a:avLst/>
+          </a:prstGeom>
+          <a:solidFill>
+            <a:srgbClr val="C00000"/>
+          </a:solidFill>
+          <a:ln>
+            <a:solidFill>
+              <a:schemeClr val="tx1"/>
+            </a:solidFill>
+          </a:ln>
+        </p:spPr>
+        <p:style>
+          <a:lnRef idx="2">
+            <a:schemeClr val="accent4">
+              <a:shade val="50000"/>
+            </a:schemeClr>
+          </a:lnRef>
+          <a:fillRef idx="1">
+            <a:schemeClr val="accent4"/>
+          </a:fillRef>
+          <a:effectRef idx="0">
+            <a:schemeClr val="accent4"/>
+          </a:effectRef>
+          <a:fontRef idx="minor">
+            <a:schemeClr val="lt1"/>
+          </a:fontRef>
+        </p:style>
+        <p:txBody>
+          <a:bodyPr rtlCol="0" anchor="ctr"/>
+          <a:lstStyle/>
+          <a:p>
+            <a:pPr algn="ctr"/>
+            <a:endParaRPr lang="en-US"/>
+          </a:p>
+        </p:txBody>
+      </p:sp>
+      <p:pic>
+        <p:nvPicPr>
+          <p:cNvPr id="12" name="Graphic 11" descr="Right pointing backhand index">
+            <a:extLst>
+              <a:ext uri="{FF2B5EF4-FFF2-40B4-BE49-F238E27FC236}">
+                <a16:creationId xmlns:a16="http://schemas.microsoft.com/office/drawing/2014/main" id="{3F0F7828-2E82-7C44-AC53-A6CB39847D35}"/>
+              </a:ext>
+            </a:extLst>
+          </p:cNvPr>
+          <p:cNvPicPr>
+            <a:picLocks noChangeAspect="1"/>
+          </p:cNvPicPr>
+          <p:nvPr/>
+        </p:nvPicPr>
+        <p:blipFill>
+          <a:blip r:embed="rId2">
+            <a:extLst>
+              <a:ext uri="{96DAC541-7B7A-43D3-8B79-37D633B846F1}">
+                <asvg:svgBlip xmlns:asvg="http://schemas.microsoft.com/office/drawing/2016/SVG/main" r:embed="rId3"/>
+              </a:ext>
+            </a:extLst>
+          </a:blip>
+          <a:stretch>
+            <a:fillRect/>
+          </a:stretch>
+        </p:blipFill>
+        <p:spPr>
+          <a:xfrm rot="16200000">
+            <a:off x="1875745" y="3472207"/>
+            <a:ext cx="592591" cy="592591"/>
+          </a:xfrm>
+          <a:prstGeom prst="rect">
+            <a:avLst/>
+          </a:prstGeom>
+        </p:spPr>
+      </p:pic>
+      <p:pic>
+        <p:nvPicPr>
+          <p:cNvPr id="14" name="Graphic 13" descr="Pencil">
+            <a:extLst>
+              <a:ext uri="{FF2B5EF4-FFF2-40B4-BE49-F238E27FC236}">
+                <a16:creationId xmlns:a16="http://schemas.microsoft.com/office/drawing/2014/main" id="{54950C3A-B4D9-254C-AF97-F44EABD15887}"/>
+              </a:ext>
+            </a:extLst>
+          </p:cNvPr>
+          <p:cNvPicPr>
+            <a:picLocks noChangeAspect="1"/>
+          </p:cNvPicPr>
+          <p:nvPr/>
+        </p:nvPicPr>
+        <p:blipFill>
+          <a:blip r:embed="rId4">
+            <a:extLst>
+              <a:ext uri="{96DAC541-7B7A-43D3-8B79-37D633B846F1}">
+                <asvg:svgBlip xmlns:asvg="http://schemas.microsoft.com/office/drawing/2016/SVG/main" r:embed="rId5"/>
+              </a:ext>
+            </a:extLst>
+          </a:blip>
+          <a:stretch>
+            <a:fillRect/>
+          </a:stretch>
+        </p:blipFill>
+        <p:spPr>
+          <a:xfrm rot="10633562">
+            <a:off x="941652" y="5587603"/>
+            <a:ext cx="742265" cy="742265"/>
+          </a:xfrm>
+          <a:prstGeom prst="rect">
+            <a:avLst/>
+          </a:prstGeom>
+        </p:spPr>
+      </p:pic>
+      <p:cxnSp>
+        <p:nvCxnSpPr>
+          <p:cNvPr id="16" name="Straight Connector 15">
+            <a:extLst>
+              <a:ext uri="{FF2B5EF4-FFF2-40B4-BE49-F238E27FC236}">
+                <a16:creationId xmlns:a16="http://schemas.microsoft.com/office/drawing/2014/main" id="{71ACD931-F033-DC4B-9D87-A3496430664C}"/>
+              </a:ext>
+            </a:extLst>
+          </p:cNvPr>
+          <p:cNvCxnSpPr>
+            <a:cxnSpLocks/>
+          </p:cNvCxnSpPr>
+          <p:nvPr/>
+        </p:nvCxnSpPr>
+        <p:spPr>
+          <a:xfrm flipV="1">
+            <a:off x="1946828" y="4929534"/>
+            <a:ext cx="1048457" cy="506558"/>
+          </a:xfrm>
+          <a:prstGeom prst="line">
+            <a:avLst/>
+          </a:prstGeom>
+          <a:ln w="38100">
+            <a:solidFill>
+              <a:schemeClr val="tx1"/>
+            </a:solidFill>
+            <a:prstDash val="sysDash"/>
+          </a:ln>
+        </p:spPr>
+        <p:style>
+          <a:lnRef idx="1">
+            <a:schemeClr val="accent1"/>
+          </a:lnRef>
+          <a:fillRef idx="0">
+            <a:schemeClr val="accent1"/>
+          </a:fillRef>
+          <a:effectRef idx="0">
+            <a:schemeClr val="accent1"/>
+          </a:effectRef>
+          <a:fontRef idx="minor">
+            <a:schemeClr val="tx1"/>
+          </a:fontRef>
+        </p:style>
+      </p:cxnSp>
+      <p:pic>
+        <p:nvPicPr>
+          <p:cNvPr id="18" name="Graphic 17" descr="Ruler">
+            <a:extLst>
+              <a:ext uri="{FF2B5EF4-FFF2-40B4-BE49-F238E27FC236}">
+                <a16:creationId xmlns:a16="http://schemas.microsoft.com/office/drawing/2014/main" id="{B9499F17-E276-0C41-96FE-851D95E75574}"/>
+              </a:ext>
+            </a:extLst>
+          </p:cNvPr>
+          <p:cNvPicPr>
+            <a:picLocks noChangeAspect="1"/>
+          </p:cNvPicPr>
+          <p:nvPr/>
+        </p:nvPicPr>
+        <p:blipFill>
+          <a:blip r:embed="rId6">
+            <a:extLst>
+              <a:ext uri="{96DAC541-7B7A-43D3-8B79-37D633B846F1}">
+                <asvg:svgBlip xmlns:asvg="http://schemas.microsoft.com/office/drawing/2016/SVG/main" r:embed="rId7"/>
+              </a:ext>
+            </a:extLst>
+          </a:blip>
+          <a:stretch>
+            <a:fillRect/>
+          </a:stretch>
+        </p:blipFill>
+        <p:spPr>
+          <a:xfrm rot="1107058">
+            <a:off x="1925411" y="4534479"/>
+            <a:ext cx="914400" cy="914400"/>
+          </a:xfrm>
+          <a:prstGeom prst="rect">
+            <a:avLst/>
+          </a:prstGeom>
+        </p:spPr>
+      </p:pic>
+      <p:cxnSp>
+        <p:nvCxnSpPr>
+          <p:cNvPr id="19" name="Straight Connector 18">
+            <a:extLst>
+              <a:ext uri="{FF2B5EF4-FFF2-40B4-BE49-F238E27FC236}">
+                <a16:creationId xmlns:a16="http://schemas.microsoft.com/office/drawing/2014/main" id="{53D847B3-34D1-CC4D-A327-480822C91A01}"/>
+              </a:ext>
+            </a:extLst>
+          </p:cNvPr>
+          <p:cNvCxnSpPr>
+            <a:cxnSpLocks/>
+          </p:cNvCxnSpPr>
+          <p:nvPr/>
+        </p:nvCxnSpPr>
+        <p:spPr>
+          <a:xfrm flipV="1">
+            <a:off x="2118281" y="2900364"/>
+            <a:ext cx="0" cy="557555"/>
+          </a:xfrm>
+          <a:prstGeom prst="line">
+            <a:avLst/>
+          </a:prstGeom>
+          <a:ln w="38100">
+            <a:solidFill>
+              <a:schemeClr val="tx1"/>
+            </a:solidFill>
+            <a:prstDash val="sysDash"/>
+          </a:ln>
+        </p:spPr>
+        <p:style>
+          <a:lnRef idx="1">
+            <a:schemeClr val="accent1"/>
+          </a:lnRef>
+          <a:fillRef idx="0">
+            <a:schemeClr val="accent1"/>
+          </a:fillRef>
+          <a:effectRef idx="0">
+            <a:schemeClr val="accent1"/>
+          </a:effectRef>
+          <a:fontRef idx="minor">
+            <a:schemeClr val="tx1"/>
+          </a:fontRef>
+        </p:style>
+      </p:cxnSp>
     </p:spTree>
     <p:extLst>
       <p:ext uri="{BB962C8B-B14F-4D97-AF65-F5344CB8AC3E}">
-        <p14:creationId xmlns:p14="http://schemas.microsoft.com/office/powerpoint/2010/main" val="1544804390"/>
+        <p14:creationId xmlns:p14="http://schemas.microsoft.com/office/powerpoint/2010/main" val="2565618207"/>
       </p:ext>
     </p:extLst>
   </p:cSld>
@@ -18608,6 +15948,123 @@
 </file>
 
 <file path=ppt/slides/slide7.xml><?xml version="1.0" encoding="utf-8"?>
+<p:sld xmlns:a="http://schemas.openxmlformats.org/drawingml/2006/main" xmlns:r="http://schemas.openxmlformats.org/officeDocument/2006/relationships" xmlns:p="http://schemas.openxmlformats.org/presentationml/2006/main">
+  <p:cSld>
+    <p:spTree>
+      <p:nvGrpSpPr>
+        <p:cNvPr id="1" name=""/>
+        <p:cNvGrpSpPr/>
+        <p:nvPr/>
+      </p:nvGrpSpPr>
+      <p:grpSpPr>
+        <a:xfrm>
+          <a:off x="0" y="0"/>
+          <a:ext cx="0" cy="0"/>
+          <a:chOff x="0" y="0"/>
+          <a:chExt cx="0" cy="0"/>
+        </a:xfrm>
+      </p:grpSpPr>
+      <p:sp>
+        <p:nvSpPr>
+          <p:cNvPr id="2" name="Title 1">
+            <a:extLst>
+              <a:ext uri="{FF2B5EF4-FFF2-40B4-BE49-F238E27FC236}">
+                <a16:creationId xmlns:a16="http://schemas.microsoft.com/office/drawing/2014/main" id="{94F094DC-4881-9144-8FC8-9886EA7503C8}"/>
+              </a:ext>
+            </a:extLst>
+          </p:cNvPr>
+          <p:cNvSpPr>
+            <a:spLocks noGrp="1"/>
+          </p:cNvSpPr>
+          <p:nvPr>
+            <p:ph type="title"/>
+          </p:nvPr>
+        </p:nvSpPr>
+        <p:spPr/>
+        <p:txBody>
+          <a:bodyPr/>
+          <a:lstStyle/>
+          <a:p>
+            <a:r>
+              <a:rPr lang="en-US" dirty="0"/>
+              <a:t>Measurements</a:t>
+            </a:r>
+          </a:p>
+        </p:txBody>
+      </p:sp>
+      <p:sp>
+        <p:nvSpPr>
+          <p:cNvPr id="3" name="Content Placeholder 2">
+            <a:extLst>
+              <a:ext uri="{FF2B5EF4-FFF2-40B4-BE49-F238E27FC236}">
+                <a16:creationId xmlns:a16="http://schemas.microsoft.com/office/drawing/2014/main" id="{9F935AFE-7FA1-E941-B021-9B0C319C425C}"/>
+              </a:ext>
+            </a:extLst>
+          </p:cNvPr>
+          <p:cNvSpPr>
+            <a:spLocks noGrp="1"/>
+          </p:cNvSpPr>
+          <p:nvPr>
+            <p:ph idx="1"/>
+          </p:nvPr>
+        </p:nvSpPr>
+        <p:spPr/>
+        <p:txBody>
+          <a:bodyPr/>
+          <a:lstStyle/>
+          <a:p>
+            <a:r>
+              <a:rPr lang="en-US" sz="2400" dirty="0"/>
+              <a:t>What we would have measured:</a:t>
+            </a:r>
+          </a:p>
+          <a:p>
+            <a:pPr lvl="1"/>
+            <a:r>
+              <a:rPr lang="en-US" sz="1800" dirty="0"/>
+              <a:t>Participant’s Correctness</a:t>
+            </a:r>
+          </a:p>
+          <a:p>
+            <a:pPr lvl="2"/>
+            <a:r>
+              <a:rPr lang="en-US" sz="1600" dirty="0"/>
+              <a:t>Interpreting where the robot is pointing</a:t>
+            </a:r>
+          </a:p>
+          <a:p>
+            <a:pPr lvl="1"/>
+            <a:r>
+              <a:rPr lang="en-US" sz="1800" dirty="0"/>
+              <a:t>Participant Confidence in their selection</a:t>
+            </a:r>
+          </a:p>
+          <a:p>
+            <a:pPr lvl="1"/>
+            <a:r>
+              <a:rPr lang="en-US" sz="1800" dirty="0"/>
+              <a:t>Deviation between robot’s actual pointing location and participant’s interpretation of the location.</a:t>
+            </a:r>
+          </a:p>
+          <a:p>
+            <a:endParaRPr lang="en-US" dirty="0"/>
+          </a:p>
+        </p:txBody>
+      </p:sp>
+    </p:spTree>
+    <p:extLst>
+      <p:ext uri="{BB962C8B-B14F-4D97-AF65-F5344CB8AC3E}">
+        <p14:creationId xmlns:p14="http://schemas.microsoft.com/office/powerpoint/2010/main" val="3244142601"/>
+      </p:ext>
+    </p:extLst>
+  </p:cSld>
+  <p:clrMapOvr>
+    <a:masterClrMapping/>
+  </p:clrMapOvr>
+</p:sld>
+</file>
+
+<file path=ppt/slides/slide8.xml><?xml version="1.0" encoding="utf-8"?>
 <p:sld xmlns:a="http://schemas.openxmlformats.org/drawingml/2006/main" xmlns:r="http://schemas.openxmlformats.org/officeDocument/2006/relationships" xmlns:p="http://schemas.openxmlformats.org/presentationml/2006/main">
   <p:cSld>
     <p:spTree>
@@ -18738,7 +16195,7 @@
 </p:sld>
 </file>
 
-<file path=ppt/slides/slide8.xml><?xml version="1.0" encoding="utf-8"?>
+<file path=ppt/slides/slide9.xml><?xml version="1.0" encoding="utf-8"?>
 <p:sld xmlns:a="http://schemas.openxmlformats.org/drawingml/2006/main" xmlns:r="http://schemas.openxmlformats.org/officeDocument/2006/relationships" xmlns:p="http://schemas.openxmlformats.org/presentationml/2006/main">
   <p:cSld>
     <p:spTree>
@@ -18992,145 +16449,6 @@
     <p:extLst>
       <p:ext uri="{BB962C8B-B14F-4D97-AF65-F5344CB8AC3E}">
         <p14:creationId xmlns:p14="http://schemas.microsoft.com/office/powerpoint/2010/main" val="3853216191"/>
-      </p:ext>
-    </p:extLst>
-  </p:cSld>
-  <p:clrMapOvr>
-    <a:masterClrMapping/>
-  </p:clrMapOvr>
-</p:sld>
-</file>
-
-<file path=ppt/slides/slide9.xml><?xml version="1.0" encoding="utf-8"?>
-<p:sld xmlns:a="http://schemas.openxmlformats.org/drawingml/2006/main" xmlns:r="http://schemas.openxmlformats.org/officeDocument/2006/relationships" xmlns:p="http://schemas.openxmlformats.org/presentationml/2006/main">
-  <p:cSld>
-    <p:spTree>
-      <p:nvGrpSpPr>
-        <p:cNvPr id="1" name=""/>
-        <p:cNvGrpSpPr/>
-        <p:nvPr/>
-      </p:nvGrpSpPr>
-      <p:grpSpPr>
-        <a:xfrm>
-          <a:off x="0" y="0"/>
-          <a:ext cx="0" cy="0"/>
-          <a:chOff x="0" y="0"/>
-          <a:chExt cx="0" cy="0"/>
-        </a:xfrm>
-      </p:grpSpPr>
-      <p:sp>
-        <p:nvSpPr>
-          <p:cNvPr id="2" name="Title 1">
-            <a:extLst>
-              <a:ext uri="{FF2B5EF4-FFF2-40B4-BE49-F238E27FC236}">
-                <a16:creationId xmlns:a16="http://schemas.microsoft.com/office/drawing/2014/main" id="{911CAB4A-5F12-7D4F-B2E4-59E47AA2A522}"/>
-              </a:ext>
-            </a:extLst>
-          </p:cNvPr>
-          <p:cNvSpPr>
-            <a:spLocks noGrp="1"/>
-          </p:cNvSpPr>
-          <p:nvPr>
-            <p:ph type="title"/>
-          </p:nvPr>
-        </p:nvSpPr>
-        <p:spPr/>
-        <p:txBody>
-          <a:bodyPr/>
-          <a:lstStyle/>
-          <a:p>
-            <a:r>
-              <a:rPr lang="en-US" dirty="0"/>
-              <a:t>What We Learned</a:t>
-            </a:r>
-          </a:p>
-        </p:txBody>
-      </p:sp>
-      <p:sp>
-        <p:nvSpPr>
-          <p:cNvPr id="3" name="Content Placeholder 2">
-            <a:extLst>
-              <a:ext uri="{FF2B5EF4-FFF2-40B4-BE49-F238E27FC236}">
-                <a16:creationId xmlns:a16="http://schemas.microsoft.com/office/drawing/2014/main" id="{5F889957-674F-B747-B37B-1B18BA2ECA64}"/>
-              </a:ext>
-            </a:extLst>
-          </p:cNvPr>
-          <p:cNvSpPr>
-            <a:spLocks noGrp="1"/>
-          </p:cNvSpPr>
-          <p:nvPr>
-            <p:ph idx="1"/>
-          </p:nvPr>
-        </p:nvSpPr>
-        <p:spPr/>
-        <p:txBody>
-          <a:bodyPr/>
-          <a:lstStyle/>
-          <a:p>
-            <a:r>
-              <a:rPr lang="en-US" dirty="0"/>
-              <a:t>Git</a:t>
-            </a:r>
-          </a:p>
-          <a:p>
-            <a:pPr lvl="1"/>
-            <a:r>
-              <a:rPr lang="en-US" dirty="0"/>
-              <a:t>Integration into ROS</a:t>
-            </a:r>
-          </a:p>
-          <a:p>
-            <a:pPr lvl="1"/>
-            <a:r>
-              <a:rPr lang="en-US" dirty="0"/>
-              <a:t>VIM and how to publish</a:t>
-            </a:r>
-          </a:p>
-          <a:p>
-            <a:r>
-              <a:rPr lang="en-US" dirty="0"/>
-              <a:t>ROS</a:t>
-            </a:r>
-          </a:p>
-          <a:p>
-            <a:pPr lvl="1"/>
-            <a:r>
-              <a:rPr lang="en-US" dirty="0"/>
-              <a:t>How to send messages to the arm motors</a:t>
-            </a:r>
-          </a:p>
-          <a:p>
-            <a:pPr lvl="1"/>
-            <a:r>
-              <a:rPr lang="en-US" dirty="0"/>
-              <a:t>Simulation vs. actual arm testing</a:t>
-            </a:r>
-          </a:p>
-          <a:p>
-            <a:pPr lvl="1"/>
-            <a:r>
-              <a:rPr lang="en-US" dirty="0"/>
-              <a:t>Structure of messages</a:t>
-            </a:r>
-          </a:p>
-          <a:p>
-            <a:r>
-              <a:rPr lang="en-US" dirty="0"/>
-              <a:t>Hardware setup</a:t>
-            </a:r>
-          </a:p>
-          <a:p>
-            <a:r>
-              <a:rPr lang="en-US" dirty="0"/>
-              <a:t>The Beauty of Improvisation</a:t>
-            </a:r>
-          </a:p>
-        </p:txBody>
-      </p:sp>
-    </p:spTree>
-    <p:extLst>
-      <p:ext uri="{BB962C8B-B14F-4D97-AF65-F5344CB8AC3E}">
-        <p14:creationId xmlns:p14="http://schemas.microsoft.com/office/powerpoint/2010/main" val="3607730106"/>
       </p:ext>
     </p:extLst>
   </p:cSld>

</xml_diff>